<commit_message>
Fixed Delta/100 bug in simulate_fast.py
</commit_message>
<xml_diff>
--- a/Option Trading.pptx
+++ b/Option Trading.pptx
@@ -4978,12 +4978,14 @@
         </p:nvSpPr>
         <p:spPr>
           <a:xfrm>
-            <a:off x="707010" y="933254"/>
-            <a:ext cx="10646790" cy="5243709"/>
+            <a:off x="707010" y="933255"/>
+            <a:ext cx="10646790" cy="2092750"/>
           </a:xfrm>
         </p:spPr>
         <p:txBody>
-          <a:bodyPr/>
+          <a:bodyPr>
+            <a:normAutofit lnSpcReduction="10000"/>
+          </a:bodyPr>
           <a:lstStyle/>
           <a:p>
             <a:pPr>
@@ -5483,142 +5485,12 @@
           <a:chExt cx="0" cy="0"/>
         </a:xfrm>
       </p:grpSpPr>
-      <p:sp>
-        <p:nvSpPr>
-          <p:cNvPr id="2" name="Title 1">
-            <a:extLst>
-              <a:ext uri="{FF2B5EF4-FFF2-40B4-BE49-F238E27FC236}">
-                <a16:creationId xmlns:a16="http://schemas.microsoft.com/office/drawing/2014/main" id="{F61885F0-A88C-2665-81E3-C1AE72F54AC1}"/>
-              </a:ext>
-            </a:extLst>
-          </p:cNvPr>
-          <p:cNvSpPr>
-            <a:spLocks noGrp="1"/>
-          </p:cNvSpPr>
-          <p:nvPr>
-            <p:ph type="title"/>
-          </p:nvPr>
-        </p:nvSpPr>
-        <p:spPr>
-          <a:xfrm>
-            <a:off x="358365" y="171245"/>
-            <a:ext cx="8342015" cy="469735"/>
-          </a:xfrm>
-        </p:spPr>
-        <p:txBody>
-          <a:bodyPr>
-            <a:normAutofit fontScale="90000"/>
-          </a:bodyPr>
-          <a:lstStyle/>
-          <a:p>
-            <a:r>
-              <a:rPr lang="en-US" b="1" noProof="1">
-                <a:solidFill>
-                  <a:srgbClr val="002060"/>
-                </a:solidFill>
-              </a:rPr>
-              <a:t>Summary.xlsm</a:t>
-            </a:r>
-            <a:endParaRPr lang="en-US" b="1" dirty="0">
-              <a:solidFill>
-                <a:srgbClr val="002060"/>
-              </a:solidFill>
-            </a:endParaRPr>
-          </a:p>
-        </p:txBody>
-      </p:sp>
-      <p:sp>
-        <p:nvSpPr>
-          <p:cNvPr id="8" name="Content Placeholder 7">
-            <a:extLst>
-              <a:ext uri="{FF2B5EF4-FFF2-40B4-BE49-F238E27FC236}">
-                <a16:creationId xmlns:a16="http://schemas.microsoft.com/office/drawing/2014/main" id="{0C252127-8EB5-3BE2-7A74-ECB7811FCC25}"/>
-              </a:ext>
-            </a:extLst>
-          </p:cNvPr>
-          <p:cNvSpPr>
-            <a:spLocks noGrp="1"/>
-          </p:cNvSpPr>
-          <p:nvPr>
-            <p:ph idx="1"/>
-          </p:nvPr>
-        </p:nvSpPr>
-        <p:spPr>
-          <a:xfrm>
-            <a:off x="509047" y="787117"/>
-            <a:ext cx="10887959" cy="1814681"/>
-          </a:xfrm>
-        </p:spPr>
-        <p:txBody>
-          <a:bodyPr>
-            <a:normAutofit/>
-          </a:bodyPr>
-          <a:lstStyle/>
-          <a:p>
-            <a:pPr>
-              <a:tabLst>
-                <a:tab pos="519113" algn="l"/>
-              </a:tabLst>
-            </a:pPr>
-            <a:r>
-              <a:rPr lang="en-US" sz="1600" dirty="0"/>
-              <a:t> This excel file is a summary of all the manual and automatic optimizations</a:t>
-            </a:r>
-          </a:p>
-          <a:p>
-            <a:pPr>
-              <a:tabLst>
-                <a:tab pos="519113" algn="l"/>
-              </a:tabLst>
-            </a:pPr>
-            <a:r>
-              <a:rPr lang="en-US" sz="1600" dirty="0"/>
-              <a:t> It includes “Optimization No-Yes-No” tab which is using </a:t>
-            </a:r>
-            <a:r>
-              <a:rPr lang="en-US" sz="1600" b="1" dirty="0"/>
-              <a:t>Rank by annual risk = True</a:t>
-            </a:r>
-          </a:p>
-          <a:p>
-            <a:pPr>
-              <a:tabLst>
-                <a:tab pos="519113" algn="l"/>
-              </a:tabLst>
-            </a:pPr>
-            <a:r>
-              <a:rPr lang="en-US" sz="1600" dirty="0"/>
-              <a:t> It includes “Optimization Yes-No-No” tab which is using </a:t>
-            </a:r>
-            <a:r>
-              <a:rPr lang="en-US" sz="1600" b="1" dirty="0"/>
-              <a:t>Rank by risk reward = True</a:t>
-            </a:r>
-          </a:p>
-          <a:p>
-            <a:pPr>
-              <a:tabLst>
-                <a:tab pos="519113" algn="l"/>
-              </a:tabLst>
-            </a:pPr>
-            <a:r>
-              <a:rPr lang="en-US" sz="1600" b="1" dirty="0"/>
-              <a:t> </a:t>
-            </a:r>
-            <a:r>
-              <a:rPr lang="en-US" sz="1600" dirty="0"/>
-              <a:t>It includes “Charts” tab which can load a log file of “simulate_yuda.py” and create a plot of the results:</a:t>
-            </a:r>
-            <a:endParaRPr lang="en-US" sz="2000" dirty="0"/>
-          </a:p>
-        </p:txBody>
-      </p:sp>
       <p:pic>
         <p:nvPicPr>
-          <p:cNvPr id="3" name="Picture 2">
-            <a:extLst>
-              <a:ext uri="{FF2B5EF4-FFF2-40B4-BE49-F238E27FC236}">
-                <a16:creationId xmlns:a16="http://schemas.microsoft.com/office/drawing/2014/main" id="{C1407D6C-FAF1-AE53-A84F-C92343103C7C}"/>
+          <p:cNvPr id="9" name="Picture 8">
+            <a:extLst>
+              <a:ext uri="{FF2B5EF4-FFF2-40B4-BE49-F238E27FC236}">
+                <a16:creationId xmlns:a16="http://schemas.microsoft.com/office/drawing/2014/main" id="{9D563AF2-1E77-243D-BD54-163E74743A0F}"/>
               </a:ext>
             </a:extLst>
           </p:cNvPr>
@@ -5635,8 +5507,8 @@
         </p:blipFill>
         <p:spPr>
           <a:xfrm>
-            <a:off x="952109" y="2289906"/>
-            <a:ext cx="6249970" cy="4396849"/>
+            <a:off x="6287679" y="4767085"/>
+            <a:ext cx="5599520" cy="1902401"/>
           </a:xfrm>
           <a:prstGeom prst="rect">
             <a:avLst/>
@@ -5645,10 +5517,10 @@
       </p:pic>
       <p:pic>
         <p:nvPicPr>
-          <p:cNvPr id="5" name="Picture 4">
-            <a:extLst>
-              <a:ext uri="{FF2B5EF4-FFF2-40B4-BE49-F238E27FC236}">
-                <a16:creationId xmlns:a16="http://schemas.microsoft.com/office/drawing/2014/main" id="{668DB128-2614-52C7-98C1-2F53D0C6A6A0}"/>
+          <p:cNvPr id="7" name="Picture 6">
+            <a:extLst>
+              <a:ext uri="{FF2B5EF4-FFF2-40B4-BE49-F238E27FC236}">
+                <a16:creationId xmlns:a16="http://schemas.microsoft.com/office/drawing/2014/main" id="{57A362FA-DD93-DAC8-58F9-AC92BE66E896}"/>
               </a:ext>
             </a:extLst>
           </p:cNvPr>
@@ -5665,7 +5537,173 @@
         </p:blipFill>
         <p:spPr>
           <a:xfrm>
-            <a:off x="5674042" y="2414602"/>
+            <a:off x="575037" y="2846895"/>
+            <a:ext cx="5613289" cy="3839860"/>
+          </a:xfrm>
+          <a:prstGeom prst="rect">
+            <a:avLst/>
+          </a:prstGeom>
+        </p:spPr>
+      </p:pic>
+      <p:sp>
+        <p:nvSpPr>
+          <p:cNvPr id="2" name="Title 1">
+            <a:extLst>
+              <a:ext uri="{FF2B5EF4-FFF2-40B4-BE49-F238E27FC236}">
+                <a16:creationId xmlns:a16="http://schemas.microsoft.com/office/drawing/2014/main" id="{F61885F0-A88C-2665-81E3-C1AE72F54AC1}"/>
+              </a:ext>
+            </a:extLst>
+          </p:cNvPr>
+          <p:cNvSpPr>
+            <a:spLocks noGrp="1"/>
+          </p:cNvSpPr>
+          <p:nvPr>
+            <p:ph type="title"/>
+          </p:nvPr>
+        </p:nvSpPr>
+        <p:spPr>
+          <a:xfrm>
+            <a:off x="358365" y="171245"/>
+            <a:ext cx="8342015" cy="469735"/>
+          </a:xfrm>
+        </p:spPr>
+        <p:txBody>
+          <a:bodyPr>
+            <a:normAutofit fontScale="90000"/>
+          </a:bodyPr>
+          <a:lstStyle/>
+          <a:p>
+            <a:r>
+              <a:rPr lang="en-US" b="1" noProof="1">
+                <a:solidFill>
+                  <a:srgbClr val="002060"/>
+                </a:solidFill>
+              </a:rPr>
+              <a:t>Summary.xlsm</a:t>
+            </a:r>
+            <a:endParaRPr lang="en-US" b="1" dirty="0">
+              <a:solidFill>
+                <a:srgbClr val="002060"/>
+              </a:solidFill>
+            </a:endParaRPr>
+          </a:p>
+        </p:txBody>
+      </p:sp>
+      <p:sp>
+        <p:nvSpPr>
+          <p:cNvPr id="8" name="Content Placeholder 7">
+            <a:extLst>
+              <a:ext uri="{FF2B5EF4-FFF2-40B4-BE49-F238E27FC236}">
+                <a16:creationId xmlns:a16="http://schemas.microsoft.com/office/drawing/2014/main" id="{0C252127-8EB5-3BE2-7A74-ECB7811FCC25}"/>
+              </a:ext>
+            </a:extLst>
+          </p:cNvPr>
+          <p:cNvSpPr>
+            <a:spLocks noGrp="1"/>
+          </p:cNvSpPr>
+          <p:nvPr>
+            <p:ph idx="1"/>
+          </p:nvPr>
+        </p:nvSpPr>
+        <p:spPr>
+          <a:xfrm>
+            <a:off x="509047" y="787117"/>
+            <a:ext cx="10887959" cy="1814681"/>
+          </a:xfrm>
+        </p:spPr>
+        <p:txBody>
+          <a:bodyPr>
+            <a:normAutofit/>
+          </a:bodyPr>
+          <a:lstStyle/>
+          <a:p>
+            <a:pPr>
+              <a:tabLst>
+                <a:tab pos="519113" algn="l"/>
+              </a:tabLst>
+            </a:pPr>
+            <a:r>
+              <a:rPr lang="en-US" sz="1600" dirty="0"/>
+              <a:t> This excel file is a summary of all the manual and automatic optimizations</a:t>
+            </a:r>
+          </a:p>
+          <a:p>
+            <a:pPr>
+              <a:tabLst>
+                <a:tab pos="519113" algn="l"/>
+              </a:tabLst>
+            </a:pPr>
+            <a:r>
+              <a:rPr lang="en-US" sz="1600" dirty="0"/>
+              <a:t> It includes “Optimization No-Yes-No” tab which is using </a:t>
+            </a:r>
+            <a:r>
+              <a:rPr lang="en-US" sz="1600" b="1" dirty="0"/>
+              <a:t>Rank by annual risk = True</a:t>
+            </a:r>
+          </a:p>
+          <a:p>
+            <a:pPr>
+              <a:tabLst>
+                <a:tab pos="519113" algn="l"/>
+              </a:tabLst>
+            </a:pPr>
+            <a:r>
+              <a:rPr lang="en-US" sz="1600" dirty="0"/>
+              <a:t> It includes “Optimization Yes-No-No” tab which is using </a:t>
+            </a:r>
+            <a:r>
+              <a:rPr lang="en-US" sz="1600" b="1" dirty="0"/>
+              <a:t>Rank by risk reward = True</a:t>
+            </a:r>
+          </a:p>
+          <a:p>
+            <a:pPr>
+              <a:tabLst>
+                <a:tab pos="519113" algn="l"/>
+              </a:tabLst>
+            </a:pPr>
+            <a:r>
+              <a:rPr lang="en-US" sz="1600" b="1" dirty="0"/>
+              <a:t> </a:t>
+            </a:r>
+            <a:r>
+              <a:rPr lang="en-US" sz="1600" dirty="0"/>
+              <a:t>It includes “Charts” tab which can load a log file of “simulate_yuda.py” and create a plot of the results:</a:t>
+            </a:r>
+            <a:br>
+              <a:rPr lang="en-US" sz="1600" dirty="0"/>
+            </a:br>
+            <a:r>
+              <a:rPr lang="en-US" sz="2000" dirty="0"/>
+              <a:t>logs/2025-11-14 00-55.log</a:t>
+            </a:r>
+          </a:p>
+        </p:txBody>
+      </p:sp>
+      <p:pic>
+        <p:nvPicPr>
+          <p:cNvPr id="5" name="Picture 4">
+            <a:extLst>
+              <a:ext uri="{FF2B5EF4-FFF2-40B4-BE49-F238E27FC236}">
+                <a16:creationId xmlns:a16="http://schemas.microsoft.com/office/drawing/2014/main" id="{668DB128-2614-52C7-98C1-2F53D0C6A6A0}"/>
+              </a:ext>
+            </a:extLst>
+          </p:cNvPr>
+          <p:cNvPicPr>
+            <a:picLocks noChangeAspect="1"/>
+          </p:cNvPicPr>
+          <p:nvPr/>
+        </p:nvPicPr>
+        <p:blipFill>
+          <a:blip r:embed="rId4"/>
+          <a:stretch>
+            <a:fillRect/>
+          </a:stretch>
+        </p:blipFill>
+        <p:spPr>
+          <a:xfrm>
+            <a:off x="9829691" y="1811286"/>
             <a:ext cx="1409524" cy="333333"/>
           </a:xfrm>
           <a:prstGeom prst="rect">

</xml_diff>

<commit_message>
Fixed "not the same values" issues in simulate_yuda.py and updated rules.json parameters.
</commit_message>
<xml_diff>
--- a/Option Trading.pptx
+++ b/Option Trading.pptx
@@ -19,6 +19,8 @@
     <p:sldId id="269" r:id="rId13"/>
     <p:sldId id="270" r:id="rId14"/>
     <p:sldId id="271" r:id="rId15"/>
+    <p:sldId id="272" r:id="rId16"/>
+    <p:sldId id="273" r:id="rId17"/>
   </p:sldIdLst>
   <p:sldSz cx="12192000" cy="6858000"/>
   <p:notesSz cx="6858000" cy="9144000"/>
@@ -117,6 +119,11 @@
       </a:defRPr>
     </a:lvl9pPr>
   </p:defaultTextStyle>
+  <p:extLst>
+    <p:ext uri="{EFAFB233-063F-42B5-8137-9DF3F51BA10A}">
+      <p15:sldGuideLst xmlns:p15="http://schemas.microsoft.com/office/powerpoint/2012/main"/>
+    </p:ext>
+  </p:extLst>
 </p:presentation>
 </file>
 
@@ -267,7 +274,7 @@
           <a:p>
             <a:fld id="{802E63CE-73C2-416C-817A-F7BDE0DDA196}" type="datetimeFigureOut">
               <a:rPr lang="en-US" smtClean="0"/>
-              <a:t>11/24/2025</a:t>
+              <a:t>11/27/2025</a:t>
             </a:fld>
             <a:endParaRPr lang="en-US" dirty="0"/>
           </a:p>
@@ -465,7 +472,7 @@
           <a:p>
             <a:fld id="{802E63CE-73C2-416C-817A-F7BDE0DDA196}" type="datetimeFigureOut">
               <a:rPr lang="en-US" smtClean="0"/>
-              <a:t>11/24/2025</a:t>
+              <a:t>11/27/2025</a:t>
             </a:fld>
             <a:endParaRPr lang="en-US" dirty="0"/>
           </a:p>
@@ -673,7 +680,7 @@
           <a:p>
             <a:fld id="{802E63CE-73C2-416C-817A-F7BDE0DDA196}" type="datetimeFigureOut">
               <a:rPr lang="en-US" smtClean="0"/>
-              <a:t>11/24/2025</a:t>
+              <a:t>11/27/2025</a:t>
             </a:fld>
             <a:endParaRPr lang="en-US" dirty="0"/>
           </a:p>
@@ -871,7 +878,7 @@
           <a:p>
             <a:fld id="{802E63CE-73C2-416C-817A-F7BDE0DDA196}" type="datetimeFigureOut">
               <a:rPr lang="en-US" smtClean="0"/>
-              <a:t>11/24/2025</a:t>
+              <a:t>11/27/2025</a:t>
             </a:fld>
             <a:endParaRPr lang="en-US" dirty="0"/>
           </a:p>
@@ -1146,7 +1153,7 @@
           <a:p>
             <a:fld id="{802E63CE-73C2-416C-817A-F7BDE0DDA196}" type="datetimeFigureOut">
               <a:rPr lang="en-US" smtClean="0"/>
-              <a:t>11/24/2025</a:t>
+              <a:t>11/27/2025</a:t>
             </a:fld>
             <a:endParaRPr lang="en-US" dirty="0"/>
           </a:p>
@@ -1411,7 +1418,7 @@
           <a:p>
             <a:fld id="{802E63CE-73C2-416C-817A-F7BDE0DDA196}" type="datetimeFigureOut">
               <a:rPr lang="en-US" smtClean="0"/>
-              <a:t>11/24/2025</a:t>
+              <a:t>11/27/2025</a:t>
             </a:fld>
             <a:endParaRPr lang="en-US" dirty="0"/>
           </a:p>
@@ -1823,7 +1830,7 @@
           <a:p>
             <a:fld id="{802E63CE-73C2-416C-817A-F7BDE0DDA196}" type="datetimeFigureOut">
               <a:rPr lang="en-US" smtClean="0"/>
-              <a:t>11/24/2025</a:t>
+              <a:t>11/27/2025</a:t>
             </a:fld>
             <a:endParaRPr lang="en-US" dirty="0"/>
           </a:p>
@@ -1964,7 +1971,7 @@
           <a:p>
             <a:fld id="{802E63CE-73C2-416C-817A-F7BDE0DDA196}" type="datetimeFigureOut">
               <a:rPr lang="en-US" smtClean="0"/>
-              <a:t>11/24/2025</a:t>
+              <a:t>11/27/2025</a:t>
             </a:fld>
             <a:endParaRPr lang="en-US" dirty="0"/>
           </a:p>
@@ -2077,7 +2084,7 @@
           <a:p>
             <a:fld id="{802E63CE-73C2-416C-817A-F7BDE0DDA196}" type="datetimeFigureOut">
               <a:rPr lang="en-US" smtClean="0"/>
-              <a:t>11/24/2025</a:t>
+              <a:t>11/27/2025</a:t>
             </a:fld>
             <a:endParaRPr lang="en-US" dirty="0"/>
           </a:p>
@@ -2388,7 +2395,7 @@
           <a:p>
             <a:fld id="{802E63CE-73C2-416C-817A-F7BDE0DDA196}" type="datetimeFigureOut">
               <a:rPr lang="en-US" smtClean="0"/>
-              <a:t>11/24/2025</a:t>
+              <a:t>11/27/2025</a:t>
             </a:fld>
             <a:endParaRPr lang="en-US" dirty="0"/>
           </a:p>
@@ -2676,7 +2683,7 @@
           <a:p>
             <a:fld id="{802E63CE-73C2-416C-817A-F7BDE0DDA196}" type="datetimeFigureOut">
               <a:rPr lang="en-US" smtClean="0"/>
-              <a:t>11/24/2025</a:t>
+              <a:t>11/27/2025</a:t>
             </a:fld>
             <a:endParaRPr lang="en-US" dirty="0"/>
           </a:p>
@@ -2917,7 +2924,7 @@
           <a:p>
             <a:fld id="{802E63CE-73C2-416C-817A-F7BDE0DDA196}" type="datetimeFigureOut">
               <a:rPr lang="en-US" smtClean="0"/>
-              <a:t>11/24/2025</a:t>
+              <a:t>11/27/2025</a:t>
             </a:fld>
             <a:endParaRPr lang="en-US" dirty="0"/>
           </a:p>
@@ -5487,10 +5494,10 @@
       </p:grpSpPr>
       <p:pic>
         <p:nvPicPr>
-          <p:cNvPr id="9" name="Picture 8">
+          <p:cNvPr id="4" name="Picture 3">
             <a:extLst>
               <a:ext uri="{FF2B5EF4-FFF2-40B4-BE49-F238E27FC236}">
-                <a16:creationId xmlns:a16="http://schemas.microsoft.com/office/drawing/2014/main" id="{9D563AF2-1E77-243D-BD54-163E74743A0F}"/>
+                <a16:creationId xmlns:a16="http://schemas.microsoft.com/office/drawing/2014/main" id="{A7FE5A50-CB93-98CB-50E9-9460CF4DABF4}"/>
               </a:ext>
             </a:extLst>
           </p:cNvPr>
@@ -5507,8 +5514,8 @@
         </p:blipFill>
         <p:spPr>
           <a:xfrm>
-            <a:off x="6287679" y="4767085"/>
-            <a:ext cx="5599520" cy="1902401"/>
+            <a:off x="6268825" y="2858866"/>
+            <a:ext cx="5613289" cy="1908827"/>
           </a:xfrm>
           <a:prstGeom prst="rect">
             <a:avLst/>
@@ -5517,10 +5524,10 @@
       </p:pic>
       <p:pic>
         <p:nvPicPr>
-          <p:cNvPr id="7" name="Picture 6">
+          <p:cNvPr id="3" name="Picture 2">
             <a:extLst>
               <a:ext uri="{FF2B5EF4-FFF2-40B4-BE49-F238E27FC236}">
-                <a16:creationId xmlns:a16="http://schemas.microsoft.com/office/drawing/2014/main" id="{57A362FA-DD93-DAC8-58F9-AC92BE66E896}"/>
+                <a16:creationId xmlns:a16="http://schemas.microsoft.com/office/drawing/2014/main" id="{44C0FA6E-98D5-8ABF-1A74-D613A322887C}"/>
               </a:ext>
             </a:extLst>
           </p:cNvPr>
@@ -5537,8 +5544,8 @@
         </p:blipFill>
         <p:spPr>
           <a:xfrm>
-            <a:off x="575037" y="2846895"/>
-            <a:ext cx="5613289" cy="3839860"/>
+            <a:off x="575037" y="2858866"/>
+            <a:ext cx="5613289" cy="3736166"/>
           </a:xfrm>
           <a:prstGeom prst="rect">
             <a:avLst/>
@@ -5676,7 +5683,7 @@
             </a:br>
             <a:r>
               <a:rPr lang="en-US" sz="2000" dirty="0"/>
-              <a:t>logs/2025-11-14 00-55.log</a:t>
+              <a:t>logs/2025-11-27 12-42.log</a:t>
             </a:r>
           </a:p>
         </p:txBody>
@@ -5711,10 +5718,2342 @@
           </a:prstGeom>
         </p:spPr>
       </p:pic>
+      <p:pic>
+        <p:nvPicPr>
+          <p:cNvPr id="6" name="Picture 5">
+            <a:extLst>
+              <a:ext uri="{FF2B5EF4-FFF2-40B4-BE49-F238E27FC236}">
+                <a16:creationId xmlns:a16="http://schemas.microsoft.com/office/drawing/2014/main" id="{6A590BA2-BC98-E220-1E17-D952B3BBFF70}"/>
+              </a:ext>
+            </a:extLst>
+          </p:cNvPr>
+          <p:cNvPicPr>
+            <a:picLocks noChangeAspect="1"/>
+          </p:cNvPicPr>
+          <p:nvPr/>
+        </p:nvPicPr>
+        <p:blipFill>
+          <a:blip r:embed="rId5"/>
+          <a:stretch>
+            <a:fillRect/>
+          </a:stretch>
+        </p:blipFill>
+        <p:spPr>
+          <a:xfrm>
+            <a:off x="6268825" y="4686205"/>
+            <a:ext cx="5613289" cy="1908827"/>
+          </a:xfrm>
+          <a:prstGeom prst="rect">
+            <a:avLst/>
+          </a:prstGeom>
+        </p:spPr>
+      </p:pic>
     </p:spTree>
     <p:extLst>
       <p:ext uri="{BB962C8B-B14F-4D97-AF65-F5344CB8AC3E}">
         <p14:creationId xmlns:p14="http://schemas.microsoft.com/office/powerpoint/2010/main" val="2594350866"/>
+      </p:ext>
+    </p:extLst>
+  </p:cSld>
+  <p:clrMapOvr>
+    <a:masterClrMapping/>
+  </p:clrMapOvr>
+</p:sld>
+</file>
+
+<file path=ppt/slides/slide15.xml><?xml version="1.0" encoding="utf-8"?>
+<p:sld xmlns:a="http://schemas.openxmlformats.org/drawingml/2006/main" xmlns:r="http://schemas.openxmlformats.org/officeDocument/2006/relationships" xmlns:p="http://schemas.openxmlformats.org/presentationml/2006/main">
+  <p:cSld>
+    <p:spTree>
+      <p:nvGrpSpPr>
+        <p:cNvPr id="1" name="">
+          <a:extLst>
+            <a:ext uri="{FF2B5EF4-FFF2-40B4-BE49-F238E27FC236}">
+              <a16:creationId xmlns:a16="http://schemas.microsoft.com/office/drawing/2014/main" id="{8A09EE3B-252E-2BFA-DE30-1FB81B1C5925}"/>
+            </a:ext>
+          </a:extLst>
+        </p:cNvPr>
+        <p:cNvGrpSpPr/>
+        <p:nvPr/>
+      </p:nvGrpSpPr>
+      <p:grpSpPr>
+        <a:xfrm>
+          <a:off x="0" y="0"/>
+          <a:ext cx="0" cy="0"/>
+          <a:chOff x="0" y="0"/>
+          <a:chExt cx="0" cy="0"/>
+        </a:xfrm>
+      </p:grpSpPr>
+      <p:sp>
+        <p:nvSpPr>
+          <p:cNvPr id="2" name="Title 1">
+            <a:extLst>
+              <a:ext uri="{FF2B5EF4-FFF2-40B4-BE49-F238E27FC236}">
+                <a16:creationId xmlns:a16="http://schemas.microsoft.com/office/drawing/2014/main" id="{71D5A90E-5EE0-4127-1E41-72789DF20F66}"/>
+              </a:ext>
+            </a:extLst>
+          </p:cNvPr>
+          <p:cNvSpPr>
+            <a:spLocks noGrp="1"/>
+          </p:cNvSpPr>
+          <p:nvPr>
+            <p:ph type="title"/>
+          </p:nvPr>
+        </p:nvSpPr>
+        <p:spPr>
+          <a:xfrm>
+            <a:off x="216963" y="171245"/>
+            <a:ext cx="8483417" cy="469735"/>
+          </a:xfrm>
+        </p:spPr>
+        <p:txBody>
+          <a:bodyPr>
+            <a:normAutofit fontScale="90000"/>
+          </a:bodyPr>
+          <a:lstStyle/>
+          <a:p>
+            <a:r>
+              <a:rPr lang="en-US" b="1" noProof="1">
+                <a:solidFill>
+                  <a:srgbClr val="002060"/>
+                </a:solidFill>
+              </a:rPr>
+              <a:t>Log file: Rules</a:t>
+            </a:r>
+            <a:endParaRPr lang="en-US" b="1" dirty="0">
+              <a:solidFill>
+                <a:srgbClr val="002060"/>
+              </a:solidFill>
+            </a:endParaRPr>
+          </a:p>
+        </p:txBody>
+      </p:sp>
+      <p:sp>
+        <p:nvSpPr>
+          <p:cNvPr id="9" name="TextBox 8">
+            <a:extLst>
+              <a:ext uri="{FF2B5EF4-FFF2-40B4-BE49-F238E27FC236}">
+                <a16:creationId xmlns:a16="http://schemas.microsoft.com/office/drawing/2014/main" id="{58C8A408-83BF-7D6C-5B5C-00805C64F110}"/>
+              </a:ext>
+            </a:extLst>
+          </p:cNvPr>
+          <p:cNvSpPr txBox="1"/>
+          <p:nvPr/>
+        </p:nvSpPr>
+        <p:spPr>
+          <a:xfrm>
+            <a:off x="216963" y="790121"/>
+            <a:ext cx="3695161" cy="4750018"/>
+          </a:xfrm>
+          <a:prstGeom prst="rect">
+            <a:avLst/>
+          </a:prstGeom>
+          <a:noFill/>
+        </p:spPr>
+        <p:txBody>
+          <a:bodyPr wrap="square">
+            <a:spAutoFit/>
+          </a:bodyPr>
+          <a:lstStyle/>
+          <a:p>
+            <a:pPr>
+              <a:lnSpc>
+                <a:spcPts val="1425"/>
+              </a:lnSpc>
+              <a:buNone/>
+            </a:pPr>
+            <a:r>
+              <a:rPr lang="en-US" sz="1050" b="0" dirty="0">
+                <a:solidFill>
+                  <a:schemeClr val="tx2">
+                    <a:lumMod val="75000"/>
+                    <a:lumOff val="25000"/>
+                  </a:schemeClr>
+                </a:solidFill>
+                <a:effectLst/>
+                <a:latin typeface="Consolas" panose="020B0609020204030204" pitchFamily="49" charset="0"/>
+              </a:rPr>
+              <a:t>📊 Account Simulation Rules</a:t>
+            </a:r>
+          </a:p>
+          <a:p>
+            <a:pPr>
+              <a:lnSpc>
+                <a:spcPts val="1425"/>
+              </a:lnSpc>
+              <a:buNone/>
+            </a:pPr>
+            <a:r>
+              <a:rPr lang="en-US" sz="1050" b="0" dirty="0">
+                <a:solidFill>
+                  <a:schemeClr val="tx2">
+                    <a:lumMod val="75000"/>
+                    <a:lumOff val="25000"/>
+                  </a:schemeClr>
+                </a:solidFill>
+                <a:effectLst/>
+                <a:latin typeface="Consolas" panose="020B0609020204030204" pitchFamily="49" charset="0"/>
+              </a:rPr>
+              <a:t>|----------------------------|----------------|</a:t>
+            </a:r>
+          </a:p>
+          <a:p>
+            <a:pPr>
+              <a:lnSpc>
+                <a:spcPts val="1425"/>
+              </a:lnSpc>
+              <a:buNone/>
+            </a:pPr>
+            <a:r>
+              <a:rPr lang="en-US" sz="1050" b="0" dirty="0">
+                <a:solidFill>
+                  <a:schemeClr val="tx2">
+                    <a:lumMod val="75000"/>
+                    <a:lumOff val="25000"/>
+                  </a:schemeClr>
+                </a:solidFill>
+                <a:effectLst/>
+                <a:latin typeface="Consolas" panose="020B0609020204030204" pitchFamily="49" charset="0"/>
+              </a:rPr>
+              <a:t>| Parameter                  | Value          |</a:t>
+            </a:r>
+          </a:p>
+          <a:p>
+            <a:pPr>
+              <a:lnSpc>
+                <a:spcPts val="1425"/>
+              </a:lnSpc>
+              <a:buNone/>
+            </a:pPr>
+            <a:r>
+              <a:rPr lang="en-US" sz="1050" b="0" dirty="0">
+                <a:solidFill>
+                  <a:schemeClr val="tx2">
+                    <a:lumMod val="75000"/>
+                    <a:lumOff val="25000"/>
+                  </a:schemeClr>
+                </a:solidFill>
+                <a:effectLst/>
+                <a:latin typeface="Consolas" panose="020B0609020204030204" pitchFamily="49" charset="0"/>
+              </a:rPr>
+              <a:t>|----------------------------|----------------|</a:t>
+            </a:r>
+          </a:p>
+          <a:p>
+            <a:pPr>
+              <a:lnSpc>
+                <a:spcPts val="1425"/>
+              </a:lnSpc>
+              <a:buNone/>
+            </a:pPr>
+            <a:r>
+              <a:rPr lang="en-US" sz="1050" b="0" dirty="0">
+                <a:solidFill>
+                  <a:schemeClr val="tx2">
+                    <a:lumMod val="75000"/>
+                    <a:lumOff val="25000"/>
+                  </a:schemeClr>
+                </a:solidFill>
+                <a:effectLst/>
+                <a:latin typeface="Consolas" panose="020B0609020204030204" pitchFamily="49" charset="0"/>
+              </a:rPr>
+              <a:t>| Start Date                 | 01/01/2020     |</a:t>
+            </a:r>
+          </a:p>
+          <a:p>
+            <a:pPr>
+              <a:lnSpc>
+                <a:spcPts val="1425"/>
+              </a:lnSpc>
+              <a:buNone/>
+            </a:pPr>
+            <a:r>
+              <a:rPr lang="en-US" sz="1050" b="0" dirty="0">
+                <a:solidFill>
+                  <a:schemeClr val="tx2">
+                    <a:lumMod val="75000"/>
+                    <a:lumOff val="25000"/>
+                  </a:schemeClr>
+                </a:solidFill>
+                <a:effectLst/>
+                <a:latin typeface="Consolas" panose="020B0609020204030204" pitchFamily="49" charset="0"/>
+              </a:rPr>
+              <a:t>| End Date (Early Exit)      | 10/28/2025     |</a:t>
+            </a:r>
+          </a:p>
+          <a:p>
+            <a:pPr>
+              <a:lnSpc>
+                <a:spcPts val="1425"/>
+              </a:lnSpc>
+              <a:buNone/>
+            </a:pPr>
+            <a:r>
+              <a:rPr lang="en-US" sz="1050" b="0" dirty="0">
+                <a:solidFill>
+                  <a:schemeClr val="tx2">
+                    <a:lumMod val="75000"/>
+                    <a:lumOff val="25000"/>
+                  </a:schemeClr>
+                </a:solidFill>
+                <a:effectLst/>
+                <a:latin typeface="Consolas" panose="020B0609020204030204" pitchFamily="49" charset="0"/>
+              </a:rPr>
+              <a:t>| Initial Cash               | $ 1,000,000.00 |</a:t>
+            </a:r>
+          </a:p>
+          <a:p>
+            <a:pPr>
+              <a:lnSpc>
+                <a:spcPts val="1425"/>
+              </a:lnSpc>
+              <a:buNone/>
+            </a:pPr>
+            <a:r>
+              <a:rPr lang="en-US" sz="1050" b="0" dirty="0">
+                <a:solidFill>
+                  <a:schemeClr val="tx2">
+                    <a:lumMod val="75000"/>
+                    <a:lumOff val="25000"/>
+                  </a:schemeClr>
+                </a:solidFill>
+                <a:effectLst/>
+                <a:latin typeface="Consolas" panose="020B0609020204030204" pitchFamily="49" charset="0"/>
+              </a:rPr>
+              <a:t>| Max Puts/Account           |             36 |</a:t>
+            </a:r>
+          </a:p>
+          <a:p>
+            <a:pPr>
+              <a:lnSpc>
+                <a:spcPts val="1425"/>
+              </a:lnSpc>
+              <a:buNone/>
+            </a:pPr>
+            <a:r>
+              <a:rPr lang="en-US" sz="1050" b="0" dirty="0">
+                <a:solidFill>
+                  <a:schemeClr val="tx2">
+                    <a:lumMod val="75000"/>
+                    <a:lumOff val="25000"/>
+                  </a:schemeClr>
+                </a:solidFill>
+                <a:effectLst/>
+                <a:latin typeface="Consolas" panose="020B0609020204030204" pitchFamily="49" charset="0"/>
+              </a:rPr>
+              <a:t>| Max Puts/Stock             |              7 |</a:t>
+            </a:r>
+          </a:p>
+          <a:p>
+            <a:pPr>
+              <a:lnSpc>
+                <a:spcPts val="1425"/>
+              </a:lnSpc>
+              <a:buNone/>
+            </a:pPr>
+            <a:r>
+              <a:rPr lang="en-US" sz="1050" b="0" dirty="0">
+                <a:solidFill>
+                  <a:schemeClr val="tx2">
+                    <a:lumMod val="75000"/>
+                    <a:lumOff val="25000"/>
+                  </a:schemeClr>
+                </a:solidFill>
+                <a:effectLst/>
+                <a:latin typeface="Consolas" panose="020B0609020204030204" pitchFamily="49" charset="0"/>
+              </a:rPr>
+              <a:t>| Max Puts/Day               |              5 |</a:t>
+            </a:r>
+          </a:p>
+          <a:p>
+            <a:pPr>
+              <a:lnSpc>
+                <a:spcPts val="1425"/>
+              </a:lnSpc>
+              <a:buNone/>
+            </a:pPr>
+            <a:r>
+              <a:rPr lang="en-US" sz="1050" b="0" dirty="0">
+                <a:solidFill>
+                  <a:schemeClr val="tx2">
+                    <a:lumMod val="75000"/>
+                    <a:lumOff val="25000"/>
+                  </a:schemeClr>
+                </a:solidFill>
+                <a:effectLst/>
+                <a:latin typeface="Consolas" panose="020B0609020204030204" pitchFamily="49" charset="0"/>
+              </a:rPr>
+              <a:t>| Wrapper Sweep +/- Step %   |        3.0000% |</a:t>
+            </a:r>
+          </a:p>
+          <a:p>
+            <a:pPr>
+              <a:lnSpc>
+                <a:spcPts val="1425"/>
+              </a:lnSpc>
+              <a:buNone/>
+            </a:pPr>
+            <a:r>
+              <a:rPr lang="en-US" sz="1050" b="0" dirty="0">
+                <a:solidFill>
+                  <a:schemeClr val="tx2">
+                    <a:lumMod val="75000"/>
+                    <a:lumOff val="25000"/>
+                  </a:schemeClr>
+                </a:solidFill>
+                <a:effectLst/>
+                <a:latin typeface="Consolas" panose="020B0609020204030204" pitchFamily="49" charset="0"/>
+              </a:rPr>
+              <a:t>|----------------------------|----------------|</a:t>
+            </a:r>
+          </a:p>
+          <a:p>
+            <a:pPr>
+              <a:lnSpc>
+                <a:spcPts val="1425"/>
+              </a:lnSpc>
+              <a:buNone/>
+            </a:pPr>
+            <a:br>
+              <a:rPr lang="en-US" sz="1050" b="0" dirty="0">
+                <a:solidFill>
+                  <a:schemeClr val="tx2">
+                    <a:lumMod val="75000"/>
+                    <a:lumOff val="25000"/>
+                  </a:schemeClr>
+                </a:solidFill>
+                <a:effectLst/>
+                <a:latin typeface="Consolas" panose="020B0609020204030204" pitchFamily="49" charset="0"/>
+              </a:rPr>
+            </a:br>
+            <a:endParaRPr lang="en-US" sz="1050" b="0" dirty="0">
+              <a:solidFill>
+                <a:schemeClr val="tx2">
+                  <a:lumMod val="75000"/>
+                  <a:lumOff val="25000"/>
+                </a:schemeClr>
+              </a:solidFill>
+              <a:effectLst/>
+              <a:latin typeface="Consolas" panose="020B0609020204030204" pitchFamily="49" charset="0"/>
+            </a:endParaRPr>
+          </a:p>
+          <a:p>
+            <a:pPr>
+              <a:lnSpc>
+                <a:spcPts val="1425"/>
+              </a:lnSpc>
+              <a:buNone/>
+            </a:pPr>
+            <a:r>
+              <a:rPr lang="en-US" sz="1050" b="0" dirty="0">
+                <a:solidFill>
+                  <a:schemeClr val="tx2">
+                    <a:lumMod val="75000"/>
+                    <a:lumOff val="25000"/>
+                  </a:schemeClr>
+                </a:solidFill>
+                <a:effectLst/>
+                <a:latin typeface="Consolas" panose="020B0609020204030204" pitchFamily="49" charset="0"/>
+              </a:rPr>
+              <a:t>🧩 Entry Underlying Stock Rules</a:t>
+            </a:r>
+          </a:p>
+          <a:p>
+            <a:pPr>
+              <a:lnSpc>
+                <a:spcPts val="1425"/>
+              </a:lnSpc>
+              <a:buNone/>
+            </a:pPr>
+            <a:r>
+              <a:rPr lang="en-US" sz="1050" b="0" dirty="0">
+                <a:solidFill>
+                  <a:schemeClr val="tx2">
+                    <a:lumMod val="75000"/>
+                    <a:lumOff val="25000"/>
+                  </a:schemeClr>
+                </a:solidFill>
+                <a:effectLst/>
+                <a:latin typeface="Consolas" panose="020B0609020204030204" pitchFamily="49" charset="0"/>
+              </a:rPr>
+              <a:t>|----------------------------|----------------|</a:t>
+            </a:r>
+          </a:p>
+          <a:p>
+            <a:pPr>
+              <a:lnSpc>
+                <a:spcPts val="1425"/>
+              </a:lnSpc>
+              <a:buNone/>
+            </a:pPr>
+            <a:r>
+              <a:rPr lang="en-US" sz="1050" b="0" dirty="0">
+                <a:solidFill>
+                  <a:schemeClr val="tx2">
+                    <a:lumMod val="75000"/>
+                    <a:lumOff val="25000"/>
+                  </a:schemeClr>
+                </a:solidFill>
+                <a:effectLst/>
+                <a:latin typeface="Consolas" panose="020B0609020204030204" pitchFamily="49" charset="0"/>
+              </a:rPr>
+              <a:t>| Parameter                  | Value          |</a:t>
+            </a:r>
+          </a:p>
+          <a:p>
+            <a:pPr>
+              <a:lnSpc>
+                <a:spcPts val="1425"/>
+              </a:lnSpc>
+              <a:buNone/>
+            </a:pPr>
+            <a:r>
+              <a:rPr lang="en-US" sz="1050" b="0" dirty="0">
+                <a:solidFill>
+                  <a:schemeClr val="tx2">
+                    <a:lumMod val="75000"/>
+                    <a:lumOff val="25000"/>
+                  </a:schemeClr>
+                </a:solidFill>
+                <a:effectLst/>
+                <a:latin typeface="Consolas" panose="020B0609020204030204" pitchFamily="49" charset="0"/>
+              </a:rPr>
+              <a:t>|----------------------------|----------------|</a:t>
+            </a:r>
+          </a:p>
+          <a:p>
+            <a:pPr>
+              <a:lnSpc>
+                <a:spcPts val="1425"/>
+              </a:lnSpc>
+              <a:buNone/>
+            </a:pPr>
+            <a:r>
+              <a:rPr lang="en-US" sz="1050" b="0" dirty="0">
+                <a:solidFill>
+                  <a:schemeClr val="tx2">
+                    <a:lumMod val="75000"/>
+                    <a:lumOff val="25000"/>
+                  </a:schemeClr>
+                </a:solidFill>
+                <a:effectLst/>
+                <a:latin typeface="Consolas" panose="020B0609020204030204" pitchFamily="49" charset="0"/>
+              </a:rPr>
+              <a:t>| Min 5-Day Rise             |        -19.75% |</a:t>
+            </a:r>
+          </a:p>
+          <a:p>
+            <a:pPr>
+              <a:lnSpc>
+                <a:spcPts val="1425"/>
+              </a:lnSpc>
+              <a:buNone/>
+            </a:pPr>
+            <a:r>
+              <a:rPr lang="en-US" sz="1050" b="0" dirty="0">
+                <a:solidFill>
+                  <a:schemeClr val="tx2">
+                    <a:lumMod val="75000"/>
+                    <a:lumOff val="25000"/>
+                  </a:schemeClr>
+                </a:solidFill>
+                <a:effectLst/>
+                <a:latin typeface="Consolas" panose="020B0609020204030204" pitchFamily="49" charset="0"/>
+              </a:rPr>
+              <a:t>| Min Above Avg              |         -4.39% |</a:t>
+            </a:r>
+          </a:p>
+          <a:p>
+            <a:pPr>
+              <a:lnSpc>
+                <a:spcPts val="1425"/>
+              </a:lnSpc>
+              <a:buNone/>
+            </a:pPr>
+            <a:r>
+              <a:rPr lang="en-US" sz="1050" b="0" dirty="0">
+                <a:solidFill>
+                  <a:schemeClr val="tx2">
+                    <a:lumMod val="75000"/>
+                    <a:lumOff val="25000"/>
+                  </a:schemeClr>
+                </a:solidFill>
+                <a:effectLst/>
+                <a:latin typeface="Consolas" panose="020B0609020204030204" pitchFamily="49" charset="0"/>
+              </a:rPr>
+              <a:t>| Max Above Avg              |         41.00% |</a:t>
+            </a:r>
+          </a:p>
+          <a:p>
+            <a:pPr>
+              <a:lnSpc>
+                <a:spcPts val="1425"/>
+              </a:lnSpc>
+              <a:buNone/>
+            </a:pPr>
+            <a:r>
+              <a:rPr lang="en-US" sz="1050" b="0" dirty="0">
+                <a:solidFill>
+                  <a:schemeClr val="tx2">
+                    <a:lumMod val="75000"/>
+                    <a:lumOff val="25000"/>
+                  </a:schemeClr>
+                </a:solidFill>
+                <a:effectLst/>
+                <a:latin typeface="Consolas" panose="020B0609020204030204" pitchFamily="49" charset="0"/>
+              </a:rPr>
+              <a:t>| Min 10-Day Avg Slope       |       -0.1010% |</a:t>
+            </a:r>
+          </a:p>
+          <a:p>
+            <a:pPr>
+              <a:lnSpc>
+                <a:spcPts val="1425"/>
+              </a:lnSpc>
+              <a:buNone/>
+            </a:pPr>
+            <a:r>
+              <a:rPr lang="en-US" sz="1050" b="0" dirty="0">
+                <a:solidFill>
+                  <a:schemeClr val="tx2">
+                    <a:lumMod val="75000"/>
+                    <a:lumOff val="25000"/>
+                  </a:schemeClr>
+                </a:solidFill>
+                <a:effectLst/>
+                <a:latin typeface="Consolas" panose="020B0609020204030204" pitchFamily="49" charset="0"/>
+              </a:rPr>
+              <a:t>| Min Stock Price            | $        27.96 |</a:t>
+            </a:r>
+          </a:p>
+          <a:p>
+            <a:pPr>
+              <a:lnSpc>
+                <a:spcPts val="1425"/>
+              </a:lnSpc>
+              <a:buNone/>
+            </a:pPr>
+            <a:r>
+              <a:rPr lang="en-US" sz="1050" b="0" dirty="0">
+                <a:solidFill>
+                  <a:schemeClr val="tx2">
+                    <a:lumMod val="75000"/>
+                    <a:lumOff val="25000"/>
+                  </a:schemeClr>
+                </a:solidFill>
+                <a:effectLst/>
+                <a:latin typeface="Consolas" panose="020B0609020204030204" pitchFamily="49" charset="0"/>
+              </a:rPr>
+              <a:t>|----------------------------|----------------|</a:t>
+            </a:r>
+          </a:p>
+          <a:p>
+            <a:pPr>
+              <a:lnSpc>
+                <a:spcPts val="1425"/>
+              </a:lnSpc>
+              <a:buNone/>
+            </a:pPr>
+            <a:br>
+              <a:rPr lang="en-US" sz="1050" b="0" dirty="0">
+                <a:solidFill>
+                  <a:schemeClr val="tx2">
+                    <a:lumMod val="75000"/>
+                    <a:lumOff val="25000"/>
+                  </a:schemeClr>
+                </a:solidFill>
+                <a:effectLst/>
+                <a:latin typeface="Consolas" panose="020B0609020204030204" pitchFamily="49" charset="0"/>
+              </a:rPr>
+            </a:br>
+            <a:endParaRPr lang="en-US" sz="1050" b="0" dirty="0">
+              <a:solidFill>
+                <a:schemeClr val="tx2">
+                  <a:lumMod val="75000"/>
+                  <a:lumOff val="25000"/>
+                </a:schemeClr>
+              </a:solidFill>
+              <a:effectLst/>
+              <a:latin typeface="Consolas" panose="020B0609020204030204" pitchFamily="49" charset="0"/>
+            </a:endParaRPr>
+          </a:p>
+        </p:txBody>
+      </p:sp>
+      <p:sp>
+        <p:nvSpPr>
+          <p:cNvPr id="12" name="TextBox 11">
+            <a:extLst>
+              <a:ext uri="{FF2B5EF4-FFF2-40B4-BE49-F238E27FC236}">
+                <a16:creationId xmlns:a16="http://schemas.microsoft.com/office/drawing/2014/main" id="{297BC771-2D1E-E493-B614-13DAE464065C}"/>
+              </a:ext>
+            </a:extLst>
+          </p:cNvPr>
+          <p:cNvSpPr txBox="1"/>
+          <p:nvPr/>
+        </p:nvSpPr>
+        <p:spPr>
+          <a:xfrm>
+            <a:off x="4319121" y="790121"/>
+            <a:ext cx="3695161" cy="3672800"/>
+          </a:xfrm>
+          <a:prstGeom prst="rect">
+            <a:avLst/>
+          </a:prstGeom>
+          <a:noFill/>
+        </p:spPr>
+        <p:txBody>
+          <a:bodyPr wrap="square">
+            <a:spAutoFit/>
+          </a:bodyPr>
+          <a:lstStyle/>
+          <a:p>
+            <a:pPr>
+              <a:lnSpc>
+                <a:spcPts val="1425"/>
+              </a:lnSpc>
+              <a:buNone/>
+            </a:pPr>
+            <a:r>
+              <a:rPr lang="en-US" sz="1050" b="0" dirty="0">
+                <a:solidFill>
+                  <a:schemeClr val="tx2">
+                    <a:lumMod val="75000"/>
+                    <a:lumOff val="25000"/>
+                  </a:schemeClr>
+                </a:solidFill>
+                <a:effectLst/>
+                <a:latin typeface="Consolas" panose="020B0609020204030204" pitchFamily="49" charset="0"/>
+              </a:rPr>
+              <a:t>📈 Entry Put Position Rules</a:t>
+            </a:r>
+          </a:p>
+          <a:p>
+            <a:pPr>
+              <a:lnSpc>
+                <a:spcPts val="1425"/>
+              </a:lnSpc>
+              <a:buNone/>
+            </a:pPr>
+            <a:r>
+              <a:rPr lang="en-US" sz="1050" b="0" dirty="0">
+                <a:solidFill>
+                  <a:schemeClr val="tx2">
+                    <a:lumMod val="75000"/>
+                    <a:lumOff val="25000"/>
+                  </a:schemeClr>
+                </a:solidFill>
+                <a:effectLst/>
+                <a:latin typeface="Consolas" panose="020B0609020204030204" pitchFamily="49" charset="0"/>
+              </a:rPr>
+              <a:t>|----------------------------|----------------|</a:t>
+            </a:r>
+          </a:p>
+          <a:p>
+            <a:pPr>
+              <a:lnSpc>
+                <a:spcPts val="1425"/>
+              </a:lnSpc>
+              <a:buNone/>
+            </a:pPr>
+            <a:r>
+              <a:rPr lang="en-US" sz="1050" b="0" dirty="0">
+                <a:solidFill>
+                  <a:schemeClr val="tx2">
+                    <a:lumMod val="75000"/>
+                    <a:lumOff val="25000"/>
+                  </a:schemeClr>
+                </a:solidFill>
+                <a:effectLst/>
+                <a:latin typeface="Consolas" panose="020B0609020204030204" pitchFamily="49" charset="0"/>
+              </a:rPr>
+              <a:t>| Parameter                  | Value          |</a:t>
+            </a:r>
+          </a:p>
+          <a:p>
+            <a:pPr>
+              <a:lnSpc>
+                <a:spcPts val="1425"/>
+              </a:lnSpc>
+              <a:buNone/>
+            </a:pPr>
+            <a:r>
+              <a:rPr lang="en-US" sz="1050" b="0" dirty="0">
+                <a:solidFill>
+                  <a:schemeClr val="tx2">
+                    <a:lumMod val="75000"/>
+                    <a:lumOff val="25000"/>
+                  </a:schemeClr>
+                </a:solidFill>
+                <a:effectLst/>
+                <a:latin typeface="Consolas" panose="020B0609020204030204" pitchFamily="49" charset="0"/>
+              </a:rPr>
+              <a:t>|----------------------------|----------------|</a:t>
+            </a:r>
+          </a:p>
+          <a:p>
+            <a:pPr>
+              <a:lnSpc>
+                <a:spcPts val="1425"/>
+              </a:lnSpc>
+              <a:buNone/>
+            </a:pPr>
+            <a:r>
+              <a:rPr lang="en-US" sz="1050" b="0" dirty="0">
+                <a:solidFill>
+                  <a:schemeClr val="tx2">
+                    <a:lumMod val="75000"/>
+                    <a:lumOff val="25000"/>
+                  </a:schemeClr>
+                </a:solidFill>
+                <a:effectLst/>
+                <a:latin typeface="Consolas" panose="020B0609020204030204" pitchFamily="49" charset="0"/>
+              </a:rPr>
+              <a:t>| Min DTE                    |             50 |</a:t>
+            </a:r>
+          </a:p>
+          <a:p>
+            <a:pPr>
+              <a:lnSpc>
+                <a:spcPts val="1425"/>
+              </a:lnSpc>
+              <a:buNone/>
+            </a:pPr>
+            <a:r>
+              <a:rPr lang="en-US" sz="1050" b="0" dirty="0">
+                <a:solidFill>
+                  <a:schemeClr val="tx2">
+                    <a:lumMod val="75000"/>
+                    <a:lumOff val="25000"/>
+                  </a:schemeClr>
+                </a:solidFill>
+                <a:effectLst/>
+                <a:latin typeface="Consolas" panose="020B0609020204030204" pitchFamily="49" charset="0"/>
+              </a:rPr>
+              <a:t>| Max DTE                    |            260 |</a:t>
+            </a:r>
+          </a:p>
+          <a:p>
+            <a:pPr>
+              <a:lnSpc>
+                <a:spcPts val="1425"/>
+              </a:lnSpc>
+              <a:buNone/>
+            </a:pPr>
+            <a:r>
+              <a:rPr lang="en-US" sz="1050" b="0" dirty="0">
+                <a:solidFill>
+                  <a:schemeClr val="tx2">
+                    <a:lumMod val="75000"/>
+                    <a:lumOff val="25000"/>
+                  </a:schemeClr>
+                </a:solidFill>
+                <a:effectLst/>
+                <a:latin typeface="Consolas" panose="020B0609020204030204" pitchFamily="49" charset="0"/>
+              </a:rPr>
+              <a:t>| Min Put Bid Price          | $       3.2517 |</a:t>
+            </a:r>
+          </a:p>
+          <a:p>
+            <a:pPr>
+              <a:lnSpc>
+                <a:spcPts val="1425"/>
+              </a:lnSpc>
+              <a:buNone/>
+            </a:pPr>
+            <a:r>
+              <a:rPr lang="en-US" sz="1050" b="0" dirty="0">
+                <a:solidFill>
+                  <a:schemeClr val="tx2">
+                    <a:lumMod val="75000"/>
+                    <a:lumOff val="25000"/>
+                  </a:schemeClr>
+                </a:solidFill>
+                <a:effectLst/>
+                <a:latin typeface="Consolas" panose="020B0609020204030204" pitchFamily="49" charset="0"/>
+              </a:rPr>
+              <a:t>| Min Put Delta              |      -25.0000% |</a:t>
+            </a:r>
+          </a:p>
+          <a:p>
+            <a:pPr>
+              <a:lnSpc>
+                <a:spcPts val="1425"/>
+              </a:lnSpc>
+              <a:buNone/>
+            </a:pPr>
+            <a:r>
+              <a:rPr lang="en-US" sz="1050" b="0" dirty="0">
+                <a:solidFill>
+                  <a:schemeClr val="tx2">
+                    <a:lumMod val="75000"/>
+                    <a:lumOff val="25000"/>
+                  </a:schemeClr>
+                </a:solidFill>
+                <a:effectLst/>
+                <a:latin typeface="Consolas" panose="020B0609020204030204" pitchFamily="49" charset="0"/>
+              </a:rPr>
+              <a:t>| Max Put Delta              |       -1.0000% |</a:t>
+            </a:r>
+          </a:p>
+          <a:p>
+            <a:pPr>
+              <a:lnSpc>
+                <a:spcPts val="1425"/>
+              </a:lnSpc>
+              <a:buNone/>
+            </a:pPr>
+            <a:r>
+              <a:rPr lang="en-US" sz="1050" b="0" dirty="0">
+                <a:solidFill>
+                  <a:schemeClr val="tx2">
+                    <a:lumMod val="75000"/>
+                    <a:lumOff val="25000"/>
+                  </a:schemeClr>
+                </a:solidFill>
+                <a:effectLst/>
+                <a:latin typeface="Consolas" panose="020B0609020204030204" pitchFamily="49" charset="0"/>
+              </a:rPr>
+              <a:t>| Max Bid-Ask Spread         |       55.4300% |</a:t>
+            </a:r>
+          </a:p>
+          <a:p>
+            <a:pPr>
+              <a:lnSpc>
+                <a:spcPts val="1425"/>
+              </a:lnSpc>
+              <a:buNone/>
+            </a:pPr>
+            <a:r>
+              <a:rPr lang="en-US" sz="1050" b="0" dirty="0">
+                <a:solidFill>
+                  <a:schemeClr val="tx2">
+                    <a:lumMod val="75000"/>
+                    <a:lumOff val="25000"/>
+                  </a:schemeClr>
+                </a:solidFill>
+                <a:effectLst/>
+                <a:latin typeface="Consolas" panose="020B0609020204030204" pitchFamily="49" charset="0"/>
+              </a:rPr>
+              <a:t>| Min Avg Above Strike       |       -3.4000% |</a:t>
+            </a:r>
+          </a:p>
+          <a:p>
+            <a:pPr>
+              <a:lnSpc>
+                <a:spcPts val="1425"/>
+              </a:lnSpc>
+              <a:buNone/>
+            </a:pPr>
+            <a:r>
+              <a:rPr lang="en-US" sz="1050" b="0" dirty="0">
+                <a:solidFill>
+                  <a:schemeClr val="tx2">
+                    <a:lumMod val="75000"/>
+                    <a:lumOff val="25000"/>
+                  </a:schemeClr>
+                </a:solidFill>
+                <a:effectLst/>
+                <a:latin typeface="Consolas" panose="020B0609020204030204" pitchFamily="49" charset="0"/>
+              </a:rPr>
+              <a:t>| Min Risk/Reward Ratio      |       -11.0250 |</a:t>
+            </a:r>
+          </a:p>
+          <a:p>
+            <a:pPr>
+              <a:lnSpc>
+                <a:spcPts val="1425"/>
+              </a:lnSpc>
+              <a:buNone/>
+            </a:pPr>
+            <a:r>
+              <a:rPr lang="en-US" sz="1050" b="0" dirty="0">
+                <a:solidFill>
+                  <a:schemeClr val="tx2">
+                    <a:lumMod val="75000"/>
+                    <a:lumOff val="25000"/>
+                  </a:schemeClr>
+                </a:solidFill>
+                <a:effectLst/>
+                <a:latin typeface="Consolas" panose="020B0609020204030204" pitchFamily="49" charset="0"/>
+              </a:rPr>
+              <a:t>| Min Annual Risk            |       -15.3000 |</a:t>
+            </a:r>
+          </a:p>
+          <a:p>
+            <a:pPr>
+              <a:lnSpc>
+                <a:spcPts val="1425"/>
+              </a:lnSpc>
+              <a:buNone/>
+            </a:pPr>
+            <a:r>
+              <a:rPr lang="en-US" sz="1050" b="0" dirty="0">
+                <a:solidFill>
+                  <a:schemeClr val="tx2">
+                    <a:lumMod val="75000"/>
+                    <a:lumOff val="25000"/>
+                  </a:schemeClr>
+                </a:solidFill>
+                <a:effectLst/>
+                <a:latin typeface="Consolas" panose="020B0609020204030204" pitchFamily="49" charset="0"/>
+              </a:rPr>
+              <a:t>| Min Rev Annual Risk        |        -8.0000 |</a:t>
+            </a:r>
+          </a:p>
+          <a:p>
+            <a:pPr>
+              <a:lnSpc>
+                <a:spcPts val="1425"/>
+              </a:lnSpc>
+              <a:buNone/>
+            </a:pPr>
+            <a:r>
+              <a:rPr lang="en-US" sz="1050" b="0" dirty="0">
+                <a:solidFill>
+                  <a:schemeClr val="tx2">
+                    <a:lumMod val="75000"/>
+                    <a:lumOff val="25000"/>
+                  </a:schemeClr>
+                </a:solidFill>
+                <a:effectLst/>
+                <a:latin typeface="Consolas" panose="020B0609020204030204" pitchFamily="49" charset="0"/>
+              </a:rPr>
+              <a:t>| Min Expected Profit        |     -100.0000% |</a:t>
+            </a:r>
+          </a:p>
+          <a:p>
+            <a:pPr>
+              <a:lnSpc>
+                <a:spcPts val="1425"/>
+              </a:lnSpc>
+              <a:buNone/>
+            </a:pPr>
+            <a:r>
+              <a:rPr lang="en-US" sz="1050" b="0" dirty="0">
+                <a:solidFill>
+                  <a:schemeClr val="tx2">
+                    <a:lumMod val="75000"/>
+                    <a:lumOff val="25000"/>
+                  </a:schemeClr>
+                </a:solidFill>
+                <a:effectLst/>
+                <a:latin typeface="Consolas" panose="020B0609020204030204" pitchFamily="49" charset="0"/>
+              </a:rPr>
+              <a:t>| Rank By Risk/Reward Ratio  |            Yes |</a:t>
+            </a:r>
+          </a:p>
+          <a:p>
+            <a:pPr>
+              <a:lnSpc>
+                <a:spcPts val="1425"/>
+              </a:lnSpc>
+              <a:buNone/>
+            </a:pPr>
+            <a:r>
+              <a:rPr lang="en-US" sz="1050" b="0" dirty="0">
+                <a:solidFill>
+                  <a:schemeClr val="tx2">
+                    <a:lumMod val="75000"/>
+                    <a:lumOff val="25000"/>
+                  </a:schemeClr>
+                </a:solidFill>
+                <a:effectLst/>
+                <a:latin typeface="Consolas" panose="020B0609020204030204" pitchFamily="49" charset="0"/>
+              </a:rPr>
+              <a:t>| Rank By Annual Risk        |             No |</a:t>
+            </a:r>
+          </a:p>
+          <a:p>
+            <a:pPr>
+              <a:lnSpc>
+                <a:spcPts val="1425"/>
+              </a:lnSpc>
+              <a:buNone/>
+            </a:pPr>
+            <a:r>
+              <a:rPr lang="en-US" sz="1050" b="0" dirty="0">
+                <a:solidFill>
+                  <a:schemeClr val="tx2">
+                    <a:lumMod val="75000"/>
+                    <a:lumOff val="25000"/>
+                  </a:schemeClr>
+                </a:solidFill>
+                <a:effectLst/>
+                <a:latin typeface="Consolas" panose="020B0609020204030204" pitchFamily="49" charset="0"/>
+              </a:rPr>
+              <a:t>| Rank By Rev Annual Risk    |             No |</a:t>
+            </a:r>
+          </a:p>
+          <a:p>
+            <a:pPr>
+              <a:lnSpc>
+                <a:spcPts val="1425"/>
+              </a:lnSpc>
+              <a:buNone/>
+            </a:pPr>
+            <a:r>
+              <a:rPr lang="en-US" sz="1050" b="0" dirty="0">
+                <a:solidFill>
+                  <a:schemeClr val="tx2">
+                    <a:lumMod val="75000"/>
+                    <a:lumOff val="25000"/>
+                  </a:schemeClr>
+                </a:solidFill>
+                <a:effectLst/>
+                <a:latin typeface="Consolas" panose="020B0609020204030204" pitchFamily="49" charset="0"/>
+              </a:rPr>
+              <a:t>| Rank By Expected Profit    |             No |</a:t>
+            </a:r>
+          </a:p>
+          <a:p>
+            <a:pPr>
+              <a:lnSpc>
+                <a:spcPts val="1425"/>
+              </a:lnSpc>
+              <a:buNone/>
+            </a:pPr>
+            <a:r>
+              <a:rPr lang="en-US" sz="1050" b="0" dirty="0">
+                <a:solidFill>
+                  <a:schemeClr val="tx2">
+                    <a:lumMod val="75000"/>
+                    <a:lumOff val="25000"/>
+                  </a:schemeClr>
+                </a:solidFill>
+                <a:effectLst/>
+                <a:latin typeface="Consolas" panose="020B0609020204030204" pitchFamily="49" charset="0"/>
+              </a:rPr>
+              <a:t>|----------------------------|----------------|</a:t>
+            </a:r>
+          </a:p>
+        </p:txBody>
+      </p:sp>
+      <p:sp>
+        <p:nvSpPr>
+          <p:cNvPr id="13" name="TextBox 12">
+            <a:extLst>
+              <a:ext uri="{FF2B5EF4-FFF2-40B4-BE49-F238E27FC236}">
+                <a16:creationId xmlns:a16="http://schemas.microsoft.com/office/drawing/2014/main" id="{0F06A09B-37B4-660B-7A0D-7094531442A2}"/>
+              </a:ext>
+            </a:extLst>
+          </p:cNvPr>
+          <p:cNvSpPr txBox="1"/>
+          <p:nvPr/>
+        </p:nvSpPr>
+        <p:spPr>
+          <a:xfrm>
+            <a:off x="8336438" y="790121"/>
+            <a:ext cx="3695161" cy="3493264"/>
+          </a:xfrm>
+          <a:prstGeom prst="rect">
+            <a:avLst/>
+          </a:prstGeom>
+          <a:noFill/>
+        </p:spPr>
+        <p:txBody>
+          <a:bodyPr wrap="square">
+            <a:spAutoFit/>
+          </a:bodyPr>
+          <a:lstStyle/>
+          <a:p>
+            <a:pPr>
+              <a:lnSpc>
+                <a:spcPts val="1425"/>
+              </a:lnSpc>
+              <a:buNone/>
+            </a:pPr>
+            <a:r>
+              <a:rPr lang="en-US" sz="1050" b="0" dirty="0">
+                <a:solidFill>
+                  <a:schemeClr val="tx2">
+                    <a:lumMod val="75000"/>
+                    <a:lumOff val="25000"/>
+                  </a:schemeClr>
+                </a:solidFill>
+                <a:effectLst/>
+                <a:latin typeface="Consolas" panose="020B0609020204030204" pitchFamily="49" charset="0"/>
+              </a:rPr>
+              <a:t>📉 Exit Put Position Rules</a:t>
+            </a:r>
+          </a:p>
+          <a:p>
+            <a:pPr>
+              <a:lnSpc>
+                <a:spcPts val="1425"/>
+              </a:lnSpc>
+              <a:buNone/>
+            </a:pPr>
+            <a:r>
+              <a:rPr lang="en-US" sz="1050" b="0" dirty="0">
+                <a:solidFill>
+                  <a:schemeClr val="tx2">
+                    <a:lumMod val="75000"/>
+                    <a:lumOff val="25000"/>
+                  </a:schemeClr>
+                </a:solidFill>
+                <a:effectLst/>
+                <a:latin typeface="Consolas" panose="020B0609020204030204" pitchFamily="49" charset="0"/>
+              </a:rPr>
+              <a:t>|----------------------------|----------------|</a:t>
+            </a:r>
+          </a:p>
+          <a:p>
+            <a:pPr>
+              <a:lnSpc>
+                <a:spcPts val="1425"/>
+              </a:lnSpc>
+              <a:buNone/>
+            </a:pPr>
+            <a:r>
+              <a:rPr lang="en-US" sz="1050" b="0" dirty="0">
+                <a:solidFill>
+                  <a:schemeClr val="tx2">
+                    <a:lumMod val="75000"/>
+                    <a:lumOff val="25000"/>
+                  </a:schemeClr>
+                </a:solidFill>
+                <a:effectLst/>
+                <a:latin typeface="Consolas" panose="020B0609020204030204" pitchFamily="49" charset="0"/>
+              </a:rPr>
+              <a:t>| Parameter                  | Value          |</a:t>
+            </a:r>
+          </a:p>
+          <a:p>
+            <a:pPr>
+              <a:lnSpc>
+                <a:spcPts val="1425"/>
+              </a:lnSpc>
+              <a:buNone/>
+            </a:pPr>
+            <a:r>
+              <a:rPr lang="en-US" sz="1050" b="0" dirty="0">
+                <a:solidFill>
+                  <a:schemeClr val="tx2">
+                    <a:lumMod val="75000"/>
+                    <a:lumOff val="25000"/>
+                  </a:schemeClr>
+                </a:solidFill>
+                <a:effectLst/>
+                <a:latin typeface="Consolas" panose="020B0609020204030204" pitchFamily="49" charset="0"/>
+              </a:rPr>
+              <a:t>|----------------------------|----------------|</a:t>
+            </a:r>
+          </a:p>
+          <a:p>
+            <a:pPr>
+              <a:lnSpc>
+                <a:spcPts val="1425"/>
+              </a:lnSpc>
+              <a:buNone/>
+            </a:pPr>
+            <a:r>
+              <a:rPr lang="en-US" sz="1050" b="0" dirty="0">
+                <a:solidFill>
+                  <a:schemeClr val="tx2">
+                    <a:lumMod val="75000"/>
+                    <a:lumOff val="25000"/>
+                  </a:schemeClr>
+                </a:solidFill>
+                <a:effectLst/>
+                <a:latin typeface="Consolas" panose="020B0609020204030204" pitchFamily="49" charset="0"/>
+              </a:rPr>
+              <a:t>| Position Stop Loss         |     9999.0000% |</a:t>
+            </a:r>
+          </a:p>
+          <a:p>
+            <a:pPr>
+              <a:lnSpc>
+                <a:spcPts val="1425"/>
+              </a:lnSpc>
+              <a:buNone/>
+            </a:pPr>
+            <a:r>
+              <a:rPr lang="en-US" sz="1050" b="0" dirty="0">
+                <a:solidFill>
+                  <a:schemeClr val="tx2">
+                    <a:lumMod val="75000"/>
+                    <a:lumOff val="25000"/>
+                  </a:schemeClr>
+                </a:solidFill>
+                <a:effectLst/>
+                <a:latin typeface="Consolas" panose="020B0609020204030204" pitchFamily="49" charset="0"/>
+              </a:rPr>
+              <a:t>| Stock Below SMA150         |       17.8560% |</a:t>
+            </a:r>
+          </a:p>
+          <a:p>
+            <a:pPr>
+              <a:lnSpc>
+                <a:spcPts val="1425"/>
+              </a:lnSpc>
+              <a:buNone/>
+            </a:pPr>
+            <a:r>
+              <a:rPr lang="en-US" sz="1050" b="0" dirty="0">
+                <a:solidFill>
+                  <a:schemeClr val="tx2">
+                    <a:lumMod val="75000"/>
+                    <a:lumOff val="25000"/>
+                  </a:schemeClr>
+                </a:solidFill>
+                <a:effectLst/>
+                <a:latin typeface="Consolas" panose="020B0609020204030204" pitchFamily="49" charset="0"/>
+              </a:rPr>
+              <a:t>| Stock Min Above Strike     |    -9999.0000% |</a:t>
+            </a:r>
+          </a:p>
+          <a:p>
+            <a:pPr>
+              <a:lnSpc>
+                <a:spcPts val="1425"/>
+              </a:lnSpc>
+              <a:buNone/>
+            </a:pPr>
+            <a:r>
+              <a:rPr lang="en-US" sz="1050" b="0" dirty="0">
+                <a:solidFill>
+                  <a:schemeClr val="tx2">
+                    <a:lumMod val="75000"/>
+                    <a:lumOff val="25000"/>
+                  </a:schemeClr>
+                </a:solidFill>
+                <a:effectLst/>
+                <a:latin typeface="Consolas" panose="020B0609020204030204" pitchFamily="49" charset="0"/>
+              </a:rPr>
+              <a:t>| Stock Max Below Entry      |       26.6000% |</a:t>
+            </a:r>
+          </a:p>
+          <a:p>
+            <a:pPr>
+              <a:lnSpc>
+                <a:spcPts val="1425"/>
+              </a:lnSpc>
+              <a:buNone/>
+            </a:pPr>
+            <a:r>
+              <a:rPr lang="en-US" sz="1050" b="0" dirty="0">
+                <a:solidFill>
+                  <a:schemeClr val="tx2">
+                    <a:lumMod val="75000"/>
+                    <a:lumOff val="25000"/>
+                  </a:schemeClr>
+                </a:solidFill>
+                <a:effectLst/>
+                <a:latin typeface="Consolas" panose="020B0609020204030204" pitchFamily="49" charset="0"/>
+              </a:rPr>
+              <a:t>| Min Gain to Take Profit    |     9999.0000% |</a:t>
+            </a:r>
+          </a:p>
+          <a:p>
+            <a:pPr>
+              <a:lnSpc>
+                <a:spcPts val="1425"/>
+              </a:lnSpc>
+              <a:buNone/>
+            </a:pPr>
+            <a:r>
+              <a:rPr lang="en-US" sz="1050" b="0" dirty="0">
+                <a:solidFill>
+                  <a:schemeClr val="tx2">
+                    <a:lumMod val="75000"/>
+                    <a:lumOff val="25000"/>
+                  </a:schemeClr>
+                </a:solidFill>
+                <a:effectLst/>
+                <a:latin typeface="Consolas" panose="020B0609020204030204" pitchFamily="49" charset="0"/>
+              </a:rPr>
+              <a:t>|----------------------------|----------------|</a:t>
+            </a:r>
+          </a:p>
+          <a:p>
+            <a:pPr>
+              <a:lnSpc>
+                <a:spcPts val="1425"/>
+              </a:lnSpc>
+              <a:buNone/>
+            </a:pPr>
+            <a:br>
+              <a:rPr lang="en-US" sz="1050" b="0" dirty="0">
+                <a:solidFill>
+                  <a:schemeClr val="tx2">
+                    <a:lumMod val="75000"/>
+                    <a:lumOff val="25000"/>
+                  </a:schemeClr>
+                </a:solidFill>
+                <a:effectLst/>
+                <a:latin typeface="Consolas" panose="020B0609020204030204" pitchFamily="49" charset="0"/>
+              </a:rPr>
+            </a:br>
+            <a:endParaRPr lang="en-US" sz="1050" b="0" dirty="0">
+              <a:solidFill>
+                <a:schemeClr val="tx2">
+                  <a:lumMod val="75000"/>
+                  <a:lumOff val="25000"/>
+                </a:schemeClr>
+              </a:solidFill>
+              <a:effectLst/>
+              <a:latin typeface="Consolas" panose="020B0609020204030204" pitchFamily="49" charset="0"/>
+            </a:endParaRPr>
+          </a:p>
+          <a:p>
+            <a:pPr>
+              <a:lnSpc>
+                <a:spcPts val="1425"/>
+              </a:lnSpc>
+              <a:buNone/>
+            </a:pPr>
+            <a:r>
+              <a:rPr lang="en-US" sz="1050" b="0" dirty="0">
+                <a:solidFill>
+                  <a:schemeClr val="tx2">
+                    <a:lumMod val="75000"/>
+                    <a:lumOff val="25000"/>
+                  </a:schemeClr>
+                </a:solidFill>
+                <a:effectLst/>
+                <a:latin typeface="Consolas" panose="020B0609020204030204" pitchFamily="49" charset="0"/>
+              </a:rPr>
+              <a:t>💰 Trading Parameters</a:t>
+            </a:r>
+          </a:p>
+          <a:p>
+            <a:pPr>
+              <a:lnSpc>
+                <a:spcPts val="1425"/>
+              </a:lnSpc>
+              <a:buNone/>
+            </a:pPr>
+            <a:r>
+              <a:rPr lang="en-US" sz="1050" b="0" dirty="0">
+                <a:solidFill>
+                  <a:schemeClr val="tx2">
+                    <a:lumMod val="75000"/>
+                    <a:lumOff val="25000"/>
+                  </a:schemeClr>
+                </a:solidFill>
+                <a:effectLst/>
+                <a:latin typeface="Consolas" panose="020B0609020204030204" pitchFamily="49" charset="0"/>
+              </a:rPr>
+              <a:t>|----------------------------|----------------|</a:t>
+            </a:r>
+          </a:p>
+          <a:p>
+            <a:pPr>
+              <a:lnSpc>
+                <a:spcPts val="1425"/>
+              </a:lnSpc>
+              <a:buNone/>
+            </a:pPr>
+            <a:r>
+              <a:rPr lang="en-US" sz="1050" b="0" dirty="0">
+                <a:solidFill>
+                  <a:schemeClr val="tx2">
+                    <a:lumMod val="75000"/>
+                    <a:lumOff val="25000"/>
+                  </a:schemeClr>
+                </a:solidFill>
+                <a:effectLst/>
+                <a:latin typeface="Consolas" panose="020B0609020204030204" pitchFamily="49" charset="0"/>
+              </a:rPr>
+              <a:t>| Parameter                  | Value          |</a:t>
+            </a:r>
+          </a:p>
+          <a:p>
+            <a:pPr>
+              <a:lnSpc>
+                <a:spcPts val="1425"/>
+              </a:lnSpc>
+              <a:buNone/>
+            </a:pPr>
+            <a:r>
+              <a:rPr lang="en-US" sz="1050" b="0" dirty="0">
+                <a:solidFill>
+                  <a:schemeClr val="tx2">
+                    <a:lumMod val="75000"/>
+                    <a:lumOff val="25000"/>
+                  </a:schemeClr>
+                </a:solidFill>
+                <a:effectLst/>
+                <a:latin typeface="Consolas" panose="020B0609020204030204" pitchFamily="49" charset="0"/>
+              </a:rPr>
+              <a:t>|----------------------------|----------------|</a:t>
+            </a:r>
+          </a:p>
+          <a:p>
+            <a:pPr>
+              <a:lnSpc>
+                <a:spcPts val="1425"/>
+              </a:lnSpc>
+              <a:buNone/>
+            </a:pPr>
+            <a:r>
+              <a:rPr lang="en-US" sz="1050" b="0" dirty="0">
+                <a:solidFill>
+                  <a:schemeClr val="tx2">
+                    <a:lumMod val="75000"/>
+                    <a:lumOff val="25000"/>
+                  </a:schemeClr>
+                </a:solidFill>
+                <a:effectLst/>
+                <a:latin typeface="Consolas" panose="020B0609020204030204" pitchFamily="49" charset="0"/>
+              </a:rPr>
+              <a:t>| Commission/Contract        | $       0.6700 |</a:t>
+            </a:r>
+          </a:p>
+          <a:p>
+            <a:pPr>
+              <a:lnSpc>
+                <a:spcPts val="1425"/>
+              </a:lnSpc>
+              <a:buNone/>
+            </a:pPr>
+            <a:r>
+              <a:rPr lang="en-US" sz="1050" b="0" dirty="0">
+                <a:solidFill>
+                  <a:schemeClr val="tx2">
+                    <a:lumMod val="75000"/>
+                    <a:lumOff val="25000"/>
+                  </a:schemeClr>
+                </a:solidFill>
+                <a:effectLst/>
+                <a:latin typeface="Consolas" panose="020B0609020204030204" pitchFamily="49" charset="0"/>
+              </a:rPr>
+              <a:t>| Max Premium/Trade          | $   27777.7778 |</a:t>
+            </a:r>
+          </a:p>
+          <a:p>
+            <a:pPr>
+              <a:lnSpc>
+                <a:spcPts val="1425"/>
+              </a:lnSpc>
+              <a:buNone/>
+            </a:pPr>
+            <a:r>
+              <a:rPr lang="en-US" sz="1050" b="0" dirty="0">
+                <a:solidFill>
+                  <a:schemeClr val="tx2">
+                    <a:lumMod val="75000"/>
+                    <a:lumOff val="25000"/>
+                  </a:schemeClr>
+                </a:solidFill>
+                <a:effectLst/>
+                <a:latin typeface="Consolas" panose="020B0609020204030204" pitchFamily="49" charset="0"/>
+              </a:rPr>
+              <a:t>|----------------------------|----------------|</a:t>
+            </a:r>
+          </a:p>
+        </p:txBody>
+      </p:sp>
+    </p:spTree>
+    <p:extLst>
+      <p:ext uri="{BB962C8B-B14F-4D97-AF65-F5344CB8AC3E}">
+        <p14:creationId xmlns:p14="http://schemas.microsoft.com/office/powerpoint/2010/main" val="1871439293"/>
+      </p:ext>
+    </p:extLst>
+  </p:cSld>
+  <p:clrMapOvr>
+    <a:masterClrMapping/>
+  </p:clrMapOvr>
+</p:sld>
+</file>
+
+<file path=ppt/slides/slide16.xml><?xml version="1.0" encoding="utf-8"?>
+<p:sld xmlns:a="http://schemas.openxmlformats.org/drawingml/2006/main" xmlns:r="http://schemas.openxmlformats.org/officeDocument/2006/relationships" xmlns:p="http://schemas.openxmlformats.org/presentationml/2006/main">
+  <p:cSld>
+    <p:spTree>
+      <p:nvGrpSpPr>
+        <p:cNvPr id="1" name="">
+          <a:extLst>
+            <a:ext uri="{FF2B5EF4-FFF2-40B4-BE49-F238E27FC236}">
+              <a16:creationId xmlns:a16="http://schemas.microsoft.com/office/drawing/2014/main" id="{47EEB94B-5E33-7AAE-9BDE-63FFD20EF809}"/>
+            </a:ext>
+          </a:extLst>
+        </p:cNvPr>
+        <p:cNvGrpSpPr/>
+        <p:nvPr/>
+      </p:nvGrpSpPr>
+      <p:grpSpPr>
+        <a:xfrm>
+          <a:off x="0" y="0"/>
+          <a:ext cx="0" cy="0"/>
+          <a:chOff x="0" y="0"/>
+          <a:chExt cx="0" cy="0"/>
+        </a:xfrm>
+      </p:grpSpPr>
+      <p:sp>
+        <p:nvSpPr>
+          <p:cNvPr id="2" name="Title 1">
+            <a:extLst>
+              <a:ext uri="{FF2B5EF4-FFF2-40B4-BE49-F238E27FC236}">
+                <a16:creationId xmlns:a16="http://schemas.microsoft.com/office/drawing/2014/main" id="{39501C2C-F98E-80A6-DAB9-8FAE6AF8B12B}"/>
+              </a:ext>
+            </a:extLst>
+          </p:cNvPr>
+          <p:cNvSpPr>
+            <a:spLocks noGrp="1"/>
+          </p:cNvSpPr>
+          <p:nvPr>
+            <p:ph type="title"/>
+          </p:nvPr>
+        </p:nvSpPr>
+        <p:spPr>
+          <a:xfrm>
+            <a:off x="358365" y="171245"/>
+            <a:ext cx="8342015" cy="469735"/>
+          </a:xfrm>
+        </p:spPr>
+        <p:txBody>
+          <a:bodyPr>
+            <a:normAutofit fontScale="90000"/>
+          </a:bodyPr>
+          <a:lstStyle/>
+          <a:p>
+            <a:r>
+              <a:rPr lang="en-US" b="1" noProof="1">
+                <a:solidFill>
+                  <a:srgbClr val="002060"/>
+                </a:solidFill>
+              </a:rPr>
+              <a:t>Log file: Results</a:t>
+            </a:r>
+            <a:endParaRPr lang="en-US" b="1" dirty="0">
+              <a:solidFill>
+                <a:srgbClr val="002060"/>
+              </a:solidFill>
+            </a:endParaRPr>
+          </a:p>
+        </p:txBody>
+      </p:sp>
+      <p:sp>
+        <p:nvSpPr>
+          <p:cNvPr id="4" name="TextBox 3">
+            <a:extLst>
+              <a:ext uri="{FF2B5EF4-FFF2-40B4-BE49-F238E27FC236}">
+                <a16:creationId xmlns:a16="http://schemas.microsoft.com/office/drawing/2014/main" id="{78942352-759A-D1EE-2D3D-2997EADAA49C}"/>
+              </a:ext>
+            </a:extLst>
+          </p:cNvPr>
+          <p:cNvSpPr txBox="1"/>
+          <p:nvPr/>
+        </p:nvSpPr>
+        <p:spPr>
+          <a:xfrm>
+            <a:off x="422243" y="871103"/>
+            <a:ext cx="11191580" cy="5659242"/>
+          </a:xfrm>
+          <a:prstGeom prst="rect">
+            <a:avLst/>
+          </a:prstGeom>
+          <a:noFill/>
+        </p:spPr>
+        <p:txBody>
+          <a:bodyPr wrap="square">
+            <a:spAutoFit/>
+          </a:bodyPr>
+          <a:lstStyle/>
+          <a:p>
+            <a:pPr>
+              <a:lnSpc>
+                <a:spcPts val="1425"/>
+              </a:lnSpc>
+              <a:buNone/>
+            </a:pPr>
+            <a:r>
+              <a:rPr lang="en-US" b="1" dirty="0">
+                <a:solidFill>
+                  <a:schemeClr val="tx2">
+                    <a:lumMod val="75000"/>
+                    <a:lumOff val="25000"/>
+                  </a:schemeClr>
+                </a:solidFill>
+                <a:effectLst/>
+                <a:highlight>
+                  <a:srgbClr val="FFFF00"/>
+                </a:highlight>
+                <a:latin typeface="Consolas" panose="020B0609020204030204" pitchFamily="49" charset="0"/>
+              </a:rPr>
+              <a:t>--- YEARLY PORTFOLIO GAIN ---</a:t>
+            </a:r>
+            <a:br>
+              <a:rPr lang="en-US" b="1" dirty="0">
+                <a:solidFill>
+                  <a:schemeClr val="tx2">
+                    <a:lumMod val="75000"/>
+                    <a:lumOff val="25000"/>
+                  </a:schemeClr>
+                </a:solidFill>
+                <a:effectLst/>
+                <a:highlight>
+                  <a:srgbClr val="FFFF00"/>
+                </a:highlight>
+                <a:latin typeface="Consolas" panose="020B0609020204030204" pitchFamily="49" charset="0"/>
+              </a:rPr>
+            </a:br>
+            <a:endParaRPr lang="en-US" b="1" dirty="0">
+              <a:solidFill>
+                <a:schemeClr val="tx2">
+                  <a:lumMod val="75000"/>
+                  <a:lumOff val="25000"/>
+                </a:schemeClr>
+              </a:solidFill>
+              <a:effectLst/>
+              <a:highlight>
+                <a:srgbClr val="FFFF00"/>
+              </a:highlight>
+              <a:latin typeface="Consolas" panose="020B0609020204030204" pitchFamily="49" charset="0"/>
+            </a:endParaRPr>
+          </a:p>
+          <a:p>
+            <a:pPr>
+              <a:lnSpc>
+                <a:spcPts val="1425"/>
+              </a:lnSpc>
+              <a:buNone/>
+            </a:pPr>
+            <a:r>
+              <a:rPr lang="en-US" sz="1400" b="0" dirty="0">
+                <a:solidFill>
+                  <a:schemeClr val="tx2">
+                    <a:lumMod val="75000"/>
+                    <a:lumOff val="25000"/>
+                  </a:schemeClr>
+                </a:solidFill>
+                <a:effectLst/>
+                <a:latin typeface="Consolas" panose="020B0609020204030204" pitchFamily="49" charset="0"/>
+              </a:rPr>
+              <a:t>| Year    | Total Value EOD    |     $ Total Gain     |  % Gain | % SPY Gain |</a:t>
+            </a:r>
+          </a:p>
+          <a:p>
+            <a:pPr>
+              <a:lnSpc>
+                <a:spcPts val="1425"/>
+              </a:lnSpc>
+              <a:buNone/>
+            </a:pPr>
+            <a:r>
+              <a:rPr lang="en-US" sz="1400" b="0" dirty="0">
+                <a:solidFill>
+                  <a:schemeClr val="tx2">
+                    <a:lumMod val="75000"/>
+                    <a:lumOff val="25000"/>
+                  </a:schemeClr>
+                </a:solidFill>
+                <a:effectLst/>
+                <a:latin typeface="Consolas" panose="020B0609020204030204" pitchFamily="49" charset="0"/>
+              </a:rPr>
+              <a:t>|---------|--------------------|----------------------|---------|------------|</a:t>
+            </a:r>
+          </a:p>
+          <a:p>
+            <a:pPr>
+              <a:lnSpc>
+                <a:spcPts val="1425"/>
+              </a:lnSpc>
+              <a:buNone/>
+            </a:pPr>
+            <a:r>
+              <a:rPr lang="en-US" sz="1400" b="0" dirty="0">
+                <a:solidFill>
+                  <a:schemeClr val="tx2">
+                    <a:lumMod val="75000"/>
+                    <a:lumOff val="25000"/>
+                  </a:schemeClr>
+                </a:solidFill>
+                <a:effectLst/>
+                <a:latin typeface="Consolas" panose="020B0609020204030204" pitchFamily="49" charset="0"/>
+              </a:rPr>
+              <a:t>| 2020    | $   1,966,294.73   | $         966,294.73 |  96.63% |     17.24% |</a:t>
+            </a:r>
+          </a:p>
+          <a:p>
+            <a:pPr>
+              <a:lnSpc>
+                <a:spcPts val="1425"/>
+              </a:lnSpc>
+              <a:buNone/>
+            </a:pPr>
+            <a:r>
+              <a:rPr lang="en-US" sz="1400" b="0" dirty="0">
+                <a:solidFill>
+                  <a:schemeClr val="tx2">
+                    <a:lumMod val="75000"/>
+                    <a:lumOff val="25000"/>
+                  </a:schemeClr>
+                </a:solidFill>
+                <a:effectLst/>
+                <a:latin typeface="Consolas" panose="020B0609020204030204" pitchFamily="49" charset="0"/>
+              </a:rPr>
+              <a:t>| 2021    | $   6,009,637.25   | $       4,043,342.52 | 205.63% |     28.73% |</a:t>
+            </a:r>
+          </a:p>
+          <a:p>
+            <a:pPr>
+              <a:lnSpc>
+                <a:spcPts val="1425"/>
+              </a:lnSpc>
+              <a:buNone/>
+            </a:pPr>
+            <a:r>
+              <a:rPr lang="en-US" sz="1400" b="0" dirty="0">
+                <a:solidFill>
+                  <a:schemeClr val="tx2">
+                    <a:lumMod val="75000"/>
+                    <a:lumOff val="25000"/>
+                  </a:schemeClr>
+                </a:solidFill>
+                <a:effectLst/>
+                <a:latin typeface="Consolas" panose="020B0609020204030204" pitchFamily="49" charset="0"/>
+              </a:rPr>
+              <a:t>| 2022    | $  10,758,445.11   | $       4,748,807.86 |  79.02% |    -18.18% |</a:t>
+            </a:r>
+          </a:p>
+          <a:p>
+            <a:pPr>
+              <a:lnSpc>
+                <a:spcPts val="1425"/>
+              </a:lnSpc>
+              <a:buNone/>
+            </a:pPr>
+            <a:r>
+              <a:rPr lang="en-US" sz="1400" b="0" dirty="0">
+                <a:solidFill>
+                  <a:schemeClr val="tx2">
+                    <a:lumMod val="75000"/>
+                    <a:lumOff val="25000"/>
+                  </a:schemeClr>
+                </a:solidFill>
+                <a:effectLst/>
+                <a:latin typeface="Consolas" panose="020B0609020204030204" pitchFamily="49" charset="0"/>
+              </a:rPr>
+              <a:t>| 2023    | $  16,548,662.91   | $       5,790,217.80 |  53.82% |     26.18% |</a:t>
+            </a:r>
+          </a:p>
+          <a:p>
+            <a:pPr>
+              <a:lnSpc>
+                <a:spcPts val="1425"/>
+              </a:lnSpc>
+              <a:buNone/>
+            </a:pPr>
+            <a:r>
+              <a:rPr lang="en-US" sz="1400" b="0" dirty="0">
+                <a:solidFill>
+                  <a:schemeClr val="tx2">
+                    <a:lumMod val="75000"/>
+                    <a:lumOff val="25000"/>
+                  </a:schemeClr>
+                </a:solidFill>
+                <a:effectLst/>
+                <a:latin typeface="Consolas" panose="020B0609020204030204" pitchFamily="49" charset="0"/>
+              </a:rPr>
+              <a:t>| 2024    | $  22,516,679.16   | $       5,968,016.25 |  36.06% |     24.89% |</a:t>
+            </a:r>
+          </a:p>
+          <a:p>
+            <a:pPr>
+              <a:lnSpc>
+                <a:spcPts val="1425"/>
+              </a:lnSpc>
+              <a:buNone/>
+            </a:pPr>
+            <a:r>
+              <a:rPr lang="en-US" sz="1400" b="0" dirty="0">
+                <a:solidFill>
+                  <a:schemeClr val="tx2">
+                    <a:lumMod val="75000"/>
+                    <a:lumOff val="25000"/>
+                  </a:schemeClr>
+                </a:solidFill>
+                <a:effectLst/>
+                <a:latin typeface="Consolas" panose="020B0609020204030204" pitchFamily="49" charset="0"/>
+              </a:rPr>
+              <a:t>| 2025    | $  47,549,839.11   | $      25,033,159.95 | 111.18% |     18.26% |</a:t>
+            </a:r>
+          </a:p>
+          <a:p>
+            <a:pPr>
+              <a:lnSpc>
+                <a:spcPts val="1425"/>
+              </a:lnSpc>
+              <a:buNone/>
+            </a:pPr>
+            <a:r>
+              <a:rPr lang="en-US" sz="1400" b="0" dirty="0">
+                <a:solidFill>
+                  <a:schemeClr val="tx2">
+                    <a:lumMod val="75000"/>
+                    <a:lumOff val="25000"/>
+                  </a:schemeClr>
+                </a:solidFill>
+                <a:effectLst/>
+                <a:latin typeface="Consolas" panose="020B0609020204030204" pitchFamily="49" charset="0"/>
+              </a:rPr>
+              <a:t>|---------|--------------------|----------------------|---------|------------|</a:t>
+            </a:r>
+          </a:p>
+          <a:p>
+            <a:pPr>
+              <a:lnSpc>
+                <a:spcPts val="1425"/>
+              </a:lnSpc>
+              <a:buNone/>
+            </a:pPr>
+            <a:r>
+              <a:rPr lang="en-US" sz="1400" b="0" dirty="0">
+                <a:solidFill>
+                  <a:schemeClr val="tx2">
+                    <a:lumMod val="75000"/>
+                    <a:lumOff val="25000"/>
+                  </a:schemeClr>
+                </a:solidFill>
+                <a:effectLst/>
+                <a:latin typeface="Consolas" panose="020B0609020204030204" pitchFamily="49" charset="0"/>
+              </a:rPr>
+              <a:t>| TOTAL (Years)                | $      46,549,839.11 | </a:t>
+            </a:r>
+          </a:p>
+          <a:p>
+            <a:pPr>
+              <a:lnSpc>
+                <a:spcPts val="1425"/>
+              </a:lnSpc>
+              <a:buNone/>
+            </a:pPr>
+            <a:br>
+              <a:rPr lang="en-US" sz="1400" b="0" dirty="0">
+                <a:solidFill>
+                  <a:schemeClr val="tx2">
+                    <a:lumMod val="75000"/>
+                    <a:lumOff val="25000"/>
+                  </a:schemeClr>
+                </a:solidFill>
+                <a:effectLst/>
+                <a:latin typeface="Consolas" panose="020B0609020204030204" pitchFamily="49" charset="0"/>
+              </a:rPr>
+            </a:br>
+            <a:endParaRPr lang="en-US" sz="1400" b="0" dirty="0">
+              <a:solidFill>
+                <a:schemeClr val="tx2">
+                  <a:lumMod val="75000"/>
+                  <a:lumOff val="25000"/>
+                </a:schemeClr>
+              </a:solidFill>
+              <a:effectLst/>
+              <a:latin typeface="Consolas" panose="020B0609020204030204" pitchFamily="49" charset="0"/>
+            </a:endParaRPr>
+          </a:p>
+          <a:p>
+            <a:pPr>
+              <a:lnSpc>
+                <a:spcPts val="1425"/>
+              </a:lnSpc>
+              <a:buNone/>
+            </a:pPr>
+            <a:endParaRPr lang="en-US" sz="1400" dirty="0">
+              <a:solidFill>
+                <a:schemeClr val="tx2">
+                  <a:lumMod val="75000"/>
+                  <a:lumOff val="25000"/>
+                </a:schemeClr>
+              </a:solidFill>
+              <a:latin typeface="Consolas" panose="020B0609020204030204" pitchFamily="49" charset="0"/>
+            </a:endParaRPr>
+          </a:p>
+          <a:p>
+            <a:pPr>
+              <a:lnSpc>
+                <a:spcPts val="1425"/>
+              </a:lnSpc>
+              <a:buNone/>
+            </a:pPr>
+            <a:br>
+              <a:rPr lang="en-US" sz="1400" b="0" dirty="0">
+                <a:solidFill>
+                  <a:schemeClr val="tx2">
+                    <a:lumMod val="75000"/>
+                    <a:lumOff val="25000"/>
+                  </a:schemeClr>
+                </a:solidFill>
+                <a:effectLst/>
+                <a:latin typeface="Consolas" panose="020B0609020204030204" pitchFamily="49" charset="0"/>
+              </a:rPr>
+            </a:br>
+            <a:endParaRPr lang="en-US" sz="1400" b="0" dirty="0">
+              <a:solidFill>
+                <a:schemeClr val="tx2">
+                  <a:lumMod val="75000"/>
+                  <a:lumOff val="25000"/>
+                </a:schemeClr>
+              </a:solidFill>
+              <a:effectLst/>
+              <a:latin typeface="Consolas" panose="020B0609020204030204" pitchFamily="49" charset="0"/>
+            </a:endParaRPr>
+          </a:p>
+          <a:p>
+            <a:pPr>
+              <a:lnSpc>
+                <a:spcPts val="1425"/>
+              </a:lnSpc>
+              <a:buNone/>
+            </a:pPr>
+            <a:r>
+              <a:rPr lang="en-US" b="1" dirty="0">
+                <a:solidFill>
+                  <a:schemeClr val="tx2">
+                    <a:lumMod val="75000"/>
+                    <a:lumOff val="25000"/>
+                  </a:schemeClr>
+                </a:solidFill>
+                <a:highlight>
+                  <a:srgbClr val="FFFF00"/>
+                </a:highlight>
+                <a:latin typeface="Consolas" panose="020B0609020204030204" pitchFamily="49" charset="0"/>
+              </a:rPr>
+              <a:t>--- TRADE EXIT STATISTICS (by Trade Event Count) ---</a:t>
+            </a:r>
+            <a:br>
+              <a:rPr lang="en-US" b="1" dirty="0">
+                <a:solidFill>
+                  <a:schemeClr val="tx2">
+                    <a:lumMod val="75000"/>
+                    <a:lumOff val="25000"/>
+                  </a:schemeClr>
+                </a:solidFill>
+                <a:highlight>
+                  <a:srgbClr val="FFFF00"/>
+                </a:highlight>
+                <a:latin typeface="Consolas" panose="020B0609020204030204" pitchFamily="49" charset="0"/>
+              </a:rPr>
+            </a:br>
+            <a:endParaRPr lang="en-US" b="1" dirty="0">
+              <a:solidFill>
+                <a:schemeClr val="tx2">
+                  <a:lumMod val="75000"/>
+                  <a:lumOff val="25000"/>
+                </a:schemeClr>
+              </a:solidFill>
+              <a:highlight>
+                <a:srgbClr val="FFFF00"/>
+              </a:highlight>
+              <a:latin typeface="Consolas" panose="020B0609020204030204" pitchFamily="49" charset="0"/>
+            </a:endParaRPr>
+          </a:p>
+          <a:p>
+            <a:pPr>
+              <a:lnSpc>
+                <a:spcPts val="1425"/>
+              </a:lnSpc>
+              <a:buNone/>
+            </a:pPr>
+            <a:r>
+              <a:rPr lang="en-US" sz="1400" b="0" dirty="0">
+                <a:solidFill>
+                  <a:schemeClr val="tx2">
+                    <a:lumMod val="75000"/>
+                    <a:lumOff val="25000"/>
+                  </a:schemeClr>
+                </a:solidFill>
+                <a:effectLst/>
+                <a:latin typeface="Consolas" panose="020B0609020204030204" pitchFamily="49" charset="0"/>
+              </a:rPr>
+              <a:t>| Exit Reason                          | Exit Events  |  % of Total | Total Gain $      | Net Gain % |</a:t>
+            </a:r>
+          </a:p>
+          <a:p>
+            <a:pPr>
+              <a:lnSpc>
+                <a:spcPts val="1425"/>
+              </a:lnSpc>
+              <a:buNone/>
+            </a:pPr>
+            <a:r>
+              <a:rPr lang="en-US" sz="1400" b="0" dirty="0">
+                <a:solidFill>
+                  <a:schemeClr val="tx2">
+                    <a:lumMod val="75000"/>
+                    <a:lumOff val="25000"/>
+                  </a:schemeClr>
+                </a:solidFill>
+                <a:effectLst/>
+                <a:latin typeface="Consolas" panose="020B0609020204030204" pitchFamily="49" charset="0"/>
+              </a:rPr>
+              <a:t>|--------------------------------------|--------------|-------------|-------------------|------------|</a:t>
+            </a:r>
+          </a:p>
+          <a:p>
+            <a:pPr>
+              <a:lnSpc>
+                <a:spcPts val="1425"/>
+              </a:lnSpc>
+              <a:buNone/>
+            </a:pPr>
+            <a:r>
+              <a:rPr lang="en-US" sz="1400" b="0" dirty="0">
+                <a:solidFill>
+                  <a:schemeClr val="tx2">
+                    <a:lumMod val="75000"/>
+                    <a:lumOff val="25000"/>
+                  </a:schemeClr>
+                </a:solidFill>
+                <a:effectLst/>
+                <a:latin typeface="Consolas" panose="020B0609020204030204" pitchFamily="49" charset="0"/>
+              </a:rPr>
+              <a:t>| Expiration (ITM/Assigned)            |            0 |       0.00% | $            0.00 |      0.00% |</a:t>
+            </a:r>
+          </a:p>
+          <a:p>
+            <a:pPr>
+              <a:lnSpc>
+                <a:spcPts val="1425"/>
+              </a:lnSpc>
+              <a:buNone/>
+            </a:pPr>
+            <a:r>
+              <a:rPr lang="en-US" sz="1400" b="0" dirty="0">
+                <a:solidFill>
+                  <a:schemeClr val="tx2">
+                    <a:lumMod val="75000"/>
+                    <a:lumOff val="25000"/>
+                  </a:schemeClr>
+                </a:solidFill>
+                <a:effectLst/>
+                <a:latin typeface="Consolas" panose="020B0609020204030204" pitchFamily="49" charset="0"/>
+              </a:rPr>
+              <a:t>| Expiration (OTM/Max Profit)          |          160 |      57.14% | $   24,457,686.35 |     99.89% |</a:t>
+            </a:r>
+          </a:p>
+          <a:p>
+            <a:pPr>
+              <a:lnSpc>
+                <a:spcPts val="1425"/>
+              </a:lnSpc>
+              <a:buNone/>
+            </a:pPr>
+            <a:r>
+              <a:rPr lang="en-US" sz="1400" b="0" dirty="0">
+                <a:solidFill>
+                  <a:schemeClr val="tx2">
+                    <a:lumMod val="75000"/>
+                    <a:lumOff val="25000"/>
+                  </a:schemeClr>
+                </a:solidFill>
+                <a:effectLst/>
+                <a:latin typeface="Consolas" panose="020B0609020204030204" pitchFamily="49" charset="0"/>
+              </a:rPr>
+              <a:t>| Last day liquidation                 |           35 |      12.50% | $   19,618,100.30 |      0.00% |</a:t>
+            </a:r>
+          </a:p>
+          <a:p>
+            <a:pPr>
+              <a:lnSpc>
+                <a:spcPts val="1425"/>
+              </a:lnSpc>
+              <a:buNone/>
+            </a:pPr>
+            <a:r>
+              <a:rPr lang="en-US" sz="1400" b="0" dirty="0">
+                <a:solidFill>
+                  <a:schemeClr val="tx2">
+                    <a:lumMod val="75000"/>
+                    <a:lumOff val="25000"/>
+                  </a:schemeClr>
+                </a:solidFill>
+                <a:effectLst/>
+                <a:latin typeface="Consolas" panose="020B0609020204030204" pitchFamily="49" charset="0"/>
+              </a:rPr>
+              <a:t>| </a:t>
+            </a:r>
+            <a:r>
+              <a:rPr lang="en-US" sz="1400" b="0" noProof="1">
+                <a:solidFill>
+                  <a:schemeClr val="tx2">
+                    <a:lumMod val="75000"/>
+                    <a:lumOff val="25000"/>
+                  </a:schemeClr>
+                </a:solidFill>
+                <a:effectLst/>
+                <a:latin typeface="Consolas" panose="020B0609020204030204" pitchFamily="49" charset="0"/>
+              </a:rPr>
+              <a:t>StopLoss</a:t>
+            </a:r>
+            <a:r>
+              <a:rPr lang="en-US" sz="1400" b="0" dirty="0">
+                <a:solidFill>
+                  <a:schemeClr val="tx2">
+                    <a:lumMod val="75000"/>
+                    <a:lumOff val="25000"/>
+                  </a:schemeClr>
+                </a:solidFill>
+                <a:effectLst/>
+                <a:latin typeface="Consolas" panose="020B0609020204030204" pitchFamily="49" charset="0"/>
+              </a:rPr>
+              <a:t>: Stock Below Entry </a:t>
+            </a:r>
+            <a:r>
+              <a:rPr lang="en-US" sz="1400" b="0" noProof="1">
+                <a:solidFill>
+                  <a:schemeClr val="tx2">
+                    <a:lumMod val="75000"/>
+                    <a:lumOff val="25000"/>
+                  </a:schemeClr>
+                </a:solidFill>
+                <a:effectLst/>
+                <a:latin typeface="Consolas" panose="020B0609020204030204" pitchFamily="49" charset="0"/>
+              </a:rPr>
+              <a:t>Thres</a:t>
+            </a:r>
+            <a:r>
+              <a:rPr lang="en-US" sz="1400" b="0" dirty="0">
+                <a:solidFill>
+                  <a:schemeClr val="tx2">
+                    <a:lumMod val="75000"/>
+                    <a:lumOff val="25000"/>
+                  </a:schemeClr>
+                </a:solidFill>
+                <a:effectLst/>
+                <a:latin typeface="Consolas" panose="020B0609020204030204" pitchFamily="49" charset="0"/>
+              </a:rPr>
+              <a:t>... |           22 |       7.86% | $   -1,338,885.94 |     -5.68% |</a:t>
+            </a:r>
+          </a:p>
+          <a:p>
+            <a:pPr>
+              <a:lnSpc>
+                <a:spcPts val="1425"/>
+              </a:lnSpc>
+              <a:buNone/>
+            </a:pPr>
+            <a:r>
+              <a:rPr lang="en-US" sz="1400" b="0" dirty="0">
+                <a:solidFill>
+                  <a:schemeClr val="tx2">
+                    <a:lumMod val="75000"/>
+                    <a:lumOff val="25000"/>
+                  </a:schemeClr>
+                </a:solidFill>
+                <a:effectLst/>
+                <a:latin typeface="Consolas" panose="020B0609020204030204" pitchFamily="49" charset="0"/>
+              </a:rPr>
+              <a:t>| </a:t>
+            </a:r>
+            <a:r>
+              <a:rPr lang="en-US" sz="1400" b="0" noProof="1">
+                <a:solidFill>
+                  <a:schemeClr val="tx2">
+                    <a:lumMod val="75000"/>
+                    <a:lumOff val="25000"/>
+                  </a:schemeClr>
+                </a:solidFill>
+                <a:effectLst/>
+                <a:latin typeface="Consolas" panose="020B0609020204030204" pitchFamily="49" charset="0"/>
+              </a:rPr>
+              <a:t>StopLoss</a:t>
+            </a:r>
+            <a:r>
+              <a:rPr lang="en-US" sz="1400" b="0" dirty="0">
+                <a:solidFill>
+                  <a:schemeClr val="tx2">
+                    <a:lumMod val="75000"/>
+                    <a:lumOff val="25000"/>
+                  </a:schemeClr>
+                </a:solidFill>
+                <a:effectLst/>
+                <a:latin typeface="Consolas" panose="020B0609020204030204" pitchFamily="49" charset="0"/>
+              </a:rPr>
+              <a:t>: Stock Below SMA150         |           63 |      22.50% | $    3,812,938.40 |     16.18% |</a:t>
+            </a:r>
+          </a:p>
+          <a:p>
+            <a:pPr>
+              <a:lnSpc>
+                <a:spcPts val="1425"/>
+              </a:lnSpc>
+              <a:buNone/>
+            </a:pPr>
+            <a:r>
+              <a:rPr lang="en-US" sz="1400" b="0" dirty="0">
+                <a:solidFill>
+                  <a:schemeClr val="tx2">
+                    <a:lumMod val="75000"/>
+                    <a:lumOff val="25000"/>
+                  </a:schemeClr>
+                </a:solidFill>
+                <a:effectLst/>
+                <a:latin typeface="Consolas" panose="020B0609020204030204" pitchFamily="49" charset="0"/>
+              </a:rPr>
+              <a:t>|--------------------------------------|--------------|-------------|-------------------|------------|</a:t>
+            </a:r>
+          </a:p>
+          <a:p>
+            <a:pPr>
+              <a:lnSpc>
+                <a:spcPts val="1425"/>
+              </a:lnSpc>
+              <a:buNone/>
+            </a:pPr>
+            <a:r>
+              <a:rPr lang="en-US" sz="1400" b="0" dirty="0">
+                <a:solidFill>
+                  <a:schemeClr val="tx2">
+                    <a:lumMod val="75000"/>
+                    <a:lumOff val="25000"/>
+                  </a:schemeClr>
+                </a:solidFill>
+                <a:effectLst/>
+                <a:latin typeface="Consolas" panose="020B0609020204030204" pitchFamily="49" charset="0"/>
+              </a:rPr>
+              <a:t>| Total Exit Trades Closed             |          280 |     100.00% | $   46,549,839.11 |        N/A |</a:t>
+            </a:r>
+          </a:p>
+          <a:p>
+            <a:pPr>
+              <a:lnSpc>
+                <a:spcPts val="1425"/>
+              </a:lnSpc>
+              <a:buNone/>
+            </a:pPr>
+            <a:r>
+              <a:rPr lang="en-US" sz="1400" b="0" dirty="0">
+                <a:solidFill>
+                  <a:schemeClr val="tx2">
+                    <a:lumMod val="75000"/>
+                    <a:lumOff val="25000"/>
+                  </a:schemeClr>
+                </a:solidFill>
+                <a:effectLst/>
+                <a:latin typeface="Consolas" panose="020B0609020204030204" pitchFamily="49" charset="0"/>
+              </a:rPr>
+              <a:t>|--------------------------------------|--------------|-------------|-------------------|------------|</a:t>
+            </a:r>
+          </a:p>
+          <a:p>
+            <a:pPr>
+              <a:lnSpc>
+                <a:spcPts val="1425"/>
+              </a:lnSpc>
+              <a:buNone/>
+            </a:pPr>
+            <a:r>
+              <a:rPr lang="en-US" sz="1400" b="0" dirty="0">
+                <a:solidFill>
+                  <a:schemeClr val="tx2">
+                    <a:lumMod val="75000"/>
+                    <a:lumOff val="25000"/>
+                  </a:schemeClr>
+                </a:solidFill>
+                <a:effectLst/>
+                <a:latin typeface="Consolas" panose="020B0609020204030204" pitchFamily="49" charset="0"/>
+              </a:rPr>
+              <a:t>| Total Entry Events                   |          280 |</a:t>
+            </a:r>
+          </a:p>
+        </p:txBody>
+      </p:sp>
+    </p:spTree>
+    <p:extLst>
+      <p:ext uri="{BB962C8B-B14F-4D97-AF65-F5344CB8AC3E}">
+        <p14:creationId xmlns:p14="http://schemas.microsoft.com/office/powerpoint/2010/main" val="617332635"/>
       </p:ext>
     </p:extLst>
   </p:cSld>

</xml_diff>

<commit_message>
New yahoo.py with overwrite
</commit_message>
<xml_diff>
--- a/Option Trading.pptx
+++ b/Option Trading.pptx
@@ -127,6 +127,14 @@
 </p:presentation>
 </file>
 
+<file path=ppt/revisionInfo.xml><?xml version="1.0" encoding="utf-8"?>
+<p1510:revInfo xmlns:a="http://schemas.openxmlformats.org/drawingml/2006/main" xmlns:r="http://schemas.openxmlformats.org/officeDocument/2006/relationships" xmlns:p1510="http://schemas.microsoft.com/office/powerpoint/2015/10/main">
+  <p1510:revLst>
+    <p1510:client id="{12C1B376-859B-4984-B115-72FE76952A3C}" v="25" dt="2025-11-30T00:35:54.665"/>
+  </p1510:revLst>
+</p1510:revInfo>
+</file>
+
 <file path=ppt/slideLayouts/slideLayout1.xml><?xml version="1.0" encoding="utf-8"?>
 <p:sldLayout xmlns:a="http://schemas.openxmlformats.org/drawingml/2006/main" xmlns:r="http://schemas.openxmlformats.org/officeDocument/2006/relationships" xmlns:p="http://schemas.openxmlformats.org/presentationml/2006/main" type="title" preserve="1">
   <p:cSld name="Title Slide">
@@ -274,7 +282,7 @@
           <a:p>
             <a:fld id="{802E63CE-73C2-416C-817A-F7BDE0DDA196}" type="datetimeFigureOut">
               <a:rPr lang="en-US" smtClean="0"/>
-              <a:t>11/27/2025</a:t>
+              <a:t>11/29/2025</a:t>
             </a:fld>
             <a:endParaRPr lang="en-US" dirty="0"/>
           </a:p>
@@ -472,7 +480,7 @@
           <a:p>
             <a:fld id="{802E63CE-73C2-416C-817A-F7BDE0DDA196}" type="datetimeFigureOut">
               <a:rPr lang="en-US" smtClean="0"/>
-              <a:t>11/27/2025</a:t>
+              <a:t>11/29/2025</a:t>
             </a:fld>
             <a:endParaRPr lang="en-US" dirty="0"/>
           </a:p>
@@ -680,7 +688,7 @@
           <a:p>
             <a:fld id="{802E63CE-73C2-416C-817A-F7BDE0DDA196}" type="datetimeFigureOut">
               <a:rPr lang="en-US" smtClean="0"/>
-              <a:t>11/27/2025</a:t>
+              <a:t>11/29/2025</a:t>
             </a:fld>
             <a:endParaRPr lang="en-US" dirty="0"/>
           </a:p>
@@ -878,7 +886,7 @@
           <a:p>
             <a:fld id="{802E63CE-73C2-416C-817A-F7BDE0DDA196}" type="datetimeFigureOut">
               <a:rPr lang="en-US" smtClean="0"/>
-              <a:t>11/27/2025</a:t>
+              <a:t>11/29/2025</a:t>
             </a:fld>
             <a:endParaRPr lang="en-US" dirty="0"/>
           </a:p>
@@ -1153,7 +1161,7 @@
           <a:p>
             <a:fld id="{802E63CE-73C2-416C-817A-F7BDE0DDA196}" type="datetimeFigureOut">
               <a:rPr lang="en-US" smtClean="0"/>
-              <a:t>11/27/2025</a:t>
+              <a:t>11/29/2025</a:t>
             </a:fld>
             <a:endParaRPr lang="en-US" dirty="0"/>
           </a:p>
@@ -1418,7 +1426,7 @@
           <a:p>
             <a:fld id="{802E63CE-73C2-416C-817A-F7BDE0DDA196}" type="datetimeFigureOut">
               <a:rPr lang="en-US" smtClean="0"/>
-              <a:t>11/27/2025</a:t>
+              <a:t>11/29/2025</a:t>
             </a:fld>
             <a:endParaRPr lang="en-US" dirty="0"/>
           </a:p>
@@ -1830,7 +1838,7 @@
           <a:p>
             <a:fld id="{802E63CE-73C2-416C-817A-F7BDE0DDA196}" type="datetimeFigureOut">
               <a:rPr lang="en-US" smtClean="0"/>
-              <a:t>11/27/2025</a:t>
+              <a:t>11/29/2025</a:t>
             </a:fld>
             <a:endParaRPr lang="en-US" dirty="0"/>
           </a:p>
@@ -1971,7 +1979,7 @@
           <a:p>
             <a:fld id="{802E63CE-73C2-416C-817A-F7BDE0DDA196}" type="datetimeFigureOut">
               <a:rPr lang="en-US" smtClean="0"/>
-              <a:t>11/27/2025</a:t>
+              <a:t>11/29/2025</a:t>
             </a:fld>
             <a:endParaRPr lang="en-US" dirty="0"/>
           </a:p>
@@ -2084,7 +2092,7 @@
           <a:p>
             <a:fld id="{802E63CE-73C2-416C-817A-F7BDE0DDA196}" type="datetimeFigureOut">
               <a:rPr lang="en-US" smtClean="0"/>
-              <a:t>11/27/2025</a:t>
+              <a:t>11/29/2025</a:t>
             </a:fld>
             <a:endParaRPr lang="en-US" dirty="0"/>
           </a:p>
@@ -2395,7 +2403,7 @@
           <a:p>
             <a:fld id="{802E63CE-73C2-416C-817A-F7BDE0DDA196}" type="datetimeFigureOut">
               <a:rPr lang="en-US" smtClean="0"/>
-              <a:t>11/27/2025</a:t>
+              <a:t>11/29/2025</a:t>
             </a:fld>
             <a:endParaRPr lang="en-US" dirty="0"/>
           </a:p>
@@ -2683,7 +2691,7 @@
           <a:p>
             <a:fld id="{802E63CE-73C2-416C-817A-F7BDE0DDA196}" type="datetimeFigureOut">
               <a:rPr lang="en-US" smtClean="0"/>
-              <a:t>11/27/2025</a:t>
+              <a:t>11/29/2025</a:t>
             </a:fld>
             <a:endParaRPr lang="en-US" dirty="0"/>
           </a:p>
@@ -2924,7 +2932,7 @@
           <a:p>
             <a:fld id="{802E63CE-73C2-416C-817A-F7BDE0DDA196}" type="datetimeFigureOut">
               <a:rPr lang="en-US" smtClean="0"/>
-              <a:t>11/27/2025</a:t>
+              <a:t>11/29/2025</a:t>
             </a:fld>
             <a:endParaRPr lang="en-US" dirty="0"/>
           </a:p>
@@ -9358,7 +9366,7 @@
           </a:xfrm>
         </p:spPr>
         <p:txBody>
-          <a:bodyPr>
+          <a:bodyPr vert="horz" lIns="91440" tIns="45720" rIns="91440" bIns="45720" rtlCol="0" anchor="t">
             <a:noAutofit/>
           </a:bodyPr>
           <a:lstStyle/>
@@ -9367,7 +9375,7 @@
               <a:buNone/>
             </a:pPr>
             <a:r>
-              <a:rPr lang="en-US" sz="1500" dirty="0"/>
+              <a:rPr lang="en-US" sz="1400" dirty="0"/>
               <a:t>1. Download Visual Studio Code (VSC) </a:t>
             </a:r>
           </a:p>
@@ -9376,23 +9384,23 @@
               <a:buNone/>
             </a:pPr>
             <a:r>
-              <a:rPr lang="en-US" sz="1500" dirty="0"/>
+              <a:rPr lang="en-US" sz="1400" dirty="0"/>
               <a:t>2. Connect source control with </a:t>
             </a:r>
             <a:r>
-              <a:rPr lang="en-US" sz="1500" noProof="1"/>
+              <a:rPr lang="en-US" sz="1400" noProof="1"/>
               <a:t>Etay's</a:t>
             </a:r>
             <a:r>
-              <a:rPr lang="en-US" sz="1500" dirty="0"/>
+              <a:rPr lang="en-US" sz="1400" dirty="0"/>
               <a:t> </a:t>
             </a:r>
             <a:r>
-              <a:rPr lang="en-US" sz="1500" noProof="1"/>
+              <a:rPr lang="en-US" sz="1400" noProof="1"/>
               <a:t>Github</a:t>
             </a:r>
             <a:r>
-              <a:rPr lang="en-US" sz="1500" dirty="0"/>
+              <a:rPr lang="en-US" sz="1400" dirty="0"/>
               <a:t> to c:\option_trading</a:t>
             </a:r>
           </a:p>
@@ -9401,81 +9409,132 @@
               <a:buNone/>
             </a:pPr>
             <a:r>
-              <a:rPr lang="en-US" sz="1500" dirty="0"/>
+              <a:rPr lang="en-US" sz="1400" dirty="0"/>
               <a:t>3. Use </a:t>
             </a:r>
             <a:r>
-              <a:rPr lang="en-US" sz="1500" noProof="1"/>
+              <a:rPr lang="en-US" sz="1400" noProof="1"/>
               <a:t>FileZila</a:t>
             </a:r>
             <a:r>
-              <a:rPr lang="en-US" sz="1500" dirty="0"/>
+              <a:rPr lang="en-US" sz="1400"/>
               <a:t> to download ORATS zip files 2007 - 2025 to c:\option_trading\ORATS_zip </a:t>
             </a:r>
           </a:p>
           <a:p>
-            <a:pPr marL="0" indent="0">
-              <a:buNone/>
-            </a:pPr>
-            <a:r>
-              <a:rPr lang="en-US" sz="1500" dirty="0"/>
-              <a:t>4. Run extract_zip.py from VSC play button (zip --&gt; csv under c:\ORATS_csv)</a:t>
-            </a:r>
-          </a:p>
-          <a:p>
-            <a:pPr marL="0" indent="0">
-              <a:buNone/>
-            </a:pPr>
-            <a:r>
-              <a:rPr lang="en-US" sz="1500" dirty="0"/>
-              <a:t>5. Run make_data.py (c:\ORATS_csv --&gt; c:\option_trading\ORATS_json)</a:t>
-            </a:r>
-            <a:br>
-              <a:rPr lang="en-US" sz="1500" dirty="0"/>
-            </a:br>
-            <a:r>
-              <a:rPr lang="en-US" sz="1500" dirty="0"/>
-              <a:t>     This will keep only: "</a:t>
-            </a:r>
-            <a:r>
-              <a:rPr lang="en-US" sz="1500" noProof="1"/>
+            <a:pPr>
+              <a:buNone/>
+            </a:pPr>
+            <a:r>
+              <a:rPr lang="en-US" sz="1400" dirty="0">
+                <a:ea typeface="+mn-lt"/>
+                <a:cs typeface="+mn-lt"/>
+              </a:rPr>
+              <a:t>4. Run extract_zip.py (zip --&gt; csv under c:\option_trading\ORATS_csv)</a:t>
+            </a:r>
+            <a:endParaRPr lang="en-US" sz="2400" dirty="0"/>
+          </a:p>
+          <a:p>
+            <a:pPr>
+              <a:buNone/>
+            </a:pPr>
+            <a:r>
+              <a:rPr lang="en-US" sz="1400" dirty="0">
+                <a:ea typeface="+mn-lt"/>
+                <a:cs typeface="+mn-lt"/>
+              </a:rPr>
+              <a:t>   Note: The new files will not go to c:\option_trading\ORATS_csv\2025</a:t>
+            </a:r>
+            <a:endParaRPr lang="en-US" sz="2400" dirty="0"/>
+          </a:p>
+          <a:p>
+            <a:pPr>
+              <a:buNone/>
+            </a:pPr>
+            <a:r>
+              <a:rPr lang="en-US" sz="1400" dirty="0">
+                <a:ea typeface="+mn-lt"/>
+                <a:cs typeface="+mn-lt"/>
+              </a:rPr>
+              <a:t>   but it is OK since make_data.py will find them anywhere.</a:t>
+            </a:r>
+            <a:endParaRPr lang="en-US" sz="2400" dirty="0"/>
+          </a:p>
+          <a:p>
+            <a:pPr>
+              <a:buNone/>
+            </a:pPr>
+            <a:r>
+              <a:rPr lang="en-US" sz="1400" dirty="0">
+                <a:ea typeface="+mn-lt"/>
+                <a:cs typeface="+mn-lt"/>
+              </a:rPr>
+              <a:t>5. Run make_data.py (c:\option_trading\ORATS_csv --&gt; c:\option_trading\ORATS_json).   This will keep only: "</a:t>
+            </a:r>
+            <a:r>
+              <a:rPr lang="en-US" sz="1400" dirty="0" err="1">
+                <a:ea typeface="+mn-lt"/>
+                <a:cs typeface="+mn-lt"/>
+              </a:rPr>
               <a:t>expirDate</a:t>
             </a:r>
             <a:r>
-              <a:rPr lang="en-US" sz="1500" dirty="0"/>
+              <a:rPr lang="en-US" sz="1400" dirty="0">
+                <a:ea typeface="+mn-lt"/>
+                <a:cs typeface="+mn-lt"/>
+              </a:rPr>
               <a:t>", "strike", "</a:t>
             </a:r>
             <a:r>
-              <a:rPr lang="en-US" sz="1500" noProof="1"/>
+              <a:rPr lang="en-US" sz="1400" dirty="0" err="1">
+                <a:ea typeface="+mn-lt"/>
+                <a:cs typeface="+mn-lt"/>
+              </a:rPr>
               <a:t>pBidPx</a:t>
             </a:r>
             <a:r>
-              <a:rPr lang="en-US" sz="1500" dirty="0"/>
+              <a:rPr lang="en-US" sz="1400" dirty="0">
+                <a:ea typeface="+mn-lt"/>
+                <a:cs typeface="+mn-lt"/>
+              </a:rPr>
               <a:t>", "</a:t>
             </a:r>
             <a:r>
-              <a:rPr lang="en-US" sz="1500" noProof="1"/>
+              <a:rPr lang="en-US" sz="1400" dirty="0" err="1">
+                <a:ea typeface="+mn-lt"/>
+                <a:cs typeface="+mn-lt"/>
+              </a:rPr>
               <a:t>pAskPx</a:t>
             </a:r>
             <a:r>
-              <a:rPr lang="en-US" sz="1500" dirty="0"/>
+              <a:rPr lang="en-US" sz="1400" dirty="0">
+                <a:ea typeface="+mn-lt"/>
+                <a:cs typeface="+mn-lt"/>
+              </a:rPr>
               <a:t>" and "</a:t>
             </a:r>
             <a:r>
-              <a:rPr lang="en-US" sz="1500" noProof="1"/>
+              <a:rPr lang="en-US" sz="1400" dirty="0" err="1">
+                <a:ea typeface="+mn-lt"/>
+                <a:cs typeface="+mn-lt"/>
+              </a:rPr>
               <a:t>putDelta</a:t>
             </a:r>
             <a:r>
-              <a:rPr lang="en-US" sz="1500" dirty="0"/>
+              <a:rPr lang="en-US" sz="1400" dirty="0">
+                <a:ea typeface="+mn-lt"/>
+                <a:cs typeface="+mn-lt"/>
+              </a:rPr>
               <a:t>"</a:t>
             </a:r>
-          </a:p>
-          <a:p>
-            <a:pPr marL="0" indent="0">
-              <a:buNone/>
-            </a:pPr>
-            <a:r>
-              <a:rPr lang="en-US" sz="1500" dirty="0"/>
+            <a:endParaRPr lang="en-US" sz="2400" dirty="0"/>
+          </a:p>
+          <a:p>
+            <a:pPr marL="0" indent="0">
+              <a:buNone/>
+            </a:pPr>
+            <a:r>
+              <a:rPr lang="en-US" sz="1400" dirty="0"/>
               <a:t>6. Open terminal and run these command:</a:t>
             </a:r>
           </a:p>
@@ -9484,29 +9543,29 @@
               <a:buNone/>
             </a:pPr>
             <a:r>
-              <a:rPr lang="en-US" sz="1500" dirty="0"/>
+              <a:rPr lang="en-US" sz="1400" dirty="0"/>
               <a:t>   pip install </a:t>
             </a:r>
             <a:r>
-              <a:rPr lang="en-US" sz="1500" noProof="1"/>
+              <a:rPr lang="en-US" sz="1400" noProof="1"/>
               <a:t>yfinance</a:t>
             </a:r>
-            <a:endParaRPr lang="en-US" sz="1500" dirty="0"/>
-          </a:p>
-          <a:p>
-            <a:pPr marL="0" indent="0">
-              <a:buNone/>
-            </a:pPr>
-            <a:r>
-              <a:rPr lang="en-US" sz="1500" dirty="0"/>
+            <a:endParaRPr lang="en-US" sz="1400" dirty="0"/>
+          </a:p>
+          <a:p>
+            <a:pPr marL="0" indent="0">
+              <a:buNone/>
+            </a:pPr>
+            <a:r>
+              <a:rPr lang="en-US" sz="1400" dirty="0"/>
               <a:t>   git config --global </a:t>
             </a:r>
             <a:r>
-              <a:rPr lang="en-US" sz="1500" noProof="1"/>
+              <a:rPr lang="en-US" sz="1400" noProof="1"/>
               <a:t>user.email </a:t>
             </a:r>
             <a:r>
-              <a:rPr lang="en-US" sz="1500" dirty="0"/>
+              <a:rPr lang="en-US" sz="1400" dirty="0"/>
               <a:t>"etayluz@gmail.com"</a:t>
             </a:r>
           </a:p>
@@ -9515,15 +9574,15 @@
               <a:buNone/>
             </a:pPr>
             <a:r>
-              <a:rPr lang="en-US" sz="1500" dirty="0"/>
+              <a:rPr lang="en-US" sz="1400" dirty="0"/>
               <a:t>   git config --global user.name "</a:t>
             </a:r>
             <a:r>
-              <a:rPr lang="en-US" sz="1500" noProof="1"/>
+              <a:rPr lang="en-US" sz="1400" noProof="1"/>
               <a:t>Etay</a:t>
             </a:r>
             <a:r>
-              <a:rPr lang="en-US" sz="1500" dirty="0"/>
+              <a:rPr lang="en-US" sz="1400" dirty="0"/>
               <a:t> Luz"</a:t>
             </a:r>
           </a:p>
@@ -9532,7 +9591,7 @@
               <a:buNone/>
             </a:pPr>
             <a:r>
-              <a:rPr lang="en-US" sz="1500" dirty="0"/>
+              <a:rPr lang="en-US" sz="1400" dirty="0"/>
               <a:t>7. Run yahoo.py (download csv files from Yahoo.com to c:\option_trading\ticker_data\AAPL.csv)</a:t>
             </a:r>
           </a:p>
@@ -9541,15 +9600,15 @@
               <a:buNone/>
             </a:pPr>
             <a:r>
-              <a:rPr lang="en-US" sz="1500" dirty="0"/>
+              <a:rPr lang="en-US" sz="1400" dirty="0"/>
               <a:t>8. Run get_stock_history.py (</a:t>
             </a:r>
             <a:r>
-              <a:rPr lang="en-US" sz="1500" noProof="1"/>
+              <a:rPr lang="en-US" sz="1400" noProof="1"/>
               <a:t>ticker_data</a:t>
             </a:r>
             <a:r>
-              <a:rPr lang="en-US" sz="1500" dirty="0"/>
+              <a:rPr lang="en-US" sz="1400" dirty="0"/>
               <a:t>\ --&gt; c:\option_trading\stock_history.json)</a:t>
             </a:r>
           </a:p>
@@ -9558,15 +9617,15 @@
               <a:buNone/>
             </a:pPr>
             <a:r>
-              <a:rPr lang="en-US" sz="1500" dirty="0"/>
+              <a:rPr lang="en-US" sz="1400" dirty="0"/>
               <a:t>9. Check visually the rules in </a:t>
             </a:r>
             <a:r>
-              <a:rPr lang="en-US" sz="1500" noProof="1"/>
+              <a:rPr lang="en-US" sz="1400" noProof="1"/>
               <a:t>rules.json</a:t>
             </a:r>
             <a:r>
-              <a:rPr lang="en-US" sz="1500" dirty="0"/>
+              <a:rPr lang="en-US" sz="1400" dirty="0"/>
               <a:t>, validate that you are happy</a:t>
             </a:r>
           </a:p>
@@ -9575,7 +9634,7 @@
               <a:buNone/>
             </a:pPr>
             <a:r>
-              <a:rPr lang="en-US" sz="1500" dirty="0"/>
+              <a:rPr lang="en-US" sz="1400" dirty="0"/>
               <a:t>10. Run sumulate_yuda.py</a:t>
             </a:r>
           </a:p>
@@ -9584,7 +9643,7 @@
               <a:buNone/>
             </a:pPr>
             <a:r>
-              <a:rPr lang="en-US" sz="1500" dirty="0"/>
+              <a:rPr lang="en-US" sz="1400" dirty="0"/>
               <a:t>11. Check the results in the latest log.txt under c:\option_trading\logs </a:t>
             </a:r>
           </a:p>
@@ -9593,15 +9652,15 @@
               <a:buNone/>
             </a:pPr>
             <a:r>
-              <a:rPr lang="en-US" sz="1500" dirty="0"/>
+              <a:rPr lang="en-US" sz="1400" dirty="0"/>
               <a:t>12. Run sim_wraper.py to optimize the rules.</a:t>
             </a:r>
             <a:r>
-              <a:rPr lang="en-US" sz="1500" noProof="1"/>
+              <a:rPr lang="en-US" sz="1400" noProof="1"/>
               <a:t>json</a:t>
             </a:r>
             <a:r>
-              <a:rPr lang="en-US" sz="1500" dirty="0"/>
+              <a:rPr lang="en-US" sz="1400" dirty="0"/>
               <a:t> with better score</a:t>
             </a:r>
           </a:p>

</xml_diff>

<commit_message>
adding split and dividend
</commit_message>
<xml_diff>
--- a/Option Trading.pptx
+++ b/Option Trading.pptx
@@ -13,14 +13,15 @@
     <p:sldId id="263" r:id="rId7"/>
     <p:sldId id="260" r:id="rId8"/>
     <p:sldId id="264" r:id="rId9"/>
-    <p:sldId id="265" r:id="rId10"/>
-    <p:sldId id="266" r:id="rId11"/>
-    <p:sldId id="267" r:id="rId12"/>
-    <p:sldId id="269" r:id="rId13"/>
-    <p:sldId id="270" r:id="rId14"/>
-    <p:sldId id="271" r:id="rId15"/>
-    <p:sldId id="272" r:id="rId16"/>
-    <p:sldId id="273" r:id="rId17"/>
+    <p:sldId id="274" r:id="rId10"/>
+    <p:sldId id="265" r:id="rId11"/>
+    <p:sldId id="266" r:id="rId12"/>
+    <p:sldId id="267" r:id="rId13"/>
+    <p:sldId id="269" r:id="rId14"/>
+    <p:sldId id="270" r:id="rId15"/>
+    <p:sldId id="271" r:id="rId16"/>
+    <p:sldId id="272" r:id="rId17"/>
+    <p:sldId id="273" r:id="rId18"/>
   </p:sldIdLst>
   <p:sldSz cx="12192000" cy="6858000"/>
   <p:notesSz cx="6858000" cy="9144000"/>
@@ -127,14 +128,6 @@
 </p:presentation>
 </file>
 
-<file path=ppt/revisionInfo.xml><?xml version="1.0" encoding="utf-8"?>
-<p1510:revInfo xmlns:a="http://schemas.openxmlformats.org/drawingml/2006/main" xmlns:r="http://schemas.openxmlformats.org/officeDocument/2006/relationships" xmlns:p1510="http://schemas.microsoft.com/office/powerpoint/2015/10/main">
-  <p1510:revLst>
-    <p1510:client id="{12C1B376-859B-4984-B115-72FE76952A3C}" v="25" dt="2025-11-30T00:35:54.665"/>
-  </p1510:revLst>
-</p1510:revInfo>
-</file>
-
 <file path=ppt/slideLayouts/slideLayout1.xml><?xml version="1.0" encoding="utf-8"?>
 <p:sldLayout xmlns:a="http://schemas.openxmlformats.org/drawingml/2006/main" xmlns:r="http://schemas.openxmlformats.org/officeDocument/2006/relationships" xmlns:p="http://schemas.openxmlformats.org/presentationml/2006/main" type="title" preserve="1">
   <p:cSld name="Title Slide">
@@ -282,7 +275,7 @@
           <a:p>
             <a:fld id="{802E63CE-73C2-416C-817A-F7BDE0DDA196}" type="datetimeFigureOut">
               <a:rPr lang="en-US" smtClean="0"/>
-              <a:t>11/29/2025</a:t>
+              <a:t>11/30/2025</a:t>
             </a:fld>
             <a:endParaRPr lang="en-US" dirty="0"/>
           </a:p>
@@ -480,7 +473,7 @@
           <a:p>
             <a:fld id="{802E63CE-73C2-416C-817A-F7BDE0DDA196}" type="datetimeFigureOut">
               <a:rPr lang="en-US" smtClean="0"/>
-              <a:t>11/29/2025</a:t>
+              <a:t>11/30/2025</a:t>
             </a:fld>
             <a:endParaRPr lang="en-US" dirty="0"/>
           </a:p>
@@ -688,7 +681,7 @@
           <a:p>
             <a:fld id="{802E63CE-73C2-416C-817A-F7BDE0DDA196}" type="datetimeFigureOut">
               <a:rPr lang="en-US" smtClean="0"/>
-              <a:t>11/29/2025</a:t>
+              <a:t>11/30/2025</a:t>
             </a:fld>
             <a:endParaRPr lang="en-US" dirty="0"/>
           </a:p>
@@ -886,7 +879,7 @@
           <a:p>
             <a:fld id="{802E63CE-73C2-416C-817A-F7BDE0DDA196}" type="datetimeFigureOut">
               <a:rPr lang="en-US" smtClean="0"/>
-              <a:t>11/29/2025</a:t>
+              <a:t>11/30/2025</a:t>
             </a:fld>
             <a:endParaRPr lang="en-US" dirty="0"/>
           </a:p>
@@ -1161,7 +1154,7 @@
           <a:p>
             <a:fld id="{802E63CE-73C2-416C-817A-F7BDE0DDA196}" type="datetimeFigureOut">
               <a:rPr lang="en-US" smtClean="0"/>
-              <a:t>11/29/2025</a:t>
+              <a:t>11/30/2025</a:t>
             </a:fld>
             <a:endParaRPr lang="en-US" dirty="0"/>
           </a:p>
@@ -1426,7 +1419,7 @@
           <a:p>
             <a:fld id="{802E63CE-73C2-416C-817A-F7BDE0DDA196}" type="datetimeFigureOut">
               <a:rPr lang="en-US" smtClean="0"/>
-              <a:t>11/29/2025</a:t>
+              <a:t>11/30/2025</a:t>
             </a:fld>
             <a:endParaRPr lang="en-US" dirty="0"/>
           </a:p>
@@ -1838,7 +1831,7 @@
           <a:p>
             <a:fld id="{802E63CE-73C2-416C-817A-F7BDE0DDA196}" type="datetimeFigureOut">
               <a:rPr lang="en-US" smtClean="0"/>
-              <a:t>11/29/2025</a:t>
+              <a:t>11/30/2025</a:t>
             </a:fld>
             <a:endParaRPr lang="en-US" dirty="0"/>
           </a:p>
@@ -1979,7 +1972,7 @@
           <a:p>
             <a:fld id="{802E63CE-73C2-416C-817A-F7BDE0DDA196}" type="datetimeFigureOut">
               <a:rPr lang="en-US" smtClean="0"/>
-              <a:t>11/29/2025</a:t>
+              <a:t>11/30/2025</a:t>
             </a:fld>
             <a:endParaRPr lang="en-US" dirty="0"/>
           </a:p>
@@ -2092,7 +2085,7 @@
           <a:p>
             <a:fld id="{802E63CE-73C2-416C-817A-F7BDE0DDA196}" type="datetimeFigureOut">
               <a:rPr lang="en-US" smtClean="0"/>
-              <a:t>11/29/2025</a:t>
+              <a:t>11/30/2025</a:t>
             </a:fld>
             <a:endParaRPr lang="en-US" dirty="0"/>
           </a:p>
@@ -2403,7 +2396,7 @@
           <a:p>
             <a:fld id="{802E63CE-73C2-416C-817A-F7BDE0DDA196}" type="datetimeFigureOut">
               <a:rPr lang="en-US" smtClean="0"/>
-              <a:t>11/29/2025</a:t>
+              <a:t>11/30/2025</a:t>
             </a:fld>
             <a:endParaRPr lang="en-US" dirty="0"/>
           </a:p>
@@ -2691,7 +2684,7 @@
           <a:p>
             <a:fld id="{802E63CE-73C2-416C-817A-F7BDE0DDA196}" type="datetimeFigureOut">
               <a:rPr lang="en-US" smtClean="0"/>
-              <a:t>11/29/2025</a:t>
+              <a:t>11/30/2025</a:t>
             </a:fld>
             <a:endParaRPr lang="en-US" dirty="0"/>
           </a:p>
@@ -2932,7 +2925,7 @@
           <a:p>
             <a:fld id="{802E63CE-73C2-416C-817A-F7BDE0DDA196}" type="datetimeFigureOut">
               <a:rPr lang="en-US" smtClean="0"/>
-              <a:t>11/29/2025</a:t>
+              <a:t>11/30/2025</a:t>
             </a:fld>
             <a:endParaRPr lang="en-US" dirty="0"/>
           </a:p>
@@ -3473,6 +3466,192 @@
         <p:cNvPr id="1" name="">
           <a:extLst>
             <a:ext uri="{FF2B5EF4-FFF2-40B4-BE49-F238E27FC236}">
+              <a16:creationId xmlns:a16="http://schemas.microsoft.com/office/drawing/2014/main" id="{08CE4BA8-60AB-CDC9-BCD5-3A0C04046C4C}"/>
+            </a:ext>
+          </a:extLst>
+        </p:cNvPr>
+        <p:cNvGrpSpPr/>
+        <p:nvPr/>
+      </p:nvGrpSpPr>
+      <p:grpSpPr>
+        <a:xfrm>
+          <a:off x="0" y="0"/>
+          <a:ext cx="0" cy="0"/>
+          <a:chOff x="0" y="0"/>
+          <a:chExt cx="0" cy="0"/>
+        </a:xfrm>
+      </p:grpSpPr>
+      <p:sp>
+        <p:nvSpPr>
+          <p:cNvPr id="2" name="Title 1">
+            <a:extLst>
+              <a:ext uri="{FF2B5EF4-FFF2-40B4-BE49-F238E27FC236}">
+                <a16:creationId xmlns:a16="http://schemas.microsoft.com/office/drawing/2014/main" id="{2BBB0F7D-1FB7-5B10-EAA1-2A84C25E16DF}"/>
+              </a:ext>
+            </a:extLst>
+          </p:cNvPr>
+          <p:cNvSpPr>
+            <a:spLocks noGrp="1"/>
+          </p:cNvSpPr>
+          <p:nvPr>
+            <p:ph type="title"/>
+          </p:nvPr>
+        </p:nvSpPr>
+        <p:spPr>
+          <a:xfrm>
+            <a:off x="358365" y="171245"/>
+            <a:ext cx="10515600" cy="469735"/>
+          </a:xfrm>
+        </p:spPr>
+        <p:txBody>
+          <a:bodyPr>
+            <a:normAutofit fontScale="90000"/>
+          </a:bodyPr>
+          <a:lstStyle/>
+          <a:p>
+            <a:r>
+              <a:rPr lang="en-US" b="1" noProof="1">
+                <a:solidFill>
+                  <a:srgbClr val="002060"/>
+                </a:solidFill>
+              </a:rPr>
+              <a:t>Stock_history.json</a:t>
+            </a:r>
+            <a:endParaRPr lang="en-US" b="1" dirty="0">
+              <a:solidFill>
+                <a:srgbClr val="002060"/>
+              </a:solidFill>
+            </a:endParaRPr>
+          </a:p>
+        </p:txBody>
+      </p:sp>
+      <p:sp>
+        <p:nvSpPr>
+          <p:cNvPr id="3" name="Content Placeholder 2">
+            <a:extLst>
+              <a:ext uri="{FF2B5EF4-FFF2-40B4-BE49-F238E27FC236}">
+                <a16:creationId xmlns:a16="http://schemas.microsoft.com/office/drawing/2014/main" id="{19B84ECA-0EB5-40AC-D0F9-1A6EEE3E7588}"/>
+              </a:ext>
+            </a:extLst>
+          </p:cNvPr>
+          <p:cNvSpPr>
+            <a:spLocks noGrp="1"/>
+          </p:cNvSpPr>
+          <p:nvPr>
+            <p:ph idx="1"/>
+          </p:nvPr>
+        </p:nvSpPr>
+        <p:spPr>
+          <a:xfrm>
+            <a:off x="358365" y="805759"/>
+            <a:ext cx="11574102" cy="5880996"/>
+          </a:xfrm>
+        </p:spPr>
+        <p:txBody>
+          <a:bodyPr wrap="square">
+            <a:noAutofit/>
+          </a:bodyPr>
+          <a:lstStyle/>
+          <a:p>
+            <a:r>
+              <a:rPr lang="en-US" sz="1600" dirty="0"/>
+              <a:t>This file is 1.6 </a:t>
+            </a:r>
+            <a:r>
+              <a:rPr lang="en-US" sz="1600" noProof="1"/>
+              <a:t>Gbyte</a:t>
+            </a:r>
+            <a:r>
+              <a:rPr lang="en-US" sz="1600" dirty="0"/>
+              <a:t> in size. </a:t>
+            </a:r>
+          </a:p>
+          <a:p>
+            <a:r>
+              <a:rPr lang="en-US" sz="1600" dirty="0"/>
+              <a:t>It is created by:</a:t>
+            </a:r>
+            <a:br>
+              <a:rPr lang="en-US" sz="1600" dirty="0"/>
+            </a:br>
+            <a:r>
+              <a:rPr lang="en-US" sz="1600" dirty="0"/>
+              <a:t>7.  Run yahoo.py (download csv files from Yahoo.com to c:\option_trading\ticker_data\AAPL.csv)</a:t>
+            </a:r>
+            <a:br>
+              <a:rPr lang="en-US" sz="1600" dirty="0"/>
+            </a:br>
+            <a:r>
+              <a:rPr lang="en-US" sz="1600" dirty="0"/>
+              <a:t>8.  Run get_stock_history.py (</a:t>
+            </a:r>
+            <a:r>
+              <a:rPr lang="en-US" sz="1600" noProof="1"/>
+              <a:t>ticker_data</a:t>
+            </a:r>
+            <a:r>
+              <a:rPr lang="en-US" sz="1600" dirty="0"/>
+              <a:t>\ --&gt; c:\option_trading\stock_history.json)</a:t>
+            </a:r>
+          </a:p>
+          <a:p>
+            <a:r>
+              <a:rPr lang="en-US" sz="1600" dirty="0"/>
+              <a:t>The simulator reads this file once, at the very beginning. </a:t>
+            </a:r>
+          </a:p>
+          <a:p>
+            <a:r>
+              <a:rPr lang="en-US" sz="1600" dirty="0"/>
+              <a:t>This file includes all the history of the stocks and ETF, but no put option data.</a:t>
+            </a:r>
+          </a:p>
+          <a:p>
+            <a:r>
+              <a:rPr lang="en-US" sz="1600" dirty="0"/>
+              <a:t>The list of the stocks + etfs per day is defined in SP500_history.csv from 1/3/2007 until 7/9/25</a:t>
+            </a:r>
+          </a:p>
+          <a:p>
+            <a:r>
+              <a:rPr lang="en-US" sz="3600" b="1" dirty="0">
+                <a:solidFill>
+                  <a:srgbClr val="C00000"/>
+                </a:solidFill>
+              </a:rPr>
+              <a:t>If new simulation is required, this file must be updated with new dates</a:t>
+            </a:r>
+            <a:br>
+              <a:rPr lang="en-US" sz="1600" dirty="0"/>
+            </a:br>
+            <a:endParaRPr lang="en-US" sz="1600" dirty="0"/>
+          </a:p>
+          <a:p>
+            <a:endParaRPr lang="en-US" sz="1600" dirty="0"/>
+          </a:p>
+        </p:txBody>
+      </p:sp>
+    </p:spTree>
+    <p:extLst>
+      <p:ext uri="{BB962C8B-B14F-4D97-AF65-F5344CB8AC3E}">
+        <p14:creationId xmlns:p14="http://schemas.microsoft.com/office/powerpoint/2010/main" val="1220474982"/>
+      </p:ext>
+    </p:extLst>
+  </p:cSld>
+  <p:clrMapOvr>
+    <a:masterClrMapping/>
+  </p:clrMapOvr>
+</p:sld>
+</file>
+
+<file path=ppt/slides/slide11.xml><?xml version="1.0" encoding="utf-8"?>
+<p:sld xmlns:a="http://schemas.openxmlformats.org/drawingml/2006/main" xmlns:r="http://schemas.openxmlformats.org/officeDocument/2006/relationships" xmlns:p="http://schemas.openxmlformats.org/presentationml/2006/main">
+  <p:cSld>
+    <p:spTree>
+      <p:nvGrpSpPr>
+        <p:cNvPr id="1" name="">
+          <a:extLst>
+            <a:ext uri="{FF2B5EF4-FFF2-40B4-BE49-F238E27FC236}">
               <a16:creationId xmlns:a16="http://schemas.microsoft.com/office/drawing/2014/main" id="{26C3FBB4-ED80-23D3-A9D7-1A5E39FFB8FB}"/>
             </a:ext>
           </a:extLst>
@@ -4759,7 +4938,7 @@
 </p:sld>
 </file>
 
-<file path=ppt/slides/slide11.xml><?xml version="1.0" encoding="utf-8"?>
+<file path=ppt/slides/slide12.xml><?xml version="1.0" encoding="utf-8"?>
 <p:sld xmlns:a="http://schemas.openxmlformats.org/drawingml/2006/main" xmlns:r="http://schemas.openxmlformats.org/officeDocument/2006/relationships" xmlns:p="http://schemas.openxmlformats.org/presentationml/2006/main">
   <p:cSld>
     <p:spTree>
@@ -4908,7 +5087,7 @@
 </p:sld>
 </file>
 
-<file path=ppt/slides/slide12.xml><?xml version="1.0" encoding="utf-8"?>
+<file path=ppt/slides/slide13.xml><?xml version="1.0" encoding="utf-8"?>
 <p:sld xmlns:a="http://schemas.openxmlformats.org/drawingml/2006/main" xmlns:r="http://schemas.openxmlformats.org/officeDocument/2006/relationships" xmlns:p="http://schemas.openxmlformats.org/presentationml/2006/main">
   <p:cSld>
     <p:spTree>
@@ -5062,7 +5241,7 @@
 </p:sld>
 </file>
 
-<file path=ppt/slides/slide13.xml><?xml version="1.0" encoding="utf-8"?>
+<file path=ppt/slides/slide14.xml><?xml version="1.0" encoding="utf-8"?>
 <p:sld xmlns:a="http://schemas.openxmlformats.org/drawingml/2006/main" xmlns:r="http://schemas.openxmlformats.org/officeDocument/2006/relationships" xmlns:p="http://schemas.openxmlformats.org/presentationml/2006/main">
   <p:cSld>
     <p:spTree>
@@ -5477,7 +5656,7 @@
 </p:sld>
 </file>
 
-<file path=ppt/slides/slide14.xml><?xml version="1.0" encoding="utf-8"?>
+<file path=ppt/slides/slide15.xml><?xml version="1.0" encoding="utf-8"?>
 <p:sld xmlns:a="http://schemas.openxmlformats.org/drawingml/2006/main" xmlns:r="http://schemas.openxmlformats.org/officeDocument/2006/relationships" xmlns:p="http://schemas.openxmlformats.org/presentationml/2006/main">
   <p:cSld>
     <p:spTree>
@@ -5769,7 +5948,7 @@
 </p:sld>
 </file>
 
-<file path=ppt/slides/slide15.xml><?xml version="1.0" encoding="utf-8"?>
+<file path=ppt/slides/slide16.xml><?xml version="1.0" encoding="utf-8"?>
 <p:sld xmlns:a="http://schemas.openxmlformats.org/drawingml/2006/main" xmlns:r="http://schemas.openxmlformats.org/officeDocument/2006/relationships" xmlns:p="http://schemas.openxmlformats.org/presentationml/2006/main">
   <p:cSld>
     <p:spTree>
@@ -7265,7 +7444,7 @@
 </p:sld>
 </file>
 
-<file path=ppt/slides/slide16.xml><?xml version="1.0" encoding="utf-8"?>
+<file path=ppt/slides/slide17.xml><?xml version="1.0" encoding="utf-8"?>
 <p:sld xmlns:a="http://schemas.openxmlformats.org/drawingml/2006/main" xmlns:r="http://schemas.openxmlformats.org/officeDocument/2006/relationships" xmlns:p="http://schemas.openxmlformats.org/presentationml/2006/main">
   <p:cSld>
     <p:spTree>
@@ -9417,7 +9596,7 @@
               <a:t>FileZila</a:t>
             </a:r>
             <a:r>
-              <a:rPr lang="en-US" sz="1400"/>
+              <a:rPr lang="en-US" sz="1400" dirty="0"/>
               <a:t> to download ORATS zip files 2007 - 2025 to c:\option_trading\ORATS_zip </a:t>
             </a:r>
           </a:p>
@@ -10390,7 +10569,7 @@
         <p:cNvPr id="1" name="">
           <a:extLst>
             <a:ext uri="{FF2B5EF4-FFF2-40B4-BE49-F238E27FC236}">
-              <a16:creationId xmlns:a16="http://schemas.microsoft.com/office/drawing/2014/main" id="{08CE4BA8-60AB-CDC9-BCD5-3A0C04046C4C}"/>
+              <a16:creationId xmlns:a16="http://schemas.microsoft.com/office/drawing/2014/main" id="{FB7BE74D-8BC3-B3BE-8888-C8C9C9A9DA20}"/>
             </a:ext>
           </a:extLst>
         </p:cNvPr>
@@ -10410,7 +10589,7 @@
           <p:cNvPr id="2" name="Title 1">
             <a:extLst>
               <a:ext uri="{FF2B5EF4-FFF2-40B4-BE49-F238E27FC236}">
-                <a16:creationId xmlns:a16="http://schemas.microsoft.com/office/drawing/2014/main" id="{2BBB0F7D-1FB7-5B10-EAA1-2A84C25E16DF}"/>
+                <a16:creationId xmlns:a16="http://schemas.microsoft.com/office/drawing/2014/main" id="{68F64305-0400-0D12-115E-801A35446372}"/>
               </a:ext>
             </a:extLst>
           </p:cNvPr>
@@ -10439,7 +10618,7 @@
                   <a:srgbClr val="002060"/>
                 </a:solidFill>
               </a:rPr>
-              <a:t>Stock_history.json</a:t>
+              <a:t>Yahoo.py</a:t>
             </a:r>
             <a:endParaRPr lang="en-US" b="1" dirty="0">
               <a:solidFill>
@@ -10454,7 +10633,7 @@
           <p:cNvPr id="3" name="Content Placeholder 2">
             <a:extLst>
               <a:ext uri="{FF2B5EF4-FFF2-40B4-BE49-F238E27FC236}">
-                <a16:creationId xmlns:a16="http://schemas.microsoft.com/office/drawing/2014/main" id="{19B84ECA-0EB5-40AC-D0F9-1A6EEE3E7588}"/>
+                <a16:creationId xmlns:a16="http://schemas.microsoft.com/office/drawing/2014/main" id="{53A80BE7-F916-DF03-A2D3-BF18C186CC38}"/>
               </a:ext>
             </a:extLst>
           </p:cNvPr>
@@ -10467,84 +10646,262 @@
         </p:nvSpPr>
         <p:spPr>
           <a:xfrm>
-            <a:off x="358365" y="805759"/>
-            <a:ext cx="11574102" cy="5880996"/>
+            <a:off x="358364" y="805759"/>
+            <a:ext cx="11528835" cy="5880996"/>
           </a:xfrm>
         </p:spPr>
         <p:txBody>
-          <a:bodyPr wrap="square">
+          <a:bodyPr wrap="none">
             <a:noAutofit/>
           </a:bodyPr>
           <a:lstStyle/>
           <a:p>
             <a:r>
               <a:rPr lang="en-US" sz="1600" dirty="0"/>
-              <a:t>This file is 1.6 </a:t>
-            </a:r>
-            <a:r>
-              <a:rPr lang="en-US" sz="1600" noProof="1"/>
-              <a:t>Gbyte</a:t>
-            </a:r>
+              <a:t>Run yahoo.py (download csv files from Yahoo.com to c:\option_trading\ticker_data\TQQQ.csv)</a:t>
+            </a:r>
+          </a:p>
+          <a:p>
             <a:r>
               <a:rPr lang="en-US" sz="1600" dirty="0"/>
-              <a:t> in size. </a:t>
-            </a:r>
-          </a:p>
-          <a:p>
-            <a:r>
-              <a:rPr lang="en-US" sz="1600" dirty="0"/>
-              <a:t>It is created by:</a:t>
+              <a:t>Yahoo Finance original format includes</a:t>
             </a:r>
             <a:br>
               <a:rPr lang="en-US" sz="1600" dirty="0"/>
             </a:br>
             <a:r>
               <a:rPr lang="en-US" sz="1600" dirty="0"/>
-              <a:t>7.  Run yahoo.py (download csv files from Yahoo.com to c:\option_trading\ticker_data\AAPL.csv)</a:t>
+              <a:t>splits:</a:t>
+            </a:r>
+          </a:p>
+          <a:p>
+            <a:r>
+              <a:rPr lang="en-US" sz="1600" dirty="0"/>
+              <a:t>Their close is our Adjusted Close (AC)</a:t>
+            </a:r>
+          </a:p>
+          <a:p>
+            <a:r>
+              <a:rPr lang="en-US" sz="1600" dirty="0"/>
+              <a:t>To find the split impact on the unadjusted close (UAC), on the split day recalculate the unadjusted close of all the prior dates:</a:t>
             </a:r>
             <a:br>
               <a:rPr lang="en-US" sz="1600" dirty="0"/>
             </a:br>
             <a:r>
               <a:rPr lang="en-US" sz="1600" dirty="0"/>
-              <a:t>8.  Run get_stock_history.py (</a:t>
-            </a:r>
+              <a:t>UAC</a:t>
+            </a:r>
+            <a:r>
+              <a:rPr lang="en-US" sz="1600" i="1" dirty="0"/>
+              <a:t>(</a:t>
+            </a:r>
+            <a:r>
+              <a:rPr lang="en-US" sz="1600" i="1" dirty="0">
+                <a:latin typeface="Arial" panose="020B0604020202020204" pitchFamily="34" charset="0"/>
+                <a:cs typeface="Arial" panose="020B0604020202020204" pitchFamily="34" charset="0"/>
+              </a:rPr>
+              <a:t>d</a:t>
+            </a:r>
+            <a:r>
+              <a:rPr lang="en-US" sz="1600" i="1" dirty="0"/>
+              <a:t>) </a:t>
+            </a:r>
+            <a:r>
+              <a:rPr lang="en-US" sz="1600" dirty="0"/>
+              <a:t>= AC x 2 where 2 is the split ratio, and </a:t>
+            </a:r>
+            <a:r>
+              <a:rPr lang="en-US" sz="1600" i="1" dirty="0"/>
+              <a:t>(</a:t>
+            </a:r>
+            <a:r>
+              <a:rPr lang="en-US" sz="1600" i="1" dirty="0">
+                <a:latin typeface="Arial" panose="020B0604020202020204" pitchFamily="34" charset="0"/>
+                <a:cs typeface="Arial" panose="020B0604020202020204" pitchFamily="34" charset="0"/>
+              </a:rPr>
+              <a:t>d</a:t>
+            </a:r>
+            <a:r>
+              <a:rPr lang="en-US" sz="1600" i="1" dirty="0"/>
+              <a:t>)</a:t>
+            </a:r>
+            <a:r>
+              <a:rPr lang="en-US" sz="1600" dirty="0"/>
+              <a:t> is any date prior to the split date.</a:t>
+            </a:r>
+          </a:p>
+          <a:p>
+            <a:endParaRPr lang="en-US" sz="1600" dirty="0"/>
+          </a:p>
+          <a:p>
+            <a:r>
+              <a:rPr lang="en-US" sz="1600" dirty="0"/>
+              <a:t>Yahoo also provides “$ Dividends”:</a:t>
+            </a:r>
+          </a:p>
+          <a:p>
+            <a:endParaRPr lang="en-US" sz="1600" dirty="0"/>
+          </a:p>
+          <a:p>
+            <a:r>
+              <a:rPr lang="en-US" sz="1600" dirty="0"/>
+              <a:t>To find the impact of the </a:t>
+            </a:r>
+            <a:r>
+              <a:rPr lang="en-US" sz="1600"/>
+              <a:t>dividend on the </a:t>
+            </a:r>
+            <a:r>
+              <a:rPr lang="en-US" sz="1600" dirty="0"/>
+              <a:t>unadjusted close (UAC), on the dividend day recalculate the unadjusted close of all the prior dates:</a:t>
+            </a:r>
+            <a:br>
+              <a:rPr lang="en-US" sz="1600" dirty="0"/>
+            </a:br>
             <a:r>
               <a:rPr lang="en-US" sz="1600" noProof="1"/>
-              <a:t>ticker_data</a:t>
-            </a:r>
-            <a:r>
+              <a:t>DivRatio = (Close_price_before_dividend - Dividend_amount) / Close_price_before_dividend.</a:t>
+            </a:r>
+            <a:br>
+              <a:rPr lang="en-US" sz="1600" noProof="1"/>
+            </a:br>
+            <a:r>
+              <a:rPr lang="en-US" sz="1600" noProof="1"/>
+              <a:t>= (51.256 – 0.049) / 51.256 = 0.999044.</a:t>
+            </a:r>
+            <a:br>
               <a:rPr lang="en-US" sz="1600" dirty="0"/>
-              <a:t>\ --&gt; c:\option_trading\stock_history.json)</a:t>
-            </a:r>
-          </a:p>
-          <a:p>
+            </a:br>
             <a:r>
               <a:rPr lang="en-US" sz="1600" dirty="0"/>
-              <a:t>The simulator reads this file once, at the very beginning. </a:t>
-            </a:r>
-          </a:p>
-          <a:p>
+              <a:t>UAC</a:t>
+            </a:r>
+            <a:r>
+              <a:rPr lang="en-US" sz="1600" i="1" dirty="0"/>
+              <a:t>(</a:t>
+            </a:r>
+            <a:r>
+              <a:rPr lang="en-US" sz="1600" i="1" dirty="0">
+                <a:latin typeface="Arial" panose="020B0604020202020204" pitchFamily="34" charset="0"/>
+                <a:cs typeface="Arial" panose="020B0604020202020204" pitchFamily="34" charset="0"/>
+              </a:rPr>
+              <a:t>d</a:t>
+            </a:r>
+            <a:r>
+              <a:rPr lang="en-US" sz="1600" i="1" dirty="0"/>
+              <a:t>)</a:t>
+            </a:r>
             <a:r>
               <a:rPr lang="en-US" sz="1600" dirty="0"/>
-              <a:t>This file includes all the history of the stocks and ETF, but no put option data.</a:t>
-            </a:r>
-          </a:p>
-          <a:p>
+              <a:t> = AC / </a:t>
+            </a:r>
+            <a:r>
+              <a:rPr lang="en-US" sz="1600" noProof="1"/>
+              <a:t>DivRatio</a:t>
+            </a:r>
             <a:r>
               <a:rPr lang="en-US" sz="1600" dirty="0"/>
-              <a:t>The list of the stocks + etfs per day is defined in SP500_history.csv from 1/3/2007 until 7/9/25</a:t>
-            </a:r>
-          </a:p>
-          <a:p>
-            <a:r>
-              <a:rPr lang="en-US" sz="3600" b="1" dirty="0">
-                <a:solidFill>
-                  <a:srgbClr val="C00000"/>
-                </a:solidFill>
-              </a:rPr>
-              <a:t>If new simulation is required, this file must be updated with new dates</a:t>
-            </a:r>
+              <a:t> where </a:t>
+            </a:r>
+            <a:r>
+              <a:rPr lang="en-US" sz="1600" noProof="1"/>
+              <a:t>DivRatio</a:t>
+            </a:r>
+            <a:r>
+              <a:rPr lang="en-US" sz="1600" dirty="0"/>
+              <a:t> is the dividend ratio, and </a:t>
+            </a:r>
+            <a:r>
+              <a:rPr lang="en-US" sz="1600" i="1" dirty="0"/>
+              <a:t>(</a:t>
+            </a:r>
+            <a:r>
+              <a:rPr lang="en-US" sz="1600" i="1" dirty="0">
+                <a:latin typeface="Arial" panose="020B0604020202020204" pitchFamily="34" charset="0"/>
+                <a:cs typeface="Arial" panose="020B0604020202020204" pitchFamily="34" charset="0"/>
+              </a:rPr>
+              <a:t>d</a:t>
+            </a:r>
+            <a:r>
+              <a:rPr lang="en-US" sz="1600" i="1" dirty="0"/>
+              <a:t>)</a:t>
+            </a:r>
+            <a:r>
+              <a:rPr lang="en-US" sz="1600" dirty="0"/>
+              <a:t> is any date prior to the dividend date.</a:t>
+            </a:r>
+            <a:br>
+              <a:rPr lang="en-US" sz="1600" dirty="0"/>
+            </a:br>
+            <a:r>
+              <a:rPr lang="en-US" sz="1600" dirty="0"/>
+              <a:t>If later, at 11/20/2025, the 2:1 split will change the UAC</a:t>
+            </a:r>
+            <a:r>
+              <a:rPr lang="en-US" sz="1600" i="1" dirty="0"/>
+              <a:t>(</a:t>
+            </a:r>
+            <a:r>
+              <a:rPr lang="en-US" sz="1600" i="1" dirty="0">
+                <a:latin typeface="Arial" panose="020B0604020202020204" pitchFamily="34" charset="0"/>
+                <a:cs typeface="Arial" panose="020B0604020202020204" pitchFamily="34" charset="0"/>
+              </a:rPr>
+              <a:t>d</a:t>
+            </a:r>
+            <a:r>
+              <a:rPr lang="en-US" sz="1600" i="1" dirty="0"/>
+              <a:t>)</a:t>
+            </a:r>
+            <a:r>
+              <a:rPr lang="en-US" sz="1600" dirty="0"/>
+              <a:t>  again.</a:t>
+            </a:r>
+          </a:p>
+          <a:p>
+            <a:r>
+              <a:rPr lang="en-US" sz="1600" dirty="0"/>
+              <a:t>The resulted TQQQ.csv will be:</a:t>
+            </a:r>
+            <a:br>
+              <a:rPr lang="en-US" sz="1600" dirty="0"/>
+            </a:br>
+            <a:r>
+              <a:rPr lang="en-US" sz="1600" dirty="0"/>
+              <a:t>Notice that the Close above:</a:t>
+            </a:r>
+            <a:br>
+              <a:rPr lang="en-US" sz="1600" dirty="0"/>
+            </a:br>
+            <a:r>
+              <a:rPr lang="en-US" sz="1600" dirty="0"/>
+              <a:t>(50.025, 46.45, 47.48)</a:t>
+            </a:r>
+            <a:br>
+              <a:rPr lang="en-US" sz="1600" dirty="0"/>
+            </a:br>
+            <a:r>
+              <a:rPr lang="en-US" sz="1600" dirty="0"/>
+              <a:t>Is saved as </a:t>
+            </a:r>
+            <a:r>
+              <a:rPr lang="en-US" sz="1600" noProof="1"/>
+              <a:t>Adj_Close</a:t>
+            </a:r>
+            <a:r>
+              <a:rPr lang="en-US" sz="1600" dirty="0"/>
+              <a:t>:</a:t>
+            </a:r>
+            <a:br>
+              <a:rPr lang="en-US" sz="1600" dirty="0"/>
+            </a:br>
+            <a:r>
+              <a:rPr lang="en-US" sz="1600" dirty="0"/>
+              <a:t> </a:t>
+            </a:r>
+            <a:br>
+              <a:rPr lang="en-US" sz="1600" dirty="0"/>
+            </a:br>
             <a:br>
               <a:rPr lang="en-US" sz="1600" dirty="0"/>
             </a:br>
@@ -10555,10 +10912,3716 @@
           </a:p>
         </p:txBody>
       </p:sp>
+      <p:graphicFrame>
+        <p:nvGraphicFramePr>
+          <p:cNvPr id="4" name="Table 3">
+            <a:extLst>
+              <a:ext uri="{FF2B5EF4-FFF2-40B4-BE49-F238E27FC236}">
+                <a16:creationId xmlns:a16="http://schemas.microsoft.com/office/drawing/2014/main" id="{79FDFA99-C6EB-778D-1F21-6BF59DCF92FD}"/>
+              </a:ext>
+            </a:extLst>
+          </p:cNvPr>
+          <p:cNvGraphicFramePr>
+            <a:graphicFrameLocks noGrp="1"/>
+          </p:cNvGraphicFramePr>
+          <p:nvPr>
+            <p:extLst>
+              <p:ext uri="{D42A27DB-BD31-4B8C-83A1-F6EECF244321}">
+                <p14:modId xmlns:p14="http://schemas.microsoft.com/office/powerpoint/2010/main" val="4211641420"/>
+              </p:ext>
+            </p:extLst>
+          </p:nvPr>
+        </p:nvGraphicFramePr>
+        <p:xfrm>
+          <a:off x="4484914" y="1149532"/>
+          <a:ext cx="5974080" cy="721995"/>
+        </p:xfrm>
+        <a:graphic>
+          <a:graphicData uri="http://schemas.openxmlformats.org/drawingml/2006/table">
+            <a:tbl>
+              <a:tblPr>
+                <a:tableStyleId>{5C22544A-7EE6-4342-B048-85BDC9FD1C3A}</a:tableStyleId>
+              </a:tblPr>
+              <a:tblGrid>
+                <a:gridCol w="766355">
+                  <a:extLst>
+                    <a:ext uri="{9D8B030D-6E8A-4147-A177-3AD203B41FA5}">
+                      <a16:colId xmlns:a16="http://schemas.microsoft.com/office/drawing/2014/main" val="2033242664"/>
+                    </a:ext>
+                  </a:extLst>
+                </a:gridCol>
+                <a:gridCol w="768610">
+                  <a:extLst>
+                    <a:ext uri="{9D8B030D-6E8A-4147-A177-3AD203B41FA5}">
+                      <a16:colId xmlns:a16="http://schemas.microsoft.com/office/drawing/2014/main" val="2687220555"/>
+                    </a:ext>
+                  </a:extLst>
+                </a:gridCol>
+                <a:gridCol w="654029">
+                  <a:extLst>
+                    <a:ext uri="{9D8B030D-6E8A-4147-A177-3AD203B41FA5}">
+                      <a16:colId xmlns:a16="http://schemas.microsoft.com/office/drawing/2014/main" val="3112399319"/>
+                    </a:ext>
+                  </a:extLst>
+                </a:gridCol>
+                <a:gridCol w="654029">
+                  <a:extLst>
+                    <a:ext uri="{9D8B030D-6E8A-4147-A177-3AD203B41FA5}">
+                      <a16:colId xmlns:a16="http://schemas.microsoft.com/office/drawing/2014/main" val="4223638450"/>
+                    </a:ext>
+                  </a:extLst>
+                </a:gridCol>
+                <a:gridCol w="654029">
+                  <a:extLst>
+                    <a:ext uri="{9D8B030D-6E8A-4147-A177-3AD203B41FA5}">
+                      <a16:colId xmlns:a16="http://schemas.microsoft.com/office/drawing/2014/main" val="3467624918"/>
+                    </a:ext>
+                  </a:extLst>
+                </a:gridCol>
+                <a:gridCol w="707419">
+                  <a:extLst>
+                    <a:ext uri="{9D8B030D-6E8A-4147-A177-3AD203B41FA5}">
+                      <a16:colId xmlns:a16="http://schemas.microsoft.com/office/drawing/2014/main" val="1532794855"/>
+                    </a:ext>
+                  </a:extLst>
+                </a:gridCol>
+                <a:gridCol w="654029">
+                  <a:extLst>
+                    <a:ext uri="{9D8B030D-6E8A-4147-A177-3AD203B41FA5}">
+                      <a16:colId xmlns:a16="http://schemas.microsoft.com/office/drawing/2014/main" val="4165107490"/>
+                    </a:ext>
+                  </a:extLst>
+                </a:gridCol>
+                <a:gridCol w="1115580">
+                  <a:extLst>
+                    <a:ext uri="{9D8B030D-6E8A-4147-A177-3AD203B41FA5}">
+                      <a16:colId xmlns:a16="http://schemas.microsoft.com/office/drawing/2014/main" val="2289655924"/>
+                    </a:ext>
+                  </a:extLst>
+                </a:gridCol>
+              </a:tblGrid>
+              <a:tr h="190500">
+                <a:tc>
+                  <a:txBody>
+                    <a:bodyPr/>
+                    <a:lstStyle/>
+                    <a:p>
+                      <a:pPr algn="l" fontAlgn="b">
+                        <a:buNone/>
+                      </a:pPr>
+                      <a:r>
+                        <a:rPr lang="en-US" sz="1100" u="none" strike="noStrike">
+                          <a:effectLst/>
+                        </a:rPr>
+                        <a:t>Date</a:t>
+                      </a:r>
+                      <a:endParaRPr lang="en-US" sz="1100" b="0" i="0" u="none" strike="noStrike">
+                        <a:solidFill>
+                          <a:srgbClr val="000000"/>
+                        </a:solidFill>
+                        <a:effectLst/>
+                        <a:latin typeface="Aptos Narrow" panose="020B0004020202020204" pitchFamily="34" charset="0"/>
+                      </a:endParaRPr>
+                    </a:p>
+                  </a:txBody>
+                  <a:tcPr marL="9525" marR="9525" marT="9525" marB="0" anchor="b"/>
+                </a:tc>
+                <a:tc>
+                  <a:txBody>
+                    <a:bodyPr/>
+                    <a:lstStyle/>
+                    <a:p>
+                      <a:pPr algn="l" fontAlgn="b">
+                        <a:buNone/>
+                      </a:pPr>
+                      <a:r>
+                        <a:rPr lang="en-US" sz="1100" u="none" strike="noStrike">
+                          <a:effectLst/>
+                        </a:rPr>
+                        <a:t>Open</a:t>
+                      </a:r>
+                      <a:endParaRPr lang="en-US" sz="1100" b="0" i="0" u="none" strike="noStrike">
+                        <a:solidFill>
+                          <a:srgbClr val="000000"/>
+                        </a:solidFill>
+                        <a:effectLst/>
+                        <a:latin typeface="Aptos Narrow" panose="020B0004020202020204" pitchFamily="34" charset="0"/>
+                      </a:endParaRPr>
+                    </a:p>
+                  </a:txBody>
+                  <a:tcPr marL="9525" marR="9525" marT="9525" marB="0" anchor="b"/>
+                </a:tc>
+                <a:tc>
+                  <a:txBody>
+                    <a:bodyPr/>
+                    <a:lstStyle/>
+                    <a:p>
+                      <a:pPr algn="l" fontAlgn="b">
+                        <a:buNone/>
+                      </a:pPr>
+                      <a:r>
+                        <a:rPr lang="en-US" sz="1100" u="none" strike="noStrike">
+                          <a:effectLst/>
+                        </a:rPr>
+                        <a:t>High</a:t>
+                      </a:r>
+                      <a:endParaRPr lang="en-US" sz="1100" b="0" i="0" u="none" strike="noStrike">
+                        <a:solidFill>
+                          <a:srgbClr val="000000"/>
+                        </a:solidFill>
+                        <a:effectLst/>
+                        <a:latin typeface="Aptos Narrow" panose="020B0004020202020204" pitchFamily="34" charset="0"/>
+                      </a:endParaRPr>
+                    </a:p>
+                  </a:txBody>
+                  <a:tcPr marL="9525" marR="9525" marT="9525" marB="0" anchor="b"/>
+                </a:tc>
+                <a:tc>
+                  <a:txBody>
+                    <a:bodyPr/>
+                    <a:lstStyle/>
+                    <a:p>
+                      <a:pPr algn="l" fontAlgn="b">
+                        <a:buNone/>
+                      </a:pPr>
+                      <a:r>
+                        <a:rPr lang="en-US" sz="1100" u="none" strike="noStrike">
+                          <a:effectLst/>
+                        </a:rPr>
+                        <a:t>Low</a:t>
+                      </a:r>
+                      <a:endParaRPr lang="en-US" sz="1100" b="0" i="0" u="none" strike="noStrike">
+                        <a:solidFill>
+                          <a:srgbClr val="000000"/>
+                        </a:solidFill>
+                        <a:effectLst/>
+                        <a:latin typeface="Aptos Narrow" panose="020B0004020202020204" pitchFamily="34" charset="0"/>
+                      </a:endParaRPr>
+                    </a:p>
+                  </a:txBody>
+                  <a:tcPr marL="9525" marR="9525" marT="9525" marB="0" anchor="b"/>
+                </a:tc>
+                <a:tc>
+                  <a:txBody>
+                    <a:bodyPr/>
+                    <a:lstStyle/>
+                    <a:p>
+                      <a:pPr algn="l" fontAlgn="b">
+                        <a:buNone/>
+                      </a:pPr>
+                      <a:r>
+                        <a:rPr lang="en-US" sz="1100" u="none" strike="noStrike">
+                          <a:effectLst/>
+                        </a:rPr>
+                        <a:t>Close</a:t>
+                      </a:r>
+                      <a:endParaRPr lang="en-US" sz="1100" b="0" i="0" u="none" strike="noStrike">
+                        <a:solidFill>
+                          <a:srgbClr val="000000"/>
+                        </a:solidFill>
+                        <a:effectLst/>
+                        <a:latin typeface="Aptos Narrow" panose="020B0004020202020204" pitchFamily="34" charset="0"/>
+                      </a:endParaRPr>
+                    </a:p>
+                  </a:txBody>
+                  <a:tcPr marL="9525" marR="9525" marT="9525" marB="0" anchor="b"/>
+                </a:tc>
+                <a:tc>
+                  <a:txBody>
+                    <a:bodyPr/>
+                    <a:lstStyle/>
+                    <a:p>
+                      <a:pPr algn="l" fontAlgn="b">
+                        <a:buNone/>
+                      </a:pPr>
+                      <a:r>
+                        <a:rPr lang="en-US" sz="1100" u="none" strike="noStrike">
+                          <a:effectLst/>
+                        </a:rPr>
+                        <a:t>Volume</a:t>
+                      </a:r>
+                      <a:endParaRPr lang="en-US" sz="1100" b="0" i="0" u="none" strike="noStrike">
+                        <a:solidFill>
+                          <a:srgbClr val="000000"/>
+                        </a:solidFill>
+                        <a:effectLst/>
+                        <a:latin typeface="Aptos Narrow" panose="020B0004020202020204" pitchFamily="34" charset="0"/>
+                      </a:endParaRPr>
+                    </a:p>
+                  </a:txBody>
+                  <a:tcPr marL="9525" marR="9525" marT="9525" marB="0" anchor="b"/>
+                </a:tc>
+                <a:tc>
+                  <a:txBody>
+                    <a:bodyPr/>
+                    <a:lstStyle/>
+                    <a:p>
+                      <a:pPr algn="l" fontAlgn="b">
+                        <a:buNone/>
+                      </a:pPr>
+                      <a:r>
+                        <a:rPr lang="en-US" sz="1100" u="none" strike="noStrike">
+                          <a:effectLst/>
+                        </a:rPr>
+                        <a:t>Dividends</a:t>
+                      </a:r>
+                      <a:endParaRPr lang="en-US" sz="1100" b="0" i="0" u="none" strike="noStrike">
+                        <a:solidFill>
+                          <a:srgbClr val="000000"/>
+                        </a:solidFill>
+                        <a:effectLst/>
+                        <a:latin typeface="Aptos Narrow" panose="020B0004020202020204" pitchFamily="34" charset="0"/>
+                      </a:endParaRPr>
+                    </a:p>
+                  </a:txBody>
+                  <a:tcPr marL="9525" marR="9525" marT="9525" marB="0" anchor="b"/>
+                </a:tc>
+                <a:tc>
+                  <a:txBody>
+                    <a:bodyPr/>
+                    <a:lstStyle/>
+                    <a:p>
+                      <a:pPr algn="l" fontAlgn="b">
+                        <a:buNone/>
+                      </a:pPr>
+                      <a:r>
+                        <a:rPr lang="en-US" sz="1100" u="none" strike="noStrike">
+                          <a:effectLst/>
+                        </a:rPr>
+                        <a:t>Stock Splits</a:t>
+                      </a:r>
+                      <a:endParaRPr lang="en-US" sz="1100" b="0" i="0" u="none" strike="noStrike">
+                        <a:solidFill>
+                          <a:srgbClr val="000000"/>
+                        </a:solidFill>
+                        <a:effectLst/>
+                        <a:latin typeface="Aptos Narrow" panose="020B0004020202020204" pitchFamily="34" charset="0"/>
+                      </a:endParaRPr>
+                    </a:p>
+                  </a:txBody>
+                  <a:tcPr marL="9525" marR="9525" marT="9525" marB="0" anchor="b"/>
+                </a:tc>
+                <a:extLst>
+                  <a:ext uri="{0D108BD9-81ED-4DB2-BD59-A6C34878D82A}">
+                    <a16:rowId xmlns:a16="http://schemas.microsoft.com/office/drawing/2014/main" val="4119400880"/>
+                  </a:ext>
+                </a:extLst>
+              </a:tr>
+              <a:tr h="35433">
+                <a:tc>
+                  <a:txBody>
+                    <a:bodyPr/>
+                    <a:lstStyle/>
+                    <a:p>
+                      <a:pPr algn="r" fontAlgn="b">
+                        <a:buNone/>
+                      </a:pPr>
+                      <a:r>
+                        <a:rPr lang="en-US" sz="1100" u="none" strike="noStrike" dirty="0">
+                          <a:effectLst/>
+                        </a:rPr>
+                        <a:t>11/19/2025</a:t>
+                      </a:r>
+                      <a:endParaRPr lang="en-US" sz="1100" b="0" i="0" u="none" strike="noStrike" dirty="0">
+                        <a:solidFill>
+                          <a:srgbClr val="000000"/>
+                        </a:solidFill>
+                        <a:effectLst/>
+                        <a:latin typeface="Aptos Narrow" panose="020B0004020202020204" pitchFamily="34" charset="0"/>
+                      </a:endParaRPr>
+                    </a:p>
+                  </a:txBody>
+                  <a:tcPr marL="9525" marR="9525" marT="9525" marB="0" anchor="b"/>
+                </a:tc>
+                <a:tc>
+                  <a:txBody>
+                    <a:bodyPr/>
+                    <a:lstStyle/>
+                    <a:p>
+                      <a:pPr algn="r" fontAlgn="b">
+                        <a:buNone/>
+                      </a:pPr>
+                      <a:r>
+                        <a:rPr lang="en-US" sz="1100" u="none" strike="noStrike" dirty="0">
+                          <a:effectLst/>
+                        </a:rPr>
+                        <a:t>49.325</a:t>
+                      </a:r>
+                      <a:endParaRPr lang="en-US" sz="1100" b="0" i="0" u="none" strike="noStrike" dirty="0">
+                        <a:solidFill>
+                          <a:srgbClr val="000000"/>
+                        </a:solidFill>
+                        <a:effectLst/>
+                        <a:latin typeface="Aptos Narrow" panose="020B0004020202020204" pitchFamily="34" charset="0"/>
+                      </a:endParaRPr>
+                    </a:p>
+                  </a:txBody>
+                  <a:tcPr marL="9525" marR="9525" marT="9525" marB="0" anchor="b"/>
+                </a:tc>
+                <a:tc>
+                  <a:txBody>
+                    <a:bodyPr/>
+                    <a:lstStyle/>
+                    <a:p>
+                      <a:pPr algn="r" fontAlgn="b">
+                        <a:buNone/>
+                      </a:pPr>
+                      <a:r>
+                        <a:rPr lang="en-US" sz="1100" u="none" strike="noStrike" dirty="0">
+                          <a:effectLst/>
+                        </a:rPr>
+                        <a:t>51.575</a:t>
+                      </a:r>
+                      <a:endParaRPr lang="en-US" sz="1100" b="0" i="0" u="none" strike="noStrike" dirty="0">
+                        <a:solidFill>
+                          <a:srgbClr val="000000"/>
+                        </a:solidFill>
+                        <a:effectLst/>
+                        <a:latin typeface="Aptos Narrow" panose="020B0004020202020204" pitchFamily="34" charset="0"/>
+                      </a:endParaRPr>
+                    </a:p>
+                  </a:txBody>
+                  <a:tcPr marL="9525" marR="9525" marT="9525" marB="0" anchor="b"/>
+                </a:tc>
+                <a:tc>
+                  <a:txBody>
+                    <a:bodyPr/>
+                    <a:lstStyle/>
+                    <a:p>
+                      <a:pPr algn="r" fontAlgn="b">
+                        <a:buNone/>
+                      </a:pPr>
+                      <a:r>
+                        <a:rPr lang="en-US" sz="1100" u="none" strike="noStrike" dirty="0">
+                          <a:effectLst/>
+                        </a:rPr>
+                        <a:t>48.715</a:t>
+                      </a:r>
+                      <a:endParaRPr lang="en-US" sz="1100" b="0" i="0" u="none" strike="noStrike" dirty="0">
+                        <a:solidFill>
+                          <a:srgbClr val="000000"/>
+                        </a:solidFill>
+                        <a:effectLst/>
+                        <a:latin typeface="Aptos Narrow" panose="020B0004020202020204" pitchFamily="34" charset="0"/>
+                      </a:endParaRPr>
+                    </a:p>
+                  </a:txBody>
+                  <a:tcPr marL="9525" marR="9525" marT="9525" marB="0" anchor="b"/>
+                </a:tc>
+                <a:tc>
+                  <a:txBody>
+                    <a:bodyPr/>
+                    <a:lstStyle/>
+                    <a:p>
+                      <a:pPr algn="r" fontAlgn="b">
+                        <a:buNone/>
+                      </a:pPr>
+                      <a:r>
+                        <a:rPr lang="en-US" sz="1100" u="none" strike="noStrike" dirty="0">
+                          <a:effectLst/>
+                        </a:rPr>
+                        <a:t>50.025</a:t>
+                      </a:r>
+                      <a:endParaRPr lang="en-US" sz="1100" b="0" i="0" u="none" strike="noStrike" dirty="0">
+                        <a:solidFill>
+                          <a:srgbClr val="000000"/>
+                        </a:solidFill>
+                        <a:effectLst/>
+                        <a:latin typeface="Aptos Narrow" panose="020B0004020202020204" pitchFamily="34" charset="0"/>
+                      </a:endParaRPr>
+                    </a:p>
+                  </a:txBody>
+                  <a:tcPr marL="9525" marR="9525" marT="9525" marB="0" anchor="b"/>
+                </a:tc>
+                <a:tc>
+                  <a:txBody>
+                    <a:bodyPr/>
+                    <a:lstStyle/>
+                    <a:p>
+                      <a:pPr algn="r" fontAlgn="b">
+                        <a:buNone/>
+                      </a:pPr>
+                      <a:r>
+                        <a:rPr lang="en-US" sz="1100" u="none" strike="noStrike" dirty="0">
+                          <a:effectLst/>
+                        </a:rPr>
+                        <a:t>184263600</a:t>
+                      </a:r>
+                      <a:endParaRPr lang="en-US" sz="1100" b="0" i="0" u="none" strike="noStrike" dirty="0">
+                        <a:solidFill>
+                          <a:srgbClr val="000000"/>
+                        </a:solidFill>
+                        <a:effectLst/>
+                        <a:latin typeface="Aptos Narrow" panose="020B0004020202020204" pitchFamily="34" charset="0"/>
+                      </a:endParaRPr>
+                    </a:p>
+                  </a:txBody>
+                  <a:tcPr marL="9525" marR="9525" marT="9525" marB="0" anchor="b"/>
+                </a:tc>
+                <a:tc>
+                  <a:txBody>
+                    <a:bodyPr/>
+                    <a:lstStyle/>
+                    <a:p>
+                      <a:pPr algn="r" fontAlgn="b">
+                        <a:buNone/>
+                      </a:pPr>
+                      <a:r>
+                        <a:rPr lang="en-US" sz="1100" u="none" strike="noStrike" dirty="0">
+                          <a:effectLst/>
+                        </a:rPr>
+                        <a:t>0</a:t>
+                      </a:r>
+                      <a:endParaRPr lang="en-US" sz="1100" b="0" i="0" u="none" strike="noStrike" dirty="0">
+                        <a:solidFill>
+                          <a:srgbClr val="000000"/>
+                        </a:solidFill>
+                        <a:effectLst/>
+                        <a:latin typeface="Aptos Narrow" panose="020B0004020202020204" pitchFamily="34" charset="0"/>
+                      </a:endParaRPr>
+                    </a:p>
+                  </a:txBody>
+                  <a:tcPr marL="9525" marR="9525" marT="9525" marB="0" anchor="b"/>
+                </a:tc>
+                <a:tc>
+                  <a:txBody>
+                    <a:bodyPr/>
+                    <a:lstStyle/>
+                    <a:p>
+                      <a:pPr algn="r" fontAlgn="b">
+                        <a:buNone/>
+                      </a:pPr>
+                      <a:r>
+                        <a:rPr lang="en-US" sz="1100" u="none" strike="noStrike" dirty="0">
+                          <a:effectLst/>
+                        </a:rPr>
+                        <a:t>0</a:t>
+                      </a:r>
+                      <a:endParaRPr lang="en-US" sz="1100" b="0" i="0" u="none" strike="noStrike" dirty="0">
+                        <a:solidFill>
+                          <a:srgbClr val="000000"/>
+                        </a:solidFill>
+                        <a:effectLst/>
+                        <a:latin typeface="Aptos Narrow" panose="020B0004020202020204" pitchFamily="34" charset="0"/>
+                      </a:endParaRPr>
+                    </a:p>
+                  </a:txBody>
+                  <a:tcPr marL="9525" marR="9525" marT="9525" marB="0" anchor="b"/>
+                </a:tc>
+                <a:extLst>
+                  <a:ext uri="{0D108BD9-81ED-4DB2-BD59-A6C34878D82A}">
+                    <a16:rowId xmlns:a16="http://schemas.microsoft.com/office/drawing/2014/main" val="828651933"/>
+                  </a:ext>
+                </a:extLst>
+              </a:tr>
+              <a:tr h="141732">
+                <a:tc>
+                  <a:txBody>
+                    <a:bodyPr/>
+                    <a:lstStyle/>
+                    <a:p>
+                      <a:pPr algn="r" fontAlgn="b">
+                        <a:buNone/>
+                      </a:pPr>
+                      <a:r>
+                        <a:rPr lang="en-US" sz="1100" u="none" strike="noStrike">
+                          <a:effectLst/>
+                        </a:rPr>
+                        <a:t>11/20/2025</a:t>
+                      </a:r>
+                      <a:endParaRPr lang="en-US" sz="1100" b="0" i="0" u="none" strike="noStrike">
+                        <a:solidFill>
+                          <a:srgbClr val="FF0000"/>
+                        </a:solidFill>
+                        <a:effectLst/>
+                        <a:latin typeface="Aptos Narrow" panose="020B0004020202020204" pitchFamily="34" charset="0"/>
+                      </a:endParaRPr>
+                    </a:p>
+                  </a:txBody>
+                  <a:tcPr marL="9525" marR="9525" marT="9525" marB="0" anchor="b"/>
+                </a:tc>
+                <a:tc>
+                  <a:txBody>
+                    <a:bodyPr/>
+                    <a:lstStyle/>
+                    <a:p>
+                      <a:pPr algn="r" fontAlgn="b">
+                        <a:buNone/>
+                      </a:pPr>
+                      <a:r>
+                        <a:rPr lang="en-US" sz="1100" u="none" strike="noStrike">
+                          <a:effectLst/>
+                        </a:rPr>
+                        <a:t>52.95</a:t>
+                      </a:r>
+                      <a:endParaRPr lang="en-US" sz="1100" b="0" i="0" u="none" strike="noStrike">
+                        <a:solidFill>
+                          <a:srgbClr val="FF0000"/>
+                        </a:solidFill>
+                        <a:effectLst/>
+                        <a:latin typeface="Aptos Narrow" panose="020B0004020202020204" pitchFamily="34" charset="0"/>
+                      </a:endParaRPr>
+                    </a:p>
+                  </a:txBody>
+                  <a:tcPr marL="9525" marR="9525" marT="9525" marB="0" anchor="b"/>
+                </a:tc>
+                <a:tc>
+                  <a:txBody>
+                    <a:bodyPr/>
+                    <a:lstStyle/>
+                    <a:p>
+                      <a:pPr algn="r" fontAlgn="b">
+                        <a:buNone/>
+                      </a:pPr>
+                      <a:r>
+                        <a:rPr lang="en-US" sz="1100" u="none" strike="noStrike">
+                          <a:effectLst/>
+                        </a:rPr>
+                        <a:t>53.54</a:t>
+                      </a:r>
+                      <a:endParaRPr lang="en-US" sz="1100" b="0" i="0" u="none" strike="noStrike">
+                        <a:solidFill>
+                          <a:srgbClr val="FF0000"/>
+                        </a:solidFill>
+                        <a:effectLst/>
+                        <a:latin typeface="Aptos Narrow" panose="020B0004020202020204" pitchFamily="34" charset="0"/>
+                      </a:endParaRPr>
+                    </a:p>
+                  </a:txBody>
+                  <a:tcPr marL="9525" marR="9525" marT="9525" marB="0" anchor="b"/>
+                </a:tc>
+                <a:tc>
+                  <a:txBody>
+                    <a:bodyPr/>
+                    <a:lstStyle/>
+                    <a:p>
+                      <a:pPr algn="r" fontAlgn="b">
+                        <a:buNone/>
+                      </a:pPr>
+                      <a:r>
+                        <a:rPr lang="en-US" sz="1100" u="none" strike="noStrike">
+                          <a:effectLst/>
+                        </a:rPr>
+                        <a:t>46.23</a:t>
+                      </a:r>
+                      <a:endParaRPr lang="en-US" sz="1100" b="0" i="0" u="none" strike="noStrike">
+                        <a:solidFill>
+                          <a:srgbClr val="FF0000"/>
+                        </a:solidFill>
+                        <a:effectLst/>
+                        <a:latin typeface="Aptos Narrow" panose="020B0004020202020204" pitchFamily="34" charset="0"/>
+                      </a:endParaRPr>
+                    </a:p>
+                  </a:txBody>
+                  <a:tcPr marL="9525" marR="9525" marT="9525" marB="0" anchor="b"/>
+                </a:tc>
+                <a:tc>
+                  <a:txBody>
+                    <a:bodyPr/>
+                    <a:lstStyle/>
+                    <a:p>
+                      <a:pPr algn="r" fontAlgn="b">
+                        <a:buNone/>
+                      </a:pPr>
+                      <a:r>
+                        <a:rPr lang="en-US" sz="1100" u="none" strike="noStrike" dirty="0">
+                          <a:effectLst/>
+                        </a:rPr>
+                        <a:t>46.45</a:t>
+                      </a:r>
+                      <a:endParaRPr lang="en-US" sz="1100" b="0" i="0" u="none" strike="noStrike" dirty="0">
+                        <a:solidFill>
+                          <a:srgbClr val="FF0000"/>
+                        </a:solidFill>
+                        <a:effectLst/>
+                        <a:latin typeface="Aptos Narrow" panose="020B0004020202020204" pitchFamily="34" charset="0"/>
+                      </a:endParaRPr>
+                    </a:p>
+                  </a:txBody>
+                  <a:tcPr marL="9525" marR="9525" marT="9525" marB="0" anchor="b"/>
+                </a:tc>
+                <a:tc>
+                  <a:txBody>
+                    <a:bodyPr/>
+                    <a:lstStyle/>
+                    <a:p>
+                      <a:pPr algn="r" fontAlgn="b">
+                        <a:buNone/>
+                      </a:pPr>
+                      <a:r>
+                        <a:rPr lang="en-US" sz="1100" u="none" strike="noStrike" dirty="0">
+                          <a:effectLst/>
+                        </a:rPr>
+                        <a:t>178246300</a:t>
+                      </a:r>
+                      <a:endParaRPr lang="en-US" sz="1100" b="0" i="0" u="none" strike="noStrike" dirty="0">
+                        <a:solidFill>
+                          <a:srgbClr val="FF0000"/>
+                        </a:solidFill>
+                        <a:effectLst/>
+                        <a:latin typeface="Aptos Narrow" panose="020B0004020202020204" pitchFamily="34" charset="0"/>
+                      </a:endParaRPr>
+                    </a:p>
+                  </a:txBody>
+                  <a:tcPr marL="9525" marR="9525" marT="9525" marB="0" anchor="b"/>
+                </a:tc>
+                <a:tc>
+                  <a:txBody>
+                    <a:bodyPr/>
+                    <a:lstStyle/>
+                    <a:p>
+                      <a:pPr algn="r" fontAlgn="b">
+                        <a:buNone/>
+                      </a:pPr>
+                      <a:r>
+                        <a:rPr lang="en-US" sz="1100" u="none" strike="noStrike" dirty="0">
+                          <a:effectLst/>
+                        </a:rPr>
+                        <a:t>0</a:t>
+                      </a:r>
+                      <a:endParaRPr lang="en-US" sz="1100" b="0" i="0" u="none" strike="noStrike" dirty="0">
+                        <a:solidFill>
+                          <a:srgbClr val="FF0000"/>
+                        </a:solidFill>
+                        <a:effectLst/>
+                        <a:latin typeface="Aptos Narrow" panose="020B0004020202020204" pitchFamily="34" charset="0"/>
+                      </a:endParaRPr>
+                    </a:p>
+                  </a:txBody>
+                  <a:tcPr marL="9525" marR="9525" marT="9525" marB="0" anchor="b"/>
+                </a:tc>
+                <a:tc>
+                  <a:txBody>
+                    <a:bodyPr/>
+                    <a:lstStyle/>
+                    <a:p>
+                      <a:pPr algn="r" fontAlgn="b">
+                        <a:buNone/>
+                      </a:pPr>
+                      <a:r>
+                        <a:rPr lang="en-US" sz="1100" b="1" u="none" strike="noStrike" dirty="0">
+                          <a:solidFill>
+                            <a:srgbClr val="FF0000"/>
+                          </a:solidFill>
+                          <a:effectLst/>
+                          <a:highlight>
+                            <a:srgbClr val="FFFF00"/>
+                          </a:highlight>
+                        </a:rPr>
+                        <a:t>2</a:t>
+                      </a:r>
+                      <a:endParaRPr lang="en-US" sz="1100" b="1" i="0" u="none" strike="noStrike" dirty="0">
+                        <a:solidFill>
+                          <a:srgbClr val="FF0000"/>
+                        </a:solidFill>
+                        <a:effectLst/>
+                        <a:highlight>
+                          <a:srgbClr val="FFFF00"/>
+                        </a:highlight>
+                        <a:latin typeface="Aptos Narrow" panose="020B0004020202020204" pitchFamily="34" charset="0"/>
+                      </a:endParaRPr>
+                    </a:p>
+                  </a:txBody>
+                  <a:tcPr marL="9525" marR="9525" marT="9525" marB="0" anchor="b"/>
+                </a:tc>
+                <a:extLst>
+                  <a:ext uri="{0D108BD9-81ED-4DB2-BD59-A6C34878D82A}">
+                    <a16:rowId xmlns:a16="http://schemas.microsoft.com/office/drawing/2014/main" val="1934049342"/>
+                  </a:ext>
+                </a:extLst>
+              </a:tr>
+              <a:tr h="0">
+                <a:tc>
+                  <a:txBody>
+                    <a:bodyPr/>
+                    <a:lstStyle/>
+                    <a:p>
+                      <a:pPr algn="r" fontAlgn="b">
+                        <a:buNone/>
+                      </a:pPr>
+                      <a:r>
+                        <a:rPr lang="en-US" sz="1100" u="none" strike="noStrike">
+                          <a:effectLst/>
+                        </a:rPr>
+                        <a:t>11/21/2025</a:t>
+                      </a:r>
+                      <a:endParaRPr lang="en-US" sz="1100" b="0" i="0" u="none" strike="noStrike">
+                        <a:solidFill>
+                          <a:srgbClr val="000000"/>
+                        </a:solidFill>
+                        <a:effectLst/>
+                        <a:latin typeface="Aptos Narrow" panose="020B0004020202020204" pitchFamily="34" charset="0"/>
+                      </a:endParaRPr>
+                    </a:p>
+                  </a:txBody>
+                  <a:tcPr marL="9525" marR="9525" marT="9525" marB="0" anchor="b"/>
+                </a:tc>
+                <a:tc>
+                  <a:txBody>
+                    <a:bodyPr/>
+                    <a:lstStyle/>
+                    <a:p>
+                      <a:pPr algn="r" fontAlgn="b">
+                        <a:buNone/>
+                      </a:pPr>
+                      <a:r>
+                        <a:rPr lang="en-US" sz="1100" u="none" strike="noStrike">
+                          <a:effectLst/>
+                        </a:rPr>
+                        <a:t>46.85</a:t>
+                      </a:r>
+                      <a:endParaRPr lang="en-US" sz="1100" b="0" i="0" u="none" strike="noStrike">
+                        <a:solidFill>
+                          <a:srgbClr val="000000"/>
+                        </a:solidFill>
+                        <a:effectLst/>
+                        <a:latin typeface="Aptos Narrow" panose="020B0004020202020204" pitchFamily="34" charset="0"/>
+                      </a:endParaRPr>
+                    </a:p>
+                  </a:txBody>
+                  <a:tcPr marL="9525" marR="9525" marT="9525" marB="0" anchor="b"/>
+                </a:tc>
+                <a:tc>
+                  <a:txBody>
+                    <a:bodyPr/>
+                    <a:lstStyle/>
+                    <a:p>
+                      <a:pPr algn="r" fontAlgn="b">
+                        <a:buNone/>
+                      </a:pPr>
+                      <a:r>
+                        <a:rPr lang="en-US" sz="1100" u="none" strike="noStrike">
+                          <a:effectLst/>
+                        </a:rPr>
+                        <a:t>49.1</a:t>
+                      </a:r>
+                      <a:endParaRPr lang="en-US" sz="1100" b="0" i="0" u="none" strike="noStrike">
+                        <a:solidFill>
+                          <a:srgbClr val="000000"/>
+                        </a:solidFill>
+                        <a:effectLst/>
+                        <a:latin typeface="Aptos Narrow" panose="020B0004020202020204" pitchFamily="34" charset="0"/>
+                      </a:endParaRPr>
+                    </a:p>
+                  </a:txBody>
+                  <a:tcPr marL="9525" marR="9525" marT="9525" marB="0" anchor="b"/>
+                </a:tc>
+                <a:tc>
+                  <a:txBody>
+                    <a:bodyPr/>
+                    <a:lstStyle/>
+                    <a:p>
+                      <a:pPr algn="r" fontAlgn="b">
+                        <a:buNone/>
+                      </a:pPr>
+                      <a:r>
+                        <a:rPr lang="en-US" sz="1100" u="none" strike="noStrike">
+                          <a:effectLst/>
+                        </a:rPr>
+                        <a:t>45.24</a:t>
+                      </a:r>
+                      <a:endParaRPr lang="en-US" sz="1100" b="0" i="0" u="none" strike="noStrike">
+                        <a:solidFill>
+                          <a:srgbClr val="000000"/>
+                        </a:solidFill>
+                        <a:effectLst/>
+                        <a:latin typeface="Aptos Narrow" panose="020B0004020202020204" pitchFamily="34" charset="0"/>
+                      </a:endParaRPr>
+                    </a:p>
+                  </a:txBody>
+                  <a:tcPr marL="9525" marR="9525" marT="9525" marB="0" anchor="b"/>
+                </a:tc>
+                <a:tc>
+                  <a:txBody>
+                    <a:bodyPr/>
+                    <a:lstStyle/>
+                    <a:p>
+                      <a:pPr algn="r" fontAlgn="b">
+                        <a:buNone/>
+                      </a:pPr>
+                      <a:r>
+                        <a:rPr lang="en-US" sz="1100" u="none" strike="noStrike">
+                          <a:effectLst/>
+                        </a:rPr>
+                        <a:t>47.48</a:t>
+                      </a:r>
+                      <a:endParaRPr lang="en-US" sz="1100" b="0" i="0" u="none" strike="noStrike">
+                        <a:solidFill>
+                          <a:srgbClr val="000000"/>
+                        </a:solidFill>
+                        <a:effectLst/>
+                        <a:latin typeface="Aptos Narrow" panose="020B0004020202020204" pitchFamily="34" charset="0"/>
+                      </a:endParaRPr>
+                    </a:p>
+                  </a:txBody>
+                  <a:tcPr marL="9525" marR="9525" marT="9525" marB="0" anchor="b"/>
+                </a:tc>
+                <a:tc>
+                  <a:txBody>
+                    <a:bodyPr/>
+                    <a:lstStyle/>
+                    <a:p>
+                      <a:pPr algn="r" fontAlgn="b">
+                        <a:buNone/>
+                      </a:pPr>
+                      <a:r>
+                        <a:rPr lang="en-US" sz="1100" u="none" strike="noStrike">
+                          <a:effectLst/>
+                        </a:rPr>
+                        <a:t>179618600</a:t>
+                      </a:r>
+                      <a:endParaRPr lang="en-US" sz="1100" b="0" i="0" u="none" strike="noStrike">
+                        <a:solidFill>
+                          <a:srgbClr val="000000"/>
+                        </a:solidFill>
+                        <a:effectLst/>
+                        <a:latin typeface="Aptos Narrow" panose="020B0004020202020204" pitchFamily="34" charset="0"/>
+                      </a:endParaRPr>
+                    </a:p>
+                  </a:txBody>
+                  <a:tcPr marL="9525" marR="9525" marT="9525" marB="0" anchor="b"/>
+                </a:tc>
+                <a:tc>
+                  <a:txBody>
+                    <a:bodyPr/>
+                    <a:lstStyle/>
+                    <a:p>
+                      <a:pPr algn="r" fontAlgn="b">
+                        <a:buNone/>
+                      </a:pPr>
+                      <a:r>
+                        <a:rPr lang="en-US" sz="1100" u="none" strike="noStrike">
+                          <a:effectLst/>
+                        </a:rPr>
+                        <a:t>0</a:t>
+                      </a:r>
+                      <a:endParaRPr lang="en-US" sz="1100" b="0" i="0" u="none" strike="noStrike">
+                        <a:solidFill>
+                          <a:srgbClr val="000000"/>
+                        </a:solidFill>
+                        <a:effectLst/>
+                        <a:latin typeface="Aptos Narrow" panose="020B0004020202020204" pitchFamily="34" charset="0"/>
+                      </a:endParaRPr>
+                    </a:p>
+                  </a:txBody>
+                  <a:tcPr marL="9525" marR="9525" marT="9525" marB="0" anchor="b"/>
+                </a:tc>
+                <a:tc>
+                  <a:txBody>
+                    <a:bodyPr/>
+                    <a:lstStyle/>
+                    <a:p>
+                      <a:pPr algn="r" fontAlgn="b">
+                        <a:buNone/>
+                      </a:pPr>
+                      <a:r>
+                        <a:rPr lang="en-US" sz="1100" u="none" strike="noStrike" dirty="0">
+                          <a:effectLst/>
+                        </a:rPr>
+                        <a:t>0</a:t>
+                      </a:r>
+                      <a:endParaRPr lang="en-US" sz="1100" b="0" i="0" u="none" strike="noStrike" dirty="0">
+                        <a:solidFill>
+                          <a:srgbClr val="000000"/>
+                        </a:solidFill>
+                        <a:effectLst/>
+                        <a:latin typeface="Aptos Narrow" panose="020B0004020202020204" pitchFamily="34" charset="0"/>
+                      </a:endParaRPr>
+                    </a:p>
+                  </a:txBody>
+                  <a:tcPr marL="9525" marR="9525" marT="9525" marB="0" anchor="b"/>
+                </a:tc>
+                <a:extLst>
+                  <a:ext uri="{0D108BD9-81ED-4DB2-BD59-A6C34878D82A}">
+                    <a16:rowId xmlns:a16="http://schemas.microsoft.com/office/drawing/2014/main" val="1091416025"/>
+                  </a:ext>
+                </a:extLst>
+              </a:tr>
+            </a:tbl>
+          </a:graphicData>
+        </a:graphic>
+      </p:graphicFrame>
+      <p:graphicFrame>
+        <p:nvGraphicFramePr>
+          <p:cNvPr id="6" name="Table 5">
+            <a:extLst>
+              <a:ext uri="{FF2B5EF4-FFF2-40B4-BE49-F238E27FC236}">
+                <a16:creationId xmlns:a16="http://schemas.microsoft.com/office/drawing/2014/main" id="{0F605412-17D3-F21B-32CE-F98B05CEA7DD}"/>
+              </a:ext>
+            </a:extLst>
+          </p:cNvPr>
+          <p:cNvGraphicFramePr>
+            <a:graphicFrameLocks noGrp="1"/>
+          </p:cNvGraphicFramePr>
+          <p:nvPr>
+            <p:extLst>
+              <p:ext uri="{D42A27DB-BD31-4B8C-83A1-F6EECF244321}">
+                <p14:modId xmlns:p14="http://schemas.microsoft.com/office/powerpoint/2010/main" val="3217494039"/>
+              </p:ext>
+            </p:extLst>
+          </p:nvPr>
+        </p:nvGraphicFramePr>
+        <p:xfrm>
+          <a:off x="4484914" y="2707005"/>
+          <a:ext cx="5974080" cy="721995"/>
+        </p:xfrm>
+        <a:graphic>
+          <a:graphicData uri="http://schemas.openxmlformats.org/drawingml/2006/table">
+            <a:tbl>
+              <a:tblPr>
+                <a:tableStyleId>{5C22544A-7EE6-4342-B048-85BDC9FD1C3A}</a:tableStyleId>
+              </a:tblPr>
+              <a:tblGrid>
+                <a:gridCol w="766355">
+                  <a:extLst>
+                    <a:ext uri="{9D8B030D-6E8A-4147-A177-3AD203B41FA5}">
+                      <a16:colId xmlns:a16="http://schemas.microsoft.com/office/drawing/2014/main" val="2033242664"/>
+                    </a:ext>
+                  </a:extLst>
+                </a:gridCol>
+                <a:gridCol w="768610">
+                  <a:extLst>
+                    <a:ext uri="{9D8B030D-6E8A-4147-A177-3AD203B41FA5}">
+                      <a16:colId xmlns:a16="http://schemas.microsoft.com/office/drawing/2014/main" val="2687220555"/>
+                    </a:ext>
+                  </a:extLst>
+                </a:gridCol>
+                <a:gridCol w="654029">
+                  <a:extLst>
+                    <a:ext uri="{9D8B030D-6E8A-4147-A177-3AD203B41FA5}">
+                      <a16:colId xmlns:a16="http://schemas.microsoft.com/office/drawing/2014/main" val="3112399319"/>
+                    </a:ext>
+                  </a:extLst>
+                </a:gridCol>
+                <a:gridCol w="654029">
+                  <a:extLst>
+                    <a:ext uri="{9D8B030D-6E8A-4147-A177-3AD203B41FA5}">
+                      <a16:colId xmlns:a16="http://schemas.microsoft.com/office/drawing/2014/main" val="4223638450"/>
+                    </a:ext>
+                  </a:extLst>
+                </a:gridCol>
+                <a:gridCol w="654029">
+                  <a:extLst>
+                    <a:ext uri="{9D8B030D-6E8A-4147-A177-3AD203B41FA5}">
+                      <a16:colId xmlns:a16="http://schemas.microsoft.com/office/drawing/2014/main" val="3467624918"/>
+                    </a:ext>
+                  </a:extLst>
+                </a:gridCol>
+                <a:gridCol w="707419">
+                  <a:extLst>
+                    <a:ext uri="{9D8B030D-6E8A-4147-A177-3AD203B41FA5}">
+                      <a16:colId xmlns:a16="http://schemas.microsoft.com/office/drawing/2014/main" val="1532794855"/>
+                    </a:ext>
+                  </a:extLst>
+                </a:gridCol>
+                <a:gridCol w="654029">
+                  <a:extLst>
+                    <a:ext uri="{9D8B030D-6E8A-4147-A177-3AD203B41FA5}">
+                      <a16:colId xmlns:a16="http://schemas.microsoft.com/office/drawing/2014/main" val="4165107490"/>
+                    </a:ext>
+                  </a:extLst>
+                </a:gridCol>
+                <a:gridCol w="1115580">
+                  <a:extLst>
+                    <a:ext uri="{9D8B030D-6E8A-4147-A177-3AD203B41FA5}">
+                      <a16:colId xmlns:a16="http://schemas.microsoft.com/office/drawing/2014/main" val="2289655924"/>
+                    </a:ext>
+                  </a:extLst>
+                </a:gridCol>
+              </a:tblGrid>
+              <a:tr h="190500">
+                <a:tc>
+                  <a:txBody>
+                    <a:bodyPr/>
+                    <a:lstStyle/>
+                    <a:p>
+                      <a:pPr algn="l" fontAlgn="b">
+                        <a:buNone/>
+                      </a:pPr>
+                      <a:r>
+                        <a:rPr lang="en-US" sz="1100" u="none" strike="noStrike">
+                          <a:effectLst/>
+                        </a:rPr>
+                        <a:t>Date</a:t>
+                      </a:r>
+                      <a:endParaRPr lang="en-US" sz="1100" b="0" i="0" u="none" strike="noStrike">
+                        <a:solidFill>
+                          <a:srgbClr val="000000"/>
+                        </a:solidFill>
+                        <a:effectLst/>
+                        <a:latin typeface="Aptos Narrow" panose="020B0004020202020204" pitchFamily="34" charset="0"/>
+                      </a:endParaRPr>
+                    </a:p>
+                  </a:txBody>
+                  <a:tcPr marL="9525" marR="9525" marT="9525" marB="0" anchor="b"/>
+                </a:tc>
+                <a:tc>
+                  <a:txBody>
+                    <a:bodyPr/>
+                    <a:lstStyle/>
+                    <a:p>
+                      <a:pPr algn="l" fontAlgn="b">
+                        <a:buNone/>
+                      </a:pPr>
+                      <a:r>
+                        <a:rPr lang="en-US" sz="1100" u="none" strike="noStrike">
+                          <a:effectLst/>
+                        </a:rPr>
+                        <a:t>Open</a:t>
+                      </a:r>
+                      <a:endParaRPr lang="en-US" sz="1100" b="0" i="0" u="none" strike="noStrike">
+                        <a:solidFill>
+                          <a:srgbClr val="000000"/>
+                        </a:solidFill>
+                        <a:effectLst/>
+                        <a:latin typeface="Aptos Narrow" panose="020B0004020202020204" pitchFamily="34" charset="0"/>
+                      </a:endParaRPr>
+                    </a:p>
+                  </a:txBody>
+                  <a:tcPr marL="9525" marR="9525" marT="9525" marB="0" anchor="b"/>
+                </a:tc>
+                <a:tc>
+                  <a:txBody>
+                    <a:bodyPr/>
+                    <a:lstStyle/>
+                    <a:p>
+                      <a:pPr algn="l" fontAlgn="b">
+                        <a:buNone/>
+                      </a:pPr>
+                      <a:r>
+                        <a:rPr lang="en-US" sz="1100" u="none" strike="noStrike">
+                          <a:effectLst/>
+                        </a:rPr>
+                        <a:t>High</a:t>
+                      </a:r>
+                      <a:endParaRPr lang="en-US" sz="1100" b="0" i="0" u="none" strike="noStrike">
+                        <a:solidFill>
+                          <a:srgbClr val="000000"/>
+                        </a:solidFill>
+                        <a:effectLst/>
+                        <a:latin typeface="Aptos Narrow" panose="020B0004020202020204" pitchFamily="34" charset="0"/>
+                      </a:endParaRPr>
+                    </a:p>
+                  </a:txBody>
+                  <a:tcPr marL="9525" marR="9525" marT="9525" marB="0" anchor="b"/>
+                </a:tc>
+                <a:tc>
+                  <a:txBody>
+                    <a:bodyPr/>
+                    <a:lstStyle/>
+                    <a:p>
+                      <a:pPr algn="l" fontAlgn="b">
+                        <a:buNone/>
+                      </a:pPr>
+                      <a:r>
+                        <a:rPr lang="en-US" sz="1100" u="none" strike="noStrike">
+                          <a:effectLst/>
+                        </a:rPr>
+                        <a:t>Low</a:t>
+                      </a:r>
+                      <a:endParaRPr lang="en-US" sz="1100" b="0" i="0" u="none" strike="noStrike">
+                        <a:solidFill>
+                          <a:srgbClr val="000000"/>
+                        </a:solidFill>
+                        <a:effectLst/>
+                        <a:latin typeface="Aptos Narrow" panose="020B0004020202020204" pitchFamily="34" charset="0"/>
+                      </a:endParaRPr>
+                    </a:p>
+                  </a:txBody>
+                  <a:tcPr marL="9525" marR="9525" marT="9525" marB="0" anchor="b"/>
+                </a:tc>
+                <a:tc>
+                  <a:txBody>
+                    <a:bodyPr/>
+                    <a:lstStyle/>
+                    <a:p>
+                      <a:pPr algn="l" fontAlgn="b">
+                        <a:buNone/>
+                      </a:pPr>
+                      <a:r>
+                        <a:rPr lang="en-US" sz="1100" u="none" strike="noStrike">
+                          <a:effectLst/>
+                        </a:rPr>
+                        <a:t>Close</a:t>
+                      </a:r>
+                      <a:endParaRPr lang="en-US" sz="1100" b="0" i="0" u="none" strike="noStrike">
+                        <a:solidFill>
+                          <a:srgbClr val="000000"/>
+                        </a:solidFill>
+                        <a:effectLst/>
+                        <a:latin typeface="Aptos Narrow" panose="020B0004020202020204" pitchFamily="34" charset="0"/>
+                      </a:endParaRPr>
+                    </a:p>
+                  </a:txBody>
+                  <a:tcPr marL="9525" marR="9525" marT="9525" marB="0" anchor="b"/>
+                </a:tc>
+                <a:tc>
+                  <a:txBody>
+                    <a:bodyPr/>
+                    <a:lstStyle/>
+                    <a:p>
+                      <a:pPr algn="l" fontAlgn="b">
+                        <a:buNone/>
+                      </a:pPr>
+                      <a:r>
+                        <a:rPr lang="en-US" sz="1100" u="none" strike="noStrike">
+                          <a:effectLst/>
+                        </a:rPr>
+                        <a:t>Volume</a:t>
+                      </a:r>
+                      <a:endParaRPr lang="en-US" sz="1100" b="0" i="0" u="none" strike="noStrike">
+                        <a:solidFill>
+                          <a:srgbClr val="000000"/>
+                        </a:solidFill>
+                        <a:effectLst/>
+                        <a:latin typeface="Aptos Narrow" panose="020B0004020202020204" pitchFamily="34" charset="0"/>
+                      </a:endParaRPr>
+                    </a:p>
+                  </a:txBody>
+                  <a:tcPr marL="9525" marR="9525" marT="9525" marB="0" anchor="b"/>
+                </a:tc>
+                <a:tc>
+                  <a:txBody>
+                    <a:bodyPr/>
+                    <a:lstStyle/>
+                    <a:p>
+                      <a:pPr algn="l" fontAlgn="b">
+                        <a:buNone/>
+                      </a:pPr>
+                      <a:r>
+                        <a:rPr lang="en-US" sz="1100" u="none" strike="noStrike">
+                          <a:effectLst/>
+                        </a:rPr>
+                        <a:t>Dividends</a:t>
+                      </a:r>
+                      <a:endParaRPr lang="en-US" sz="1100" b="0" i="0" u="none" strike="noStrike">
+                        <a:solidFill>
+                          <a:srgbClr val="000000"/>
+                        </a:solidFill>
+                        <a:effectLst/>
+                        <a:latin typeface="Aptos Narrow" panose="020B0004020202020204" pitchFamily="34" charset="0"/>
+                      </a:endParaRPr>
+                    </a:p>
+                  </a:txBody>
+                  <a:tcPr marL="9525" marR="9525" marT="9525" marB="0" anchor="b"/>
+                </a:tc>
+                <a:tc>
+                  <a:txBody>
+                    <a:bodyPr/>
+                    <a:lstStyle/>
+                    <a:p>
+                      <a:pPr algn="l" fontAlgn="b">
+                        <a:buNone/>
+                      </a:pPr>
+                      <a:r>
+                        <a:rPr lang="en-US" sz="1100" u="none" strike="noStrike">
+                          <a:effectLst/>
+                        </a:rPr>
+                        <a:t>Stock Splits</a:t>
+                      </a:r>
+                      <a:endParaRPr lang="en-US" sz="1100" b="0" i="0" u="none" strike="noStrike">
+                        <a:solidFill>
+                          <a:srgbClr val="000000"/>
+                        </a:solidFill>
+                        <a:effectLst/>
+                        <a:latin typeface="Aptos Narrow" panose="020B0004020202020204" pitchFamily="34" charset="0"/>
+                      </a:endParaRPr>
+                    </a:p>
+                  </a:txBody>
+                  <a:tcPr marL="9525" marR="9525" marT="9525" marB="0" anchor="b"/>
+                </a:tc>
+                <a:extLst>
+                  <a:ext uri="{0D108BD9-81ED-4DB2-BD59-A6C34878D82A}">
+                    <a16:rowId xmlns:a16="http://schemas.microsoft.com/office/drawing/2014/main" val="4119400880"/>
+                  </a:ext>
+                </a:extLst>
+              </a:tr>
+              <a:tr h="35433">
+                <a:tc>
+                  <a:txBody>
+                    <a:bodyPr/>
+                    <a:lstStyle/>
+                    <a:p>
+                      <a:pPr algn="r" fontAlgn="b">
+                        <a:buNone/>
+                      </a:pPr>
+                      <a:r>
+                        <a:rPr lang="en-US" sz="1100" u="none" strike="noStrike" dirty="0">
+                          <a:effectLst/>
+                        </a:rPr>
+                        <a:t>9/23/2025</a:t>
+                      </a:r>
+                      <a:endParaRPr lang="en-US" sz="1100" b="0" i="0" u="none" strike="noStrike" dirty="0">
+                        <a:solidFill>
+                          <a:srgbClr val="000000"/>
+                        </a:solidFill>
+                        <a:effectLst/>
+                        <a:latin typeface="Aptos Narrow" panose="020B0004020202020204" pitchFamily="34" charset="0"/>
+                      </a:endParaRPr>
+                    </a:p>
+                  </a:txBody>
+                  <a:tcPr marL="9525" marR="9525" marT="9525" marB="0" anchor="b"/>
+                </a:tc>
+                <a:tc>
+                  <a:txBody>
+                    <a:bodyPr/>
+                    <a:lstStyle/>
+                    <a:p>
+                      <a:pPr algn="r" fontAlgn="b">
+                        <a:buNone/>
+                      </a:pPr>
+                      <a:r>
+                        <a:rPr lang="en-US" sz="1100" u="none" strike="noStrike">
+                          <a:effectLst/>
+                        </a:rPr>
+                        <a:t>52.34496</a:t>
+                      </a:r>
+                      <a:endParaRPr lang="en-US" sz="1100" b="0" i="0" u="none" strike="noStrike">
+                        <a:solidFill>
+                          <a:srgbClr val="000000"/>
+                        </a:solidFill>
+                        <a:effectLst/>
+                        <a:latin typeface="Aptos Narrow" panose="020B0004020202020204" pitchFamily="34" charset="0"/>
+                      </a:endParaRPr>
+                    </a:p>
+                  </a:txBody>
+                  <a:tcPr marL="9525" marR="9525" marT="9525" marB="0" anchor="b"/>
+                </a:tc>
+                <a:tc>
+                  <a:txBody>
+                    <a:bodyPr/>
+                    <a:lstStyle/>
+                    <a:p>
+                      <a:pPr algn="r" fontAlgn="b">
+                        <a:buNone/>
+                      </a:pPr>
+                      <a:r>
+                        <a:rPr lang="en-US" sz="1100" u="none" strike="noStrike">
+                          <a:effectLst/>
+                        </a:rPr>
+                        <a:t>52.39991</a:t>
+                      </a:r>
+                      <a:endParaRPr lang="en-US" sz="1100" b="0" i="0" u="none" strike="noStrike">
+                        <a:solidFill>
+                          <a:srgbClr val="000000"/>
+                        </a:solidFill>
+                        <a:effectLst/>
+                        <a:latin typeface="Aptos Narrow" panose="020B0004020202020204" pitchFamily="34" charset="0"/>
+                      </a:endParaRPr>
+                    </a:p>
+                  </a:txBody>
+                  <a:tcPr marL="9525" marR="9525" marT="9525" marB="0" anchor="b"/>
+                </a:tc>
+                <a:tc>
+                  <a:txBody>
+                    <a:bodyPr/>
+                    <a:lstStyle/>
+                    <a:p>
+                      <a:pPr algn="r" fontAlgn="b">
+                        <a:buNone/>
+                      </a:pPr>
+                      <a:r>
+                        <a:rPr lang="en-US" sz="1100" u="none" strike="noStrike">
+                          <a:effectLst/>
+                        </a:rPr>
+                        <a:t>50.9413</a:t>
+                      </a:r>
+                      <a:endParaRPr lang="en-US" sz="1100" b="0" i="0" u="none" strike="noStrike">
+                        <a:solidFill>
+                          <a:srgbClr val="000000"/>
+                        </a:solidFill>
+                        <a:effectLst/>
+                        <a:latin typeface="Aptos Narrow" panose="020B0004020202020204" pitchFamily="34" charset="0"/>
+                      </a:endParaRPr>
+                    </a:p>
+                  </a:txBody>
+                  <a:tcPr marL="9525" marR="9525" marT="9525" marB="0" anchor="b"/>
+                </a:tc>
+                <a:tc>
+                  <a:txBody>
+                    <a:bodyPr/>
+                    <a:lstStyle/>
+                    <a:p>
+                      <a:pPr algn="r" fontAlgn="b">
+                        <a:buNone/>
+                      </a:pPr>
+                      <a:r>
+                        <a:rPr lang="en-US" sz="1100" u="none" strike="noStrike">
+                          <a:effectLst/>
+                        </a:rPr>
+                        <a:t>51.256</a:t>
+                      </a:r>
+                      <a:endParaRPr lang="en-US" sz="1100" b="0" i="0" u="none" strike="noStrike">
+                        <a:solidFill>
+                          <a:srgbClr val="000000"/>
+                        </a:solidFill>
+                        <a:effectLst/>
+                        <a:latin typeface="Aptos Narrow" panose="020B0004020202020204" pitchFamily="34" charset="0"/>
+                      </a:endParaRPr>
+                    </a:p>
+                  </a:txBody>
+                  <a:tcPr marL="9525" marR="9525" marT="9525" marB="0" anchor="b"/>
+                </a:tc>
+                <a:tc>
+                  <a:txBody>
+                    <a:bodyPr/>
+                    <a:lstStyle/>
+                    <a:p>
+                      <a:pPr algn="r" fontAlgn="b">
+                        <a:buNone/>
+                      </a:pPr>
+                      <a:r>
+                        <a:rPr lang="en-US" sz="1100" u="none" strike="noStrike">
+                          <a:effectLst/>
+                        </a:rPr>
+                        <a:t>99930600</a:t>
+                      </a:r>
+                      <a:endParaRPr lang="en-US" sz="1100" b="0" i="0" u="none" strike="noStrike">
+                        <a:solidFill>
+                          <a:srgbClr val="000000"/>
+                        </a:solidFill>
+                        <a:effectLst/>
+                        <a:latin typeface="Aptos Narrow" panose="020B0004020202020204" pitchFamily="34" charset="0"/>
+                      </a:endParaRPr>
+                    </a:p>
+                  </a:txBody>
+                  <a:tcPr marL="9525" marR="9525" marT="9525" marB="0" anchor="b"/>
+                </a:tc>
+                <a:tc>
+                  <a:txBody>
+                    <a:bodyPr/>
+                    <a:lstStyle/>
+                    <a:p>
+                      <a:pPr algn="r" fontAlgn="b">
+                        <a:buNone/>
+                      </a:pPr>
+                      <a:r>
+                        <a:rPr lang="en-US" sz="1100" u="none" strike="noStrike">
+                          <a:effectLst/>
+                        </a:rPr>
+                        <a:t>0</a:t>
+                      </a:r>
+                      <a:endParaRPr lang="en-US" sz="1100" b="0" i="0" u="none" strike="noStrike">
+                        <a:solidFill>
+                          <a:srgbClr val="000000"/>
+                        </a:solidFill>
+                        <a:effectLst/>
+                        <a:latin typeface="Aptos Narrow" panose="020B0004020202020204" pitchFamily="34" charset="0"/>
+                      </a:endParaRPr>
+                    </a:p>
+                  </a:txBody>
+                  <a:tcPr marL="9525" marR="9525" marT="9525" marB="0" anchor="b"/>
+                </a:tc>
+                <a:tc>
+                  <a:txBody>
+                    <a:bodyPr/>
+                    <a:lstStyle/>
+                    <a:p>
+                      <a:pPr algn="r" fontAlgn="b">
+                        <a:buNone/>
+                      </a:pPr>
+                      <a:r>
+                        <a:rPr lang="en-US" sz="1100" u="none" strike="noStrike">
+                          <a:effectLst/>
+                        </a:rPr>
+                        <a:t>0</a:t>
+                      </a:r>
+                      <a:endParaRPr lang="en-US" sz="1100" b="0" i="0" u="none" strike="noStrike">
+                        <a:solidFill>
+                          <a:srgbClr val="000000"/>
+                        </a:solidFill>
+                        <a:effectLst/>
+                        <a:latin typeface="Aptos Narrow" panose="020B0004020202020204" pitchFamily="34" charset="0"/>
+                      </a:endParaRPr>
+                    </a:p>
+                  </a:txBody>
+                  <a:tcPr marL="9525" marR="9525" marT="9525" marB="0" anchor="b"/>
+                </a:tc>
+                <a:extLst>
+                  <a:ext uri="{0D108BD9-81ED-4DB2-BD59-A6C34878D82A}">
+                    <a16:rowId xmlns:a16="http://schemas.microsoft.com/office/drawing/2014/main" val="828651933"/>
+                  </a:ext>
+                </a:extLst>
+              </a:tr>
+              <a:tr h="141732">
+                <a:tc>
+                  <a:txBody>
+                    <a:bodyPr/>
+                    <a:lstStyle/>
+                    <a:p>
+                      <a:pPr algn="r" fontAlgn="b">
+                        <a:buNone/>
+                      </a:pPr>
+                      <a:r>
+                        <a:rPr lang="en-US" sz="1100" u="none" strike="noStrike">
+                          <a:effectLst/>
+                        </a:rPr>
+                        <a:t>9/24/2025</a:t>
+                      </a:r>
+                      <a:endParaRPr lang="en-US" sz="1100" b="0" i="0" u="none" strike="noStrike">
+                        <a:solidFill>
+                          <a:srgbClr val="FF0000"/>
+                        </a:solidFill>
+                        <a:effectLst/>
+                        <a:latin typeface="Aptos Narrow" panose="020B0004020202020204" pitchFamily="34" charset="0"/>
+                      </a:endParaRPr>
+                    </a:p>
+                  </a:txBody>
+                  <a:tcPr marL="9525" marR="9525" marT="9525" marB="0" anchor="b"/>
+                </a:tc>
+                <a:tc>
+                  <a:txBody>
+                    <a:bodyPr/>
+                    <a:lstStyle/>
+                    <a:p>
+                      <a:pPr algn="r" fontAlgn="b">
+                        <a:buNone/>
+                      </a:pPr>
+                      <a:r>
+                        <a:rPr lang="en-US" sz="1100" u="none" strike="noStrike" dirty="0">
+                          <a:effectLst/>
+                        </a:rPr>
+                        <a:t>51.605</a:t>
+                      </a:r>
+                      <a:endParaRPr lang="en-US" sz="1100" b="0" i="0" u="none" strike="noStrike" dirty="0">
+                        <a:solidFill>
+                          <a:srgbClr val="FF0000"/>
+                        </a:solidFill>
+                        <a:effectLst/>
+                        <a:latin typeface="Aptos Narrow" panose="020B0004020202020204" pitchFamily="34" charset="0"/>
+                      </a:endParaRPr>
+                    </a:p>
+                  </a:txBody>
+                  <a:tcPr marL="9525" marR="9525" marT="9525" marB="0" anchor="b"/>
+                </a:tc>
+                <a:tc>
+                  <a:txBody>
+                    <a:bodyPr/>
+                    <a:lstStyle/>
+                    <a:p>
+                      <a:pPr algn="r" fontAlgn="b">
+                        <a:buNone/>
+                      </a:pPr>
+                      <a:r>
+                        <a:rPr lang="en-US" sz="1100" u="none" strike="noStrike" dirty="0">
+                          <a:effectLst/>
+                        </a:rPr>
+                        <a:t>51.68</a:t>
+                      </a:r>
+                      <a:endParaRPr lang="en-US" sz="1100" b="0" i="0" u="none" strike="noStrike" dirty="0">
+                        <a:solidFill>
+                          <a:srgbClr val="FF0000"/>
+                        </a:solidFill>
+                        <a:effectLst/>
+                        <a:latin typeface="Aptos Narrow" panose="020B0004020202020204" pitchFamily="34" charset="0"/>
+                      </a:endParaRPr>
+                    </a:p>
+                  </a:txBody>
+                  <a:tcPr marL="9525" marR="9525" marT="9525" marB="0" anchor="b"/>
+                </a:tc>
+                <a:tc>
+                  <a:txBody>
+                    <a:bodyPr/>
+                    <a:lstStyle/>
+                    <a:p>
+                      <a:pPr algn="r" fontAlgn="b">
+                        <a:buNone/>
+                      </a:pPr>
+                      <a:r>
+                        <a:rPr lang="en-US" sz="1100" u="none" strike="noStrike" dirty="0">
+                          <a:effectLst/>
+                        </a:rPr>
+                        <a:t>49.995</a:t>
+                      </a:r>
+                      <a:endParaRPr lang="en-US" sz="1100" b="0" i="0" u="none" strike="noStrike" dirty="0">
+                        <a:solidFill>
+                          <a:srgbClr val="FF0000"/>
+                        </a:solidFill>
+                        <a:effectLst/>
+                        <a:latin typeface="Aptos Narrow" panose="020B0004020202020204" pitchFamily="34" charset="0"/>
+                      </a:endParaRPr>
+                    </a:p>
+                  </a:txBody>
+                  <a:tcPr marL="9525" marR="9525" marT="9525" marB="0" anchor="b"/>
+                </a:tc>
+                <a:tc>
+                  <a:txBody>
+                    <a:bodyPr/>
+                    <a:lstStyle/>
+                    <a:p>
+                      <a:pPr algn="r" fontAlgn="b">
+                        <a:buNone/>
+                      </a:pPr>
+                      <a:r>
+                        <a:rPr lang="en-US" sz="1100" u="none" strike="noStrike" dirty="0">
+                          <a:effectLst/>
+                        </a:rPr>
+                        <a:t>50.705</a:t>
+                      </a:r>
+                      <a:endParaRPr lang="en-US" sz="1100" b="0" i="0" u="none" strike="noStrike" dirty="0">
+                        <a:solidFill>
+                          <a:srgbClr val="FF0000"/>
+                        </a:solidFill>
+                        <a:effectLst/>
+                        <a:latin typeface="Aptos Narrow" panose="020B0004020202020204" pitchFamily="34" charset="0"/>
+                      </a:endParaRPr>
+                    </a:p>
+                  </a:txBody>
+                  <a:tcPr marL="9525" marR="9525" marT="9525" marB="0" anchor="b"/>
+                </a:tc>
+                <a:tc>
+                  <a:txBody>
+                    <a:bodyPr/>
+                    <a:lstStyle/>
+                    <a:p>
+                      <a:pPr algn="r" fontAlgn="b">
+                        <a:buNone/>
+                      </a:pPr>
+                      <a:r>
+                        <a:rPr lang="en-US" sz="1100" u="none" strike="noStrike">
+                          <a:effectLst/>
+                        </a:rPr>
+                        <a:t>101055600</a:t>
+                      </a:r>
+                      <a:endParaRPr lang="en-US" sz="1100" b="0" i="0" u="none" strike="noStrike">
+                        <a:solidFill>
+                          <a:srgbClr val="FF0000"/>
+                        </a:solidFill>
+                        <a:effectLst/>
+                        <a:latin typeface="Aptos Narrow" panose="020B0004020202020204" pitchFamily="34" charset="0"/>
+                      </a:endParaRPr>
+                    </a:p>
+                  </a:txBody>
+                  <a:tcPr marL="9525" marR="9525" marT="9525" marB="0" anchor="b"/>
+                </a:tc>
+                <a:tc>
+                  <a:txBody>
+                    <a:bodyPr/>
+                    <a:lstStyle/>
+                    <a:p>
+                      <a:pPr algn="r" fontAlgn="b">
+                        <a:buNone/>
+                      </a:pPr>
+                      <a:r>
+                        <a:rPr lang="en-US" sz="1100" b="1" u="none" strike="noStrike" dirty="0">
+                          <a:solidFill>
+                            <a:srgbClr val="FF0000"/>
+                          </a:solidFill>
+                          <a:effectLst/>
+                          <a:highlight>
+                            <a:srgbClr val="FFFF00"/>
+                          </a:highlight>
+                        </a:rPr>
+                        <a:t>0.049</a:t>
+                      </a:r>
+                      <a:endParaRPr lang="en-US" sz="1100" b="1" i="0" u="none" strike="noStrike" dirty="0">
+                        <a:solidFill>
+                          <a:srgbClr val="FF0000"/>
+                        </a:solidFill>
+                        <a:effectLst/>
+                        <a:highlight>
+                          <a:srgbClr val="FFFF00"/>
+                        </a:highlight>
+                        <a:latin typeface="Aptos Narrow" panose="020B0004020202020204" pitchFamily="34" charset="0"/>
+                      </a:endParaRPr>
+                    </a:p>
+                  </a:txBody>
+                  <a:tcPr marL="9525" marR="9525" marT="9525" marB="0" anchor="b"/>
+                </a:tc>
+                <a:tc>
+                  <a:txBody>
+                    <a:bodyPr/>
+                    <a:lstStyle/>
+                    <a:p>
+                      <a:pPr algn="r" fontAlgn="b">
+                        <a:buNone/>
+                      </a:pPr>
+                      <a:r>
+                        <a:rPr lang="en-US" sz="1100" u="none" strike="noStrike" dirty="0">
+                          <a:effectLst/>
+                        </a:rPr>
+                        <a:t>0</a:t>
+                      </a:r>
+                      <a:endParaRPr lang="en-US" sz="1100" b="0" i="0" u="none" strike="noStrike" dirty="0">
+                        <a:solidFill>
+                          <a:srgbClr val="FF0000"/>
+                        </a:solidFill>
+                        <a:effectLst/>
+                        <a:latin typeface="Aptos Narrow" panose="020B0004020202020204" pitchFamily="34" charset="0"/>
+                      </a:endParaRPr>
+                    </a:p>
+                  </a:txBody>
+                  <a:tcPr marL="9525" marR="9525" marT="9525" marB="0" anchor="b"/>
+                </a:tc>
+                <a:extLst>
+                  <a:ext uri="{0D108BD9-81ED-4DB2-BD59-A6C34878D82A}">
+                    <a16:rowId xmlns:a16="http://schemas.microsoft.com/office/drawing/2014/main" val="1934049342"/>
+                  </a:ext>
+                </a:extLst>
+              </a:tr>
+              <a:tr h="0">
+                <a:tc>
+                  <a:txBody>
+                    <a:bodyPr/>
+                    <a:lstStyle/>
+                    <a:p>
+                      <a:pPr algn="r" fontAlgn="b">
+                        <a:buNone/>
+                      </a:pPr>
+                      <a:r>
+                        <a:rPr lang="en-US" sz="1100" u="none" strike="noStrike">
+                          <a:effectLst/>
+                        </a:rPr>
+                        <a:t>9/25/2025</a:t>
+                      </a:r>
+                      <a:endParaRPr lang="en-US" sz="1100" b="0" i="0" u="none" strike="noStrike">
+                        <a:solidFill>
+                          <a:srgbClr val="000000"/>
+                        </a:solidFill>
+                        <a:effectLst/>
+                        <a:latin typeface="Aptos Narrow" panose="020B0004020202020204" pitchFamily="34" charset="0"/>
+                      </a:endParaRPr>
+                    </a:p>
+                  </a:txBody>
+                  <a:tcPr marL="9525" marR="9525" marT="9525" marB="0" anchor="b"/>
+                </a:tc>
+                <a:tc>
+                  <a:txBody>
+                    <a:bodyPr/>
+                    <a:lstStyle/>
+                    <a:p>
+                      <a:pPr algn="r" fontAlgn="b">
+                        <a:buNone/>
+                      </a:pPr>
+                      <a:r>
+                        <a:rPr lang="en-US" sz="1100" u="none" strike="noStrike">
+                          <a:effectLst/>
+                        </a:rPr>
+                        <a:t>49.7</a:t>
+                      </a:r>
+                      <a:endParaRPr lang="en-US" sz="1100" b="0" i="0" u="none" strike="noStrike">
+                        <a:solidFill>
+                          <a:srgbClr val="000000"/>
+                        </a:solidFill>
+                        <a:effectLst/>
+                        <a:latin typeface="Aptos Narrow" panose="020B0004020202020204" pitchFamily="34" charset="0"/>
+                      </a:endParaRPr>
+                    </a:p>
+                  </a:txBody>
+                  <a:tcPr marL="9525" marR="9525" marT="9525" marB="0" anchor="b"/>
+                </a:tc>
+                <a:tc>
+                  <a:txBody>
+                    <a:bodyPr/>
+                    <a:lstStyle/>
+                    <a:p>
+                      <a:pPr algn="r" fontAlgn="b">
+                        <a:buNone/>
+                      </a:pPr>
+                      <a:r>
+                        <a:rPr lang="en-US" sz="1100" u="none" strike="noStrike">
+                          <a:effectLst/>
+                        </a:rPr>
+                        <a:t>50.435</a:t>
+                      </a:r>
+                      <a:endParaRPr lang="en-US" sz="1100" b="0" i="0" u="none" strike="noStrike">
+                        <a:solidFill>
+                          <a:srgbClr val="000000"/>
+                        </a:solidFill>
+                        <a:effectLst/>
+                        <a:latin typeface="Aptos Narrow" panose="020B0004020202020204" pitchFamily="34" charset="0"/>
+                      </a:endParaRPr>
+                    </a:p>
+                  </a:txBody>
+                  <a:tcPr marL="9525" marR="9525" marT="9525" marB="0" anchor="b"/>
+                </a:tc>
+                <a:tc>
+                  <a:txBody>
+                    <a:bodyPr/>
+                    <a:lstStyle/>
+                    <a:p>
+                      <a:pPr algn="r" fontAlgn="b">
+                        <a:buNone/>
+                      </a:pPr>
+                      <a:r>
+                        <a:rPr lang="en-US" sz="1100" u="none" strike="noStrike">
+                          <a:effectLst/>
+                        </a:rPr>
+                        <a:t>48.75</a:t>
+                      </a:r>
+                      <a:endParaRPr lang="en-US" sz="1100" b="0" i="0" u="none" strike="noStrike">
+                        <a:solidFill>
+                          <a:srgbClr val="000000"/>
+                        </a:solidFill>
+                        <a:effectLst/>
+                        <a:latin typeface="Aptos Narrow" panose="020B0004020202020204" pitchFamily="34" charset="0"/>
+                      </a:endParaRPr>
+                    </a:p>
+                  </a:txBody>
+                  <a:tcPr marL="9525" marR="9525" marT="9525" marB="0" anchor="b"/>
+                </a:tc>
+                <a:tc>
+                  <a:txBody>
+                    <a:bodyPr/>
+                    <a:lstStyle/>
+                    <a:p>
+                      <a:pPr algn="r" fontAlgn="b">
+                        <a:buNone/>
+                      </a:pPr>
+                      <a:r>
+                        <a:rPr lang="en-US" sz="1100" u="none" strike="noStrike">
+                          <a:effectLst/>
+                        </a:rPr>
+                        <a:t>50.025</a:t>
+                      </a:r>
+                      <a:endParaRPr lang="en-US" sz="1100" b="0" i="0" u="none" strike="noStrike">
+                        <a:solidFill>
+                          <a:srgbClr val="000000"/>
+                        </a:solidFill>
+                        <a:effectLst/>
+                        <a:latin typeface="Aptos Narrow" panose="020B0004020202020204" pitchFamily="34" charset="0"/>
+                      </a:endParaRPr>
+                    </a:p>
+                  </a:txBody>
+                  <a:tcPr marL="9525" marR="9525" marT="9525" marB="0" anchor="b"/>
+                </a:tc>
+                <a:tc>
+                  <a:txBody>
+                    <a:bodyPr/>
+                    <a:lstStyle/>
+                    <a:p>
+                      <a:pPr algn="r" fontAlgn="b">
+                        <a:buNone/>
+                      </a:pPr>
+                      <a:r>
+                        <a:rPr lang="en-US" sz="1100" u="none" strike="noStrike" dirty="0">
+                          <a:effectLst/>
+                        </a:rPr>
+                        <a:t>122820600</a:t>
+                      </a:r>
+                      <a:endParaRPr lang="en-US" sz="1100" b="0" i="0" u="none" strike="noStrike" dirty="0">
+                        <a:solidFill>
+                          <a:srgbClr val="000000"/>
+                        </a:solidFill>
+                        <a:effectLst/>
+                        <a:latin typeface="Aptos Narrow" panose="020B0004020202020204" pitchFamily="34" charset="0"/>
+                      </a:endParaRPr>
+                    </a:p>
+                  </a:txBody>
+                  <a:tcPr marL="9525" marR="9525" marT="9525" marB="0" anchor="b"/>
+                </a:tc>
+                <a:tc>
+                  <a:txBody>
+                    <a:bodyPr/>
+                    <a:lstStyle/>
+                    <a:p>
+                      <a:pPr algn="r" fontAlgn="b">
+                        <a:buNone/>
+                      </a:pPr>
+                      <a:r>
+                        <a:rPr lang="en-US" sz="1100" u="none" strike="noStrike" dirty="0">
+                          <a:effectLst/>
+                        </a:rPr>
+                        <a:t>0</a:t>
+                      </a:r>
+                      <a:endParaRPr lang="en-US" sz="1100" b="0" i="0" u="none" strike="noStrike" dirty="0">
+                        <a:solidFill>
+                          <a:srgbClr val="000000"/>
+                        </a:solidFill>
+                        <a:effectLst/>
+                        <a:latin typeface="Aptos Narrow" panose="020B0004020202020204" pitchFamily="34" charset="0"/>
+                      </a:endParaRPr>
+                    </a:p>
+                  </a:txBody>
+                  <a:tcPr marL="9525" marR="9525" marT="9525" marB="0" anchor="b"/>
+                </a:tc>
+                <a:tc>
+                  <a:txBody>
+                    <a:bodyPr/>
+                    <a:lstStyle/>
+                    <a:p>
+                      <a:pPr algn="r" fontAlgn="b">
+                        <a:buNone/>
+                      </a:pPr>
+                      <a:r>
+                        <a:rPr lang="en-US" sz="1100" u="none" strike="noStrike" dirty="0">
+                          <a:effectLst/>
+                        </a:rPr>
+                        <a:t>0</a:t>
+                      </a:r>
+                      <a:endParaRPr lang="en-US" sz="1100" b="0" i="0" u="none" strike="noStrike" dirty="0">
+                        <a:solidFill>
+                          <a:srgbClr val="000000"/>
+                        </a:solidFill>
+                        <a:effectLst/>
+                        <a:latin typeface="Aptos Narrow" panose="020B0004020202020204" pitchFamily="34" charset="0"/>
+                      </a:endParaRPr>
+                    </a:p>
+                  </a:txBody>
+                  <a:tcPr marL="9525" marR="9525" marT="9525" marB="0" anchor="b"/>
+                </a:tc>
+                <a:extLst>
+                  <a:ext uri="{0D108BD9-81ED-4DB2-BD59-A6C34878D82A}">
+                    <a16:rowId xmlns:a16="http://schemas.microsoft.com/office/drawing/2014/main" val="1091416025"/>
+                  </a:ext>
+                </a:extLst>
+              </a:tr>
+            </a:tbl>
+          </a:graphicData>
+        </a:graphic>
+      </p:graphicFrame>
+      <p:graphicFrame>
+        <p:nvGraphicFramePr>
+          <p:cNvPr id="8" name="Table 7">
+            <a:extLst>
+              <a:ext uri="{FF2B5EF4-FFF2-40B4-BE49-F238E27FC236}">
+                <a16:creationId xmlns:a16="http://schemas.microsoft.com/office/drawing/2014/main" id="{04725A1D-5073-F967-7CD8-979A8F23B5EE}"/>
+              </a:ext>
+            </a:extLst>
+          </p:cNvPr>
+          <p:cNvGraphicFramePr>
+            <a:graphicFrameLocks noGrp="1"/>
+          </p:cNvGraphicFramePr>
+          <p:nvPr>
+            <p:extLst>
+              <p:ext uri="{D42A27DB-BD31-4B8C-83A1-F6EECF244321}">
+                <p14:modId xmlns:p14="http://schemas.microsoft.com/office/powerpoint/2010/main" val="2359468100"/>
+              </p:ext>
+            </p:extLst>
+          </p:nvPr>
+        </p:nvGraphicFramePr>
+        <p:xfrm>
+          <a:off x="4484914" y="5695471"/>
+          <a:ext cx="5852160" cy="762000"/>
+        </p:xfrm>
+        <a:graphic>
+          <a:graphicData uri="http://schemas.openxmlformats.org/drawingml/2006/table">
+            <a:tbl>
+              <a:tblPr>
+                <a:tableStyleId>{5C22544A-7EE6-4342-B048-85BDC9FD1C3A}</a:tableStyleId>
+              </a:tblPr>
+              <a:tblGrid>
+                <a:gridCol w="749300">
+                  <a:extLst>
+                    <a:ext uri="{9D8B030D-6E8A-4147-A177-3AD203B41FA5}">
+                      <a16:colId xmlns:a16="http://schemas.microsoft.com/office/drawing/2014/main" val="2370773121"/>
+                    </a:ext>
+                  </a:extLst>
+                </a:gridCol>
+                <a:gridCol w="705032">
+                  <a:extLst>
+                    <a:ext uri="{9D8B030D-6E8A-4147-A177-3AD203B41FA5}">
+                      <a16:colId xmlns:a16="http://schemas.microsoft.com/office/drawing/2014/main" val="2603356998"/>
+                    </a:ext>
+                  </a:extLst>
+                </a:gridCol>
+                <a:gridCol w="775063">
+                  <a:extLst>
+                    <a:ext uri="{9D8B030D-6E8A-4147-A177-3AD203B41FA5}">
+                      <a16:colId xmlns:a16="http://schemas.microsoft.com/office/drawing/2014/main" val="3873826684"/>
+                    </a:ext>
+                  </a:extLst>
+                </a:gridCol>
+                <a:gridCol w="661851">
+                  <a:extLst>
+                    <a:ext uri="{9D8B030D-6E8A-4147-A177-3AD203B41FA5}">
+                      <a16:colId xmlns:a16="http://schemas.microsoft.com/office/drawing/2014/main" val="367885362"/>
+                    </a:ext>
+                  </a:extLst>
+                </a:gridCol>
+                <a:gridCol w="705394">
+                  <a:extLst>
+                    <a:ext uri="{9D8B030D-6E8A-4147-A177-3AD203B41FA5}">
+                      <a16:colId xmlns:a16="http://schemas.microsoft.com/office/drawing/2014/main" val="314770450"/>
+                    </a:ext>
+                  </a:extLst>
+                </a:gridCol>
+                <a:gridCol w="705394">
+                  <a:extLst>
+                    <a:ext uri="{9D8B030D-6E8A-4147-A177-3AD203B41FA5}">
+                      <a16:colId xmlns:a16="http://schemas.microsoft.com/office/drawing/2014/main" val="2725232399"/>
+                    </a:ext>
+                  </a:extLst>
+                </a:gridCol>
+                <a:gridCol w="722812">
+                  <a:extLst>
+                    <a:ext uri="{9D8B030D-6E8A-4147-A177-3AD203B41FA5}">
+                      <a16:colId xmlns:a16="http://schemas.microsoft.com/office/drawing/2014/main" val="3547895199"/>
+                    </a:ext>
+                  </a:extLst>
+                </a:gridCol>
+                <a:gridCol w="827314">
+                  <a:extLst>
+                    <a:ext uri="{9D8B030D-6E8A-4147-A177-3AD203B41FA5}">
+                      <a16:colId xmlns:a16="http://schemas.microsoft.com/office/drawing/2014/main" val="3943219054"/>
+                    </a:ext>
+                  </a:extLst>
+                </a:gridCol>
+              </a:tblGrid>
+              <a:tr h="190500">
+                <a:tc>
+                  <a:txBody>
+                    <a:bodyPr/>
+                    <a:lstStyle/>
+                    <a:p>
+                      <a:pPr algn="l" fontAlgn="b">
+                        <a:buNone/>
+                      </a:pPr>
+                      <a:r>
+                        <a:rPr lang="en-US" sz="1100" u="none" strike="noStrike">
+                          <a:effectLst/>
+                        </a:rPr>
+                        <a:t>Date</a:t>
+                      </a:r>
+                      <a:endParaRPr lang="en-US" sz="1100" b="0" i="0" u="none" strike="noStrike">
+                        <a:solidFill>
+                          <a:srgbClr val="000000"/>
+                        </a:solidFill>
+                        <a:effectLst/>
+                        <a:latin typeface="Aptos Narrow" panose="020B0004020202020204" pitchFamily="34" charset="0"/>
+                      </a:endParaRPr>
+                    </a:p>
+                  </a:txBody>
+                  <a:tcPr marL="9525" marR="9525" marT="9525" marB="0" anchor="b"/>
+                </a:tc>
+                <a:tc>
+                  <a:txBody>
+                    <a:bodyPr/>
+                    <a:lstStyle/>
+                    <a:p>
+                      <a:pPr algn="l" fontAlgn="b">
+                        <a:buNone/>
+                      </a:pPr>
+                      <a:r>
+                        <a:rPr lang="en-US" sz="1100" u="none" strike="noStrike">
+                          <a:effectLst/>
+                        </a:rPr>
+                        <a:t>Adj_Close</a:t>
+                      </a:r>
+                      <a:endParaRPr lang="en-US" sz="1100" b="0" i="0" u="none" strike="noStrike">
+                        <a:solidFill>
+                          <a:srgbClr val="000000"/>
+                        </a:solidFill>
+                        <a:effectLst/>
+                        <a:latin typeface="Aptos Narrow" panose="020B0004020202020204" pitchFamily="34" charset="0"/>
+                      </a:endParaRPr>
+                    </a:p>
+                  </a:txBody>
+                  <a:tcPr marL="9525" marR="9525" marT="9525" marB="0" anchor="b"/>
+                </a:tc>
+                <a:tc>
+                  <a:txBody>
+                    <a:bodyPr/>
+                    <a:lstStyle/>
+                    <a:p>
+                      <a:pPr algn="l" fontAlgn="b">
+                        <a:buNone/>
+                      </a:pPr>
+                      <a:r>
+                        <a:rPr lang="en-US" sz="1100" u="none" strike="noStrike">
+                          <a:effectLst/>
+                        </a:rPr>
+                        <a:t>Close</a:t>
+                      </a:r>
+                      <a:endParaRPr lang="en-US" sz="1100" b="0" i="0" u="none" strike="noStrike">
+                        <a:solidFill>
+                          <a:srgbClr val="000000"/>
+                        </a:solidFill>
+                        <a:effectLst/>
+                        <a:latin typeface="Aptos Narrow" panose="020B0004020202020204" pitchFamily="34" charset="0"/>
+                      </a:endParaRPr>
+                    </a:p>
+                  </a:txBody>
+                  <a:tcPr marL="9525" marR="9525" marT="9525" marB="0" anchor="b"/>
+                </a:tc>
+                <a:tc>
+                  <a:txBody>
+                    <a:bodyPr/>
+                    <a:lstStyle/>
+                    <a:p>
+                      <a:pPr algn="l" fontAlgn="b">
+                        <a:buNone/>
+                      </a:pPr>
+                      <a:r>
+                        <a:rPr lang="en-US" sz="1100" u="none" strike="noStrike">
+                          <a:effectLst/>
+                        </a:rPr>
+                        <a:t>High</a:t>
+                      </a:r>
+                      <a:endParaRPr lang="en-US" sz="1100" b="0" i="0" u="none" strike="noStrike">
+                        <a:solidFill>
+                          <a:srgbClr val="000000"/>
+                        </a:solidFill>
+                        <a:effectLst/>
+                        <a:latin typeface="Aptos Narrow" panose="020B0004020202020204" pitchFamily="34" charset="0"/>
+                      </a:endParaRPr>
+                    </a:p>
+                  </a:txBody>
+                  <a:tcPr marL="9525" marR="9525" marT="9525" marB="0" anchor="b"/>
+                </a:tc>
+                <a:tc>
+                  <a:txBody>
+                    <a:bodyPr/>
+                    <a:lstStyle/>
+                    <a:p>
+                      <a:pPr algn="l" fontAlgn="b">
+                        <a:buNone/>
+                      </a:pPr>
+                      <a:r>
+                        <a:rPr lang="en-US" sz="1100" u="none" strike="noStrike">
+                          <a:effectLst/>
+                        </a:rPr>
+                        <a:t>Low</a:t>
+                      </a:r>
+                      <a:endParaRPr lang="en-US" sz="1100" b="0" i="0" u="none" strike="noStrike">
+                        <a:solidFill>
+                          <a:srgbClr val="000000"/>
+                        </a:solidFill>
+                        <a:effectLst/>
+                        <a:latin typeface="Aptos Narrow" panose="020B0004020202020204" pitchFamily="34" charset="0"/>
+                      </a:endParaRPr>
+                    </a:p>
+                  </a:txBody>
+                  <a:tcPr marL="9525" marR="9525" marT="9525" marB="0" anchor="b"/>
+                </a:tc>
+                <a:tc>
+                  <a:txBody>
+                    <a:bodyPr/>
+                    <a:lstStyle/>
+                    <a:p>
+                      <a:pPr algn="l" fontAlgn="b">
+                        <a:buNone/>
+                      </a:pPr>
+                      <a:r>
+                        <a:rPr lang="en-US" sz="1100" u="none" strike="noStrike">
+                          <a:effectLst/>
+                        </a:rPr>
+                        <a:t>Open</a:t>
+                      </a:r>
+                      <a:endParaRPr lang="en-US" sz="1100" b="0" i="0" u="none" strike="noStrike">
+                        <a:solidFill>
+                          <a:srgbClr val="000000"/>
+                        </a:solidFill>
+                        <a:effectLst/>
+                        <a:latin typeface="Aptos Narrow" panose="020B0004020202020204" pitchFamily="34" charset="0"/>
+                      </a:endParaRPr>
+                    </a:p>
+                  </a:txBody>
+                  <a:tcPr marL="9525" marR="9525" marT="9525" marB="0" anchor="b"/>
+                </a:tc>
+                <a:tc>
+                  <a:txBody>
+                    <a:bodyPr/>
+                    <a:lstStyle/>
+                    <a:p>
+                      <a:pPr algn="l" fontAlgn="b">
+                        <a:buNone/>
+                      </a:pPr>
+                      <a:r>
+                        <a:rPr lang="en-US" sz="1100" u="none" strike="noStrike">
+                          <a:effectLst/>
+                        </a:rPr>
+                        <a:t>Dividends</a:t>
+                      </a:r>
+                      <a:endParaRPr lang="en-US" sz="1100" b="0" i="0" u="none" strike="noStrike">
+                        <a:solidFill>
+                          <a:srgbClr val="000000"/>
+                        </a:solidFill>
+                        <a:effectLst/>
+                        <a:latin typeface="Aptos Narrow" panose="020B0004020202020204" pitchFamily="34" charset="0"/>
+                      </a:endParaRPr>
+                    </a:p>
+                  </a:txBody>
+                  <a:tcPr marL="9525" marR="9525" marT="9525" marB="0" anchor="b"/>
+                </a:tc>
+                <a:tc>
+                  <a:txBody>
+                    <a:bodyPr/>
+                    <a:lstStyle/>
+                    <a:p>
+                      <a:pPr algn="l" fontAlgn="b">
+                        <a:buNone/>
+                      </a:pPr>
+                      <a:r>
+                        <a:rPr lang="en-US" sz="1100" u="none" strike="noStrike">
+                          <a:effectLst/>
+                        </a:rPr>
+                        <a:t>Split_Ratio</a:t>
+                      </a:r>
+                      <a:endParaRPr lang="en-US" sz="1100" b="0" i="0" u="none" strike="noStrike">
+                        <a:solidFill>
+                          <a:srgbClr val="000000"/>
+                        </a:solidFill>
+                        <a:effectLst/>
+                        <a:latin typeface="Aptos Narrow" panose="020B0004020202020204" pitchFamily="34" charset="0"/>
+                      </a:endParaRPr>
+                    </a:p>
+                  </a:txBody>
+                  <a:tcPr marL="9525" marR="9525" marT="9525" marB="0" anchor="b"/>
+                </a:tc>
+                <a:extLst>
+                  <a:ext uri="{0D108BD9-81ED-4DB2-BD59-A6C34878D82A}">
+                    <a16:rowId xmlns:a16="http://schemas.microsoft.com/office/drawing/2014/main" val="2944413431"/>
+                  </a:ext>
+                </a:extLst>
+              </a:tr>
+              <a:tr h="190500">
+                <a:tc>
+                  <a:txBody>
+                    <a:bodyPr/>
+                    <a:lstStyle/>
+                    <a:p>
+                      <a:pPr algn="r" fontAlgn="b">
+                        <a:buNone/>
+                      </a:pPr>
+                      <a:r>
+                        <a:rPr lang="en-US" sz="1100" u="none" strike="noStrike" dirty="0">
+                          <a:effectLst/>
+                        </a:rPr>
+                        <a:t>11/19/2025</a:t>
+                      </a:r>
+                      <a:endParaRPr lang="en-US" sz="1100" b="0" i="0" u="none" strike="noStrike" dirty="0">
+                        <a:solidFill>
+                          <a:srgbClr val="000000"/>
+                        </a:solidFill>
+                        <a:effectLst/>
+                        <a:latin typeface="Aptos Narrow" panose="020B0004020202020204" pitchFamily="34" charset="0"/>
+                      </a:endParaRPr>
+                    </a:p>
+                  </a:txBody>
+                  <a:tcPr marL="9525" marR="9525" marT="9525" marB="0" anchor="b"/>
+                </a:tc>
+                <a:tc>
+                  <a:txBody>
+                    <a:bodyPr/>
+                    <a:lstStyle/>
+                    <a:p>
+                      <a:pPr algn="r" fontAlgn="b">
+                        <a:buNone/>
+                      </a:pPr>
+                      <a:r>
+                        <a:rPr lang="en-US" sz="1100" u="none" strike="noStrike">
+                          <a:effectLst/>
+                        </a:rPr>
+                        <a:t>50.025</a:t>
+                      </a:r>
+                      <a:endParaRPr lang="en-US" sz="1100" b="0" i="0" u="none" strike="noStrike">
+                        <a:solidFill>
+                          <a:srgbClr val="000000"/>
+                        </a:solidFill>
+                        <a:effectLst/>
+                        <a:latin typeface="Aptos Narrow" panose="020B0004020202020204" pitchFamily="34" charset="0"/>
+                      </a:endParaRPr>
+                    </a:p>
+                  </a:txBody>
+                  <a:tcPr marL="9525" marR="9525" marT="9525" marB="0" anchor="b"/>
+                </a:tc>
+                <a:tc>
+                  <a:txBody>
+                    <a:bodyPr/>
+                    <a:lstStyle/>
+                    <a:p>
+                      <a:pPr algn="r" fontAlgn="b">
+                        <a:buNone/>
+                      </a:pPr>
+                      <a:r>
+                        <a:rPr lang="en-US" sz="1100" u="none" strike="noStrike">
+                          <a:effectLst/>
+                        </a:rPr>
+                        <a:t>100.05</a:t>
+                      </a:r>
+                      <a:endParaRPr lang="en-US" sz="1100" b="0" i="0" u="none" strike="noStrike">
+                        <a:solidFill>
+                          <a:srgbClr val="000000"/>
+                        </a:solidFill>
+                        <a:effectLst/>
+                        <a:latin typeface="Aptos Narrow" panose="020B0004020202020204" pitchFamily="34" charset="0"/>
+                      </a:endParaRPr>
+                    </a:p>
+                  </a:txBody>
+                  <a:tcPr marL="9525" marR="9525" marT="9525" marB="0" anchor="b"/>
+                </a:tc>
+                <a:tc>
+                  <a:txBody>
+                    <a:bodyPr/>
+                    <a:lstStyle/>
+                    <a:p>
+                      <a:pPr algn="r" fontAlgn="b">
+                        <a:buNone/>
+                      </a:pPr>
+                      <a:r>
+                        <a:rPr lang="en-US" sz="1100" u="none" strike="noStrike">
+                          <a:effectLst/>
+                        </a:rPr>
+                        <a:t>103.15</a:t>
+                      </a:r>
+                      <a:endParaRPr lang="en-US" sz="1100" b="0" i="0" u="none" strike="noStrike">
+                        <a:solidFill>
+                          <a:srgbClr val="000000"/>
+                        </a:solidFill>
+                        <a:effectLst/>
+                        <a:latin typeface="Aptos Narrow" panose="020B0004020202020204" pitchFamily="34" charset="0"/>
+                      </a:endParaRPr>
+                    </a:p>
+                  </a:txBody>
+                  <a:tcPr marL="9525" marR="9525" marT="9525" marB="0" anchor="b"/>
+                </a:tc>
+                <a:tc>
+                  <a:txBody>
+                    <a:bodyPr/>
+                    <a:lstStyle/>
+                    <a:p>
+                      <a:pPr algn="r" fontAlgn="b">
+                        <a:buNone/>
+                      </a:pPr>
+                      <a:r>
+                        <a:rPr lang="en-US" sz="1100" u="none" strike="noStrike">
+                          <a:effectLst/>
+                        </a:rPr>
+                        <a:t>97.43</a:t>
+                      </a:r>
+                      <a:endParaRPr lang="en-US" sz="1100" b="0" i="0" u="none" strike="noStrike">
+                        <a:solidFill>
+                          <a:srgbClr val="000000"/>
+                        </a:solidFill>
+                        <a:effectLst/>
+                        <a:latin typeface="Aptos Narrow" panose="020B0004020202020204" pitchFamily="34" charset="0"/>
+                      </a:endParaRPr>
+                    </a:p>
+                  </a:txBody>
+                  <a:tcPr marL="9525" marR="9525" marT="9525" marB="0" anchor="b"/>
+                </a:tc>
+                <a:tc>
+                  <a:txBody>
+                    <a:bodyPr/>
+                    <a:lstStyle/>
+                    <a:p>
+                      <a:pPr algn="r" fontAlgn="b">
+                        <a:buNone/>
+                      </a:pPr>
+                      <a:r>
+                        <a:rPr lang="en-US" sz="1100" u="none" strike="noStrike">
+                          <a:effectLst/>
+                        </a:rPr>
+                        <a:t>98.65</a:t>
+                      </a:r>
+                      <a:endParaRPr lang="en-US" sz="1100" b="0" i="0" u="none" strike="noStrike">
+                        <a:solidFill>
+                          <a:srgbClr val="000000"/>
+                        </a:solidFill>
+                        <a:effectLst/>
+                        <a:latin typeface="Aptos Narrow" panose="020B0004020202020204" pitchFamily="34" charset="0"/>
+                      </a:endParaRPr>
+                    </a:p>
+                  </a:txBody>
+                  <a:tcPr marL="9525" marR="9525" marT="9525" marB="0" anchor="b"/>
+                </a:tc>
+                <a:tc>
+                  <a:txBody>
+                    <a:bodyPr/>
+                    <a:lstStyle/>
+                    <a:p>
+                      <a:pPr algn="r" fontAlgn="b">
+                        <a:buNone/>
+                      </a:pPr>
+                      <a:r>
+                        <a:rPr lang="en-US" sz="1100" u="none" strike="noStrike">
+                          <a:effectLst/>
+                        </a:rPr>
+                        <a:t>0</a:t>
+                      </a:r>
+                      <a:endParaRPr lang="en-US" sz="1100" b="0" i="0" u="none" strike="noStrike">
+                        <a:solidFill>
+                          <a:srgbClr val="000000"/>
+                        </a:solidFill>
+                        <a:effectLst/>
+                        <a:latin typeface="Aptos Narrow" panose="020B0004020202020204" pitchFamily="34" charset="0"/>
+                      </a:endParaRPr>
+                    </a:p>
+                  </a:txBody>
+                  <a:tcPr marL="9525" marR="9525" marT="9525" marB="0" anchor="b"/>
+                </a:tc>
+                <a:tc>
+                  <a:txBody>
+                    <a:bodyPr/>
+                    <a:lstStyle/>
+                    <a:p>
+                      <a:pPr algn="r" fontAlgn="b">
+                        <a:buNone/>
+                      </a:pPr>
+                      <a:r>
+                        <a:rPr lang="en-US" sz="1100" u="none" strike="noStrike">
+                          <a:effectLst/>
+                        </a:rPr>
+                        <a:t>0</a:t>
+                      </a:r>
+                      <a:endParaRPr lang="en-US" sz="1100" b="0" i="0" u="none" strike="noStrike">
+                        <a:solidFill>
+                          <a:srgbClr val="000000"/>
+                        </a:solidFill>
+                        <a:effectLst/>
+                        <a:latin typeface="Aptos Narrow" panose="020B0004020202020204" pitchFamily="34" charset="0"/>
+                      </a:endParaRPr>
+                    </a:p>
+                  </a:txBody>
+                  <a:tcPr marL="9525" marR="9525" marT="9525" marB="0" anchor="b"/>
+                </a:tc>
+                <a:extLst>
+                  <a:ext uri="{0D108BD9-81ED-4DB2-BD59-A6C34878D82A}">
+                    <a16:rowId xmlns:a16="http://schemas.microsoft.com/office/drawing/2014/main" val="1416221290"/>
+                  </a:ext>
+                </a:extLst>
+              </a:tr>
+              <a:tr h="190500">
+                <a:tc>
+                  <a:txBody>
+                    <a:bodyPr/>
+                    <a:lstStyle/>
+                    <a:p>
+                      <a:pPr algn="r" fontAlgn="b">
+                        <a:buNone/>
+                      </a:pPr>
+                      <a:r>
+                        <a:rPr lang="en-US" sz="1100" u="none" strike="noStrike" dirty="0">
+                          <a:effectLst/>
+                        </a:rPr>
+                        <a:t>11/20/2025</a:t>
+                      </a:r>
+                      <a:endParaRPr lang="en-US" sz="1100" b="0" i="0" u="none" strike="noStrike" dirty="0">
+                        <a:solidFill>
+                          <a:srgbClr val="FF0000"/>
+                        </a:solidFill>
+                        <a:effectLst/>
+                        <a:latin typeface="Aptos Narrow" panose="020B0004020202020204" pitchFamily="34" charset="0"/>
+                      </a:endParaRPr>
+                    </a:p>
+                  </a:txBody>
+                  <a:tcPr marL="9525" marR="9525" marT="9525" marB="0" anchor="b"/>
+                </a:tc>
+                <a:tc>
+                  <a:txBody>
+                    <a:bodyPr/>
+                    <a:lstStyle/>
+                    <a:p>
+                      <a:pPr algn="r" fontAlgn="b">
+                        <a:buNone/>
+                      </a:pPr>
+                      <a:r>
+                        <a:rPr lang="en-US" sz="1100" u="none" strike="noStrike" dirty="0">
+                          <a:effectLst/>
+                        </a:rPr>
+                        <a:t>46.45</a:t>
+                      </a:r>
+                      <a:endParaRPr lang="en-US" sz="1100" b="0" i="0" u="none" strike="noStrike" dirty="0">
+                        <a:solidFill>
+                          <a:srgbClr val="FF0000"/>
+                        </a:solidFill>
+                        <a:effectLst/>
+                        <a:latin typeface="Aptos Narrow" panose="020B0004020202020204" pitchFamily="34" charset="0"/>
+                      </a:endParaRPr>
+                    </a:p>
+                  </a:txBody>
+                  <a:tcPr marL="9525" marR="9525" marT="9525" marB="0" anchor="b"/>
+                </a:tc>
+                <a:tc>
+                  <a:txBody>
+                    <a:bodyPr/>
+                    <a:lstStyle/>
+                    <a:p>
+                      <a:pPr algn="r" fontAlgn="b">
+                        <a:buNone/>
+                      </a:pPr>
+                      <a:r>
+                        <a:rPr lang="en-US" sz="1100" u="none" strike="noStrike">
+                          <a:effectLst/>
+                        </a:rPr>
+                        <a:t>46.45</a:t>
+                      </a:r>
+                      <a:endParaRPr lang="en-US" sz="1100" b="0" i="0" u="none" strike="noStrike">
+                        <a:solidFill>
+                          <a:srgbClr val="FF0000"/>
+                        </a:solidFill>
+                        <a:effectLst/>
+                        <a:latin typeface="Aptos Narrow" panose="020B0004020202020204" pitchFamily="34" charset="0"/>
+                      </a:endParaRPr>
+                    </a:p>
+                  </a:txBody>
+                  <a:tcPr marL="9525" marR="9525" marT="9525" marB="0" anchor="b"/>
+                </a:tc>
+                <a:tc>
+                  <a:txBody>
+                    <a:bodyPr/>
+                    <a:lstStyle/>
+                    <a:p>
+                      <a:pPr algn="r" fontAlgn="b">
+                        <a:buNone/>
+                      </a:pPr>
+                      <a:r>
+                        <a:rPr lang="en-US" sz="1100" u="none" strike="noStrike">
+                          <a:effectLst/>
+                        </a:rPr>
+                        <a:t>53.54</a:t>
+                      </a:r>
+                      <a:endParaRPr lang="en-US" sz="1100" b="0" i="0" u="none" strike="noStrike">
+                        <a:solidFill>
+                          <a:srgbClr val="FF0000"/>
+                        </a:solidFill>
+                        <a:effectLst/>
+                        <a:latin typeface="Aptos Narrow" panose="020B0004020202020204" pitchFamily="34" charset="0"/>
+                      </a:endParaRPr>
+                    </a:p>
+                  </a:txBody>
+                  <a:tcPr marL="9525" marR="9525" marT="9525" marB="0" anchor="b"/>
+                </a:tc>
+                <a:tc>
+                  <a:txBody>
+                    <a:bodyPr/>
+                    <a:lstStyle/>
+                    <a:p>
+                      <a:pPr algn="r" fontAlgn="b">
+                        <a:buNone/>
+                      </a:pPr>
+                      <a:r>
+                        <a:rPr lang="en-US" sz="1100" u="none" strike="noStrike">
+                          <a:effectLst/>
+                        </a:rPr>
+                        <a:t>46.23</a:t>
+                      </a:r>
+                      <a:endParaRPr lang="en-US" sz="1100" b="0" i="0" u="none" strike="noStrike">
+                        <a:solidFill>
+                          <a:srgbClr val="FF0000"/>
+                        </a:solidFill>
+                        <a:effectLst/>
+                        <a:latin typeface="Aptos Narrow" panose="020B0004020202020204" pitchFamily="34" charset="0"/>
+                      </a:endParaRPr>
+                    </a:p>
+                  </a:txBody>
+                  <a:tcPr marL="9525" marR="9525" marT="9525" marB="0" anchor="b"/>
+                </a:tc>
+                <a:tc>
+                  <a:txBody>
+                    <a:bodyPr/>
+                    <a:lstStyle/>
+                    <a:p>
+                      <a:pPr algn="r" fontAlgn="b">
+                        <a:buNone/>
+                      </a:pPr>
+                      <a:r>
+                        <a:rPr lang="en-US" sz="1100" u="none" strike="noStrike">
+                          <a:effectLst/>
+                        </a:rPr>
+                        <a:t>52.95</a:t>
+                      </a:r>
+                      <a:endParaRPr lang="en-US" sz="1100" b="0" i="0" u="none" strike="noStrike">
+                        <a:solidFill>
+                          <a:srgbClr val="FF0000"/>
+                        </a:solidFill>
+                        <a:effectLst/>
+                        <a:latin typeface="Aptos Narrow" panose="020B0004020202020204" pitchFamily="34" charset="0"/>
+                      </a:endParaRPr>
+                    </a:p>
+                  </a:txBody>
+                  <a:tcPr marL="9525" marR="9525" marT="9525" marB="0" anchor="b"/>
+                </a:tc>
+                <a:tc>
+                  <a:txBody>
+                    <a:bodyPr/>
+                    <a:lstStyle/>
+                    <a:p>
+                      <a:pPr algn="r" fontAlgn="b">
+                        <a:buNone/>
+                      </a:pPr>
+                      <a:r>
+                        <a:rPr lang="en-US" sz="1100" u="none" strike="noStrike">
+                          <a:effectLst/>
+                        </a:rPr>
+                        <a:t>0</a:t>
+                      </a:r>
+                      <a:endParaRPr lang="en-US" sz="1100" b="0" i="0" u="none" strike="noStrike">
+                        <a:solidFill>
+                          <a:srgbClr val="FF0000"/>
+                        </a:solidFill>
+                        <a:effectLst/>
+                        <a:latin typeface="Aptos Narrow" panose="020B0004020202020204" pitchFamily="34" charset="0"/>
+                      </a:endParaRPr>
+                    </a:p>
+                  </a:txBody>
+                  <a:tcPr marL="9525" marR="9525" marT="9525" marB="0" anchor="b"/>
+                </a:tc>
+                <a:tc>
+                  <a:txBody>
+                    <a:bodyPr/>
+                    <a:lstStyle/>
+                    <a:p>
+                      <a:pPr marL="0" algn="r" defTabSz="914400" rtl="0" eaLnBrk="1" fontAlgn="b" latinLnBrk="0" hangingPunct="1">
+                        <a:buNone/>
+                      </a:pPr>
+                      <a:r>
+                        <a:rPr lang="en-US" sz="1100" b="1" u="none" strike="noStrike" kern="1200" dirty="0">
+                          <a:solidFill>
+                            <a:schemeClr val="dk1"/>
+                          </a:solidFill>
+                          <a:effectLst/>
+                          <a:highlight>
+                            <a:srgbClr val="FFFF00"/>
+                          </a:highlight>
+                          <a:latin typeface="+mn-lt"/>
+                          <a:ea typeface="+mn-ea"/>
+                          <a:cs typeface="+mn-cs"/>
+                        </a:rPr>
+                        <a:t>2</a:t>
+                      </a:r>
+                    </a:p>
+                  </a:txBody>
+                  <a:tcPr marL="9525" marR="9525" marT="9525" marB="0" anchor="b"/>
+                </a:tc>
+                <a:extLst>
+                  <a:ext uri="{0D108BD9-81ED-4DB2-BD59-A6C34878D82A}">
+                    <a16:rowId xmlns:a16="http://schemas.microsoft.com/office/drawing/2014/main" val="1911448783"/>
+                  </a:ext>
+                </a:extLst>
+              </a:tr>
+              <a:tr h="190500">
+                <a:tc>
+                  <a:txBody>
+                    <a:bodyPr/>
+                    <a:lstStyle/>
+                    <a:p>
+                      <a:pPr algn="r" fontAlgn="b">
+                        <a:buNone/>
+                      </a:pPr>
+                      <a:r>
+                        <a:rPr lang="en-US" sz="1100" u="none" strike="noStrike">
+                          <a:effectLst/>
+                        </a:rPr>
+                        <a:t>11/21/2025</a:t>
+                      </a:r>
+                      <a:endParaRPr lang="en-US" sz="1100" b="0" i="0" u="none" strike="noStrike">
+                        <a:solidFill>
+                          <a:srgbClr val="000000"/>
+                        </a:solidFill>
+                        <a:effectLst/>
+                        <a:latin typeface="Aptos Narrow" panose="020B0004020202020204" pitchFamily="34" charset="0"/>
+                      </a:endParaRPr>
+                    </a:p>
+                  </a:txBody>
+                  <a:tcPr marL="9525" marR="9525" marT="9525" marB="0" anchor="b"/>
+                </a:tc>
+                <a:tc>
+                  <a:txBody>
+                    <a:bodyPr/>
+                    <a:lstStyle/>
+                    <a:p>
+                      <a:pPr algn="r" fontAlgn="b">
+                        <a:buNone/>
+                      </a:pPr>
+                      <a:r>
+                        <a:rPr lang="en-US" sz="1100" u="none" strike="noStrike">
+                          <a:effectLst/>
+                        </a:rPr>
+                        <a:t>47.48</a:t>
+                      </a:r>
+                      <a:endParaRPr lang="en-US" sz="1100" b="0" i="0" u="none" strike="noStrike">
+                        <a:solidFill>
+                          <a:srgbClr val="000000"/>
+                        </a:solidFill>
+                        <a:effectLst/>
+                        <a:latin typeface="Aptos Narrow" panose="020B0004020202020204" pitchFamily="34" charset="0"/>
+                      </a:endParaRPr>
+                    </a:p>
+                  </a:txBody>
+                  <a:tcPr marL="9525" marR="9525" marT="9525" marB="0" anchor="b"/>
+                </a:tc>
+                <a:tc>
+                  <a:txBody>
+                    <a:bodyPr/>
+                    <a:lstStyle/>
+                    <a:p>
+                      <a:pPr algn="r" fontAlgn="b">
+                        <a:buNone/>
+                      </a:pPr>
+                      <a:r>
+                        <a:rPr lang="en-US" sz="1100" u="none" strike="noStrike" dirty="0">
+                          <a:effectLst/>
+                        </a:rPr>
+                        <a:t>47.48</a:t>
+                      </a:r>
+                      <a:endParaRPr lang="en-US" sz="1100" b="0" i="0" u="none" strike="noStrike" dirty="0">
+                        <a:solidFill>
+                          <a:srgbClr val="000000"/>
+                        </a:solidFill>
+                        <a:effectLst/>
+                        <a:latin typeface="Aptos Narrow" panose="020B0004020202020204" pitchFamily="34" charset="0"/>
+                      </a:endParaRPr>
+                    </a:p>
+                  </a:txBody>
+                  <a:tcPr marL="9525" marR="9525" marT="9525" marB="0" anchor="b"/>
+                </a:tc>
+                <a:tc>
+                  <a:txBody>
+                    <a:bodyPr/>
+                    <a:lstStyle/>
+                    <a:p>
+                      <a:pPr algn="r" fontAlgn="b">
+                        <a:buNone/>
+                      </a:pPr>
+                      <a:r>
+                        <a:rPr lang="en-US" sz="1100" u="none" strike="noStrike" dirty="0">
+                          <a:effectLst/>
+                        </a:rPr>
+                        <a:t>49.1</a:t>
+                      </a:r>
+                      <a:endParaRPr lang="en-US" sz="1100" b="0" i="0" u="none" strike="noStrike" dirty="0">
+                        <a:solidFill>
+                          <a:srgbClr val="000000"/>
+                        </a:solidFill>
+                        <a:effectLst/>
+                        <a:latin typeface="Aptos Narrow" panose="020B0004020202020204" pitchFamily="34" charset="0"/>
+                      </a:endParaRPr>
+                    </a:p>
+                  </a:txBody>
+                  <a:tcPr marL="9525" marR="9525" marT="9525" marB="0" anchor="b"/>
+                </a:tc>
+                <a:tc>
+                  <a:txBody>
+                    <a:bodyPr/>
+                    <a:lstStyle/>
+                    <a:p>
+                      <a:pPr algn="r" fontAlgn="b">
+                        <a:buNone/>
+                      </a:pPr>
+                      <a:r>
+                        <a:rPr lang="en-US" sz="1100" u="none" strike="noStrike" dirty="0">
+                          <a:effectLst/>
+                        </a:rPr>
+                        <a:t>45.24</a:t>
+                      </a:r>
+                      <a:endParaRPr lang="en-US" sz="1100" b="0" i="0" u="none" strike="noStrike" dirty="0">
+                        <a:solidFill>
+                          <a:srgbClr val="000000"/>
+                        </a:solidFill>
+                        <a:effectLst/>
+                        <a:latin typeface="Aptos Narrow" panose="020B0004020202020204" pitchFamily="34" charset="0"/>
+                      </a:endParaRPr>
+                    </a:p>
+                  </a:txBody>
+                  <a:tcPr marL="9525" marR="9525" marT="9525" marB="0" anchor="b"/>
+                </a:tc>
+                <a:tc>
+                  <a:txBody>
+                    <a:bodyPr/>
+                    <a:lstStyle/>
+                    <a:p>
+                      <a:pPr algn="r" fontAlgn="b">
+                        <a:buNone/>
+                      </a:pPr>
+                      <a:r>
+                        <a:rPr lang="en-US" sz="1100" u="none" strike="noStrike" dirty="0">
+                          <a:effectLst/>
+                        </a:rPr>
+                        <a:t>46.85</a:t>
+                      </a:r>
+                      <a:endParaRPr lang="en-US" sz="1100" b="0" i="0" u="none" strike="noStrike" dirty="0">
+                        <a:solidFill>
+                          <a:srgbClr val="000000"/>
+                        </a:solidFill>
+                        <a:effectLst/>
+                        <a:latin typeface="Aptos Narrow" panose="020B0004020202020204" pitchFamily="34" charset="0"/>
+                      </a:endParaRPr>
+                    </a:p>
+                  </a:txBody>
+                  <a:tcPr marL="9525" marR="9525" marT="9525" marB="0" anchor="b"/>
+                </a:tc>
+                <a:tc>
+                  <a:txBody>
+                    <a:bodyPr/>
+                    <a:lstStyle/>
+                    <a:p>
+                      <a:pPr algn="r" fontAlgn="b">
+                        <a:buNone/>
+                      </a:pPr>
+                      <a:r>
+                        <a:rPr lang="en-US" sz="1100" u="none" strike="noStrike" dirty="0">
+                          <a:effectLst/>
+                        </a:rPr>
+                        <a:t>0</a:t>
+                      </a:r>
+                      <a:endParaRPr lang="en-US" sz="1100" b="0" i="0" u="none" strike="noStrike" dirty="0">
+                        <a:solidFill>
+                          <a:srgbClr val="000000"/>
+                        </a:solidFill>
+                        <a:effectLst/>
+                        <a:latin typeface="Aptos Narrow" panose="020B0004020202020204" pitchFamily="34" charset="0"/>
+                      </a:endParaRPr>
+                    </a:p>
+                  </a:txBody>
+                  <a:tcPr marL="9525" marR="9525" marT="9525" marB="0" anchor="b"/>
+                </a:tc>
+                <a:tc>
+                  <a:txBody>
+                    <a:bodyPr/>
+                    <a:lstStyle/>
+                    <a:p>
+                      <a:pPr algn="r" fontAlgn="b">
+                        <a:buNone/>
+                      </a:pPr>
+                      <a:r>
+                        <a:rPr lang="en-US" sz="1100" u="none" strike="noStrike" dirty="0">
+                          <a:effectLst/>
+                        </a:rPr>
+                        <a:t>0</a:t>
+                      </a:r>
+                      <a:endParaRPr lang="en-US" sz="1100" b="0" i="0" u="none" strike="noStrike" dirty="0">
+                        <a:solidFill>
+                          <a:srgbClr val="000000"/>
+                        </a:solidFill>
+                        <a:effectLst/>
+                        <a:latin typeface="Aptos Narrow" panose="020B0004020202020204" pitchFamily="34" charset="0"/>
+                      </a:endParaRPr>
+                    </a:p>
+                  </a:txBody>
+                  <a:tcPr marL="9525" marR="9525" marT="9525" marB="0" anchor="b"/>
+                </a:tc>
+                <a:extLst>
+                  <a:ext uri="{0D108BD9-81ED-4DB2-BD59-A6C34878D82A}">
+                    <a16:rowId xmlns:a16="http://schemas.microsoft.com/office/drawing/2014/main" val="3130262279"/>
+                  </a:ext>
+                </a:extLst>
+              </a:tr>
+            </a:tbl>
+          </a:graphicData>
+        </a:graphic>
+      </p:graphicFrame>
+      <p:graphicFrame>
+        <p:nvGraphicFramePr>
+          <p:cNvPr id="10" name="Table 9">
+            <a:extLst>
+              <a:ext uri="{FF2B5EF4-FFF2-40B4-BE49-F238E27FC236}">
+                <a16:creationId xmlns:a16="http://schemas.microsoft.com/office/drawing/2014/main" id="{E912EC54-7285-4D2B-C50A-2786026466B2}"/>
+              </a:ext>
+            </a:extLst>
+          </p:cNvPr>
+          <p:cNvGraphicFramePr>
+            <a:graphicFrameLocks noGrp="1"/>
+          </p:cNvGraphicFramePr>
+          <p:nvPr>
+            <p:extLst>
+              <p:ext uri="{D42A27DB-BD31-4B8C-83A1-F6EECF244321}">
+                <p14:modId xmlns:p14="http://schemas.microsoft.com/office/powerpoint/2010/main" val="3674502488"/>
+              </p:ext>
+            </p:extLst>
+          </p:nvPr>
+        </p:nvGraphicFramePr>
+        <p:xfrm>
+          <a:off x="4484914" y="4872578"/>
+          <a:ext cx="5852160" cy="762000"/>
+        </p:xfrm>
+        <a:graphic>
+          <a:graphicData uri="http://schemas.openxmlformats.org/drawingml/2006/table">
+            <a:tbl>
+              <a:tblPr>
+                <a:tableStyleId>{5C22544A-7EE6-4342-B048-85BDC9FD1C3A}</a:tableStyleId>
+              </a:tblPr>
+              <a:tblGrid>
+                <a:gridCol w="749300">
+                  <a:extLst>
+                    <a:ext uri="{9D8B030D-6E8A-4147-A177-3AD203B41FA5}">
+                      <a16:colId xmlns:a16="http://schemas.microsoft.com/office/drawing/2014/main" val="2370773121"/>
+                    </a:ext>
+                  </a:extLst>
+                </a:gridCol>
+                <a:gridCol w="705032">
+                  <a:extLst>
+                    <a:ext uri="{9D8B030D-6E8A-4147-A177-3AD203B41FA5}">
+                      <a16:colId xmlns:a16="http://schemas.microsoft.com/office/drawing/2014/main" val="2603356998"/>
+                    </a:ext>
+                  </a:extLst>
+                </a:gridCol>
+                <a:gridCol w="775063">
+                  <a:extLst>
+                    <a:ext uri="{9D8B030D-6E8A-4147-A177-3AD203B41FA5}">
+                      <a16:colId xmlns:a16="http://schemas.microsoft.com/office/drawing/2014/main" val="3873826684"/>
+                    </a:ext>
+                  </a:extLst>
+                </a:gridCol>
+                <a:gridCol w="661851">
+                  <a:extLst>
+                    <a:ext uri="{9D8B030D-6E8A-4147-A177-3AD203B41FA5}">
+                      <a16:colId xmlns:a16="http://schemas.microsoft.com/office/drawing/2014/main" val="367885362"/>
+                    </a:ext>
+                  </a:extLst>
+                </a:gridCol>
+                <a:gridCol w="705394">
+                  <a:extLst>
+                    <a:ext uri="{9D8B030D-6E8A-4147-A177-3AD203B41FA5}">
+                      <a16:colId xmlns:a16="http://schemas.microsoft.com/office/drawing/2014/main" val="314770450"/>
+                    </a:ext>
+                  </a:extLst>
+                </a:gridCol>
+                <a:gridCol w="705394">
+                  <a:extLst>
+                    <a:ext uri="{9D8B030D-6E8A-4147-A177-3AD203B41FA5}">
+                      <a16:colId xmlns:a16="http://schemas.microsoft.com/office/drawing/2014/main" val="2725232399"/>
+                    </a:ext>
+                  </a:extLst>
+                </a:gridCol>
+                <a:gridCol w="722812">
+                  <a:extLst>
+                    <a:ext uri="{9D8B030D-6E8A-4147-A177-3AD203B41FA5}">
+                      <a16:colId xmlns:a16="http://schemas.microsoft.com/office/drawing/2014/main" val="3547895199"/>
+                    </a:ext>
+                  </a:extLst>
+                </a:gridCol>
+                <a:gridCol w="827314">
+                  <a:extLst>
+                    <a:ext uri="{9D8B030D-6E8A-4147-A177-3AD203B41FA5}">
+                      <a16:colId xmlns:a16="http://schemas.microsoft.com/office/drawing/2014/main" val="3943219054"/>
+                    </a:ext>
+                  </a:extLst>
+                </a:gridCol>
+              </a:tblGrid>
+              <a:tr h="190500">
+                <a:tc>
+                  <a:txBody>
+                    <a:bodyPr/>
+                    <a:lstStyle/>
+                    <a:p>
+                      <a:pPr algn="l" fontAlgn="b">
+                        <a:buNone/>
+                      </a:pPr>
+                      <a:r>
+                        <a:rPr lang="en-US" sz="1100" u="none" strike="noStrike">
+                          <a:effectLst/>
+                        </a:rPr>
+                        <a:t>Date</a:t>
+                      </a:r>
+                      <a:endParaRPr lang="en-US" sz="1100" b="0" i="0" u="none" strike="noStrike">
+                        <a:solidFill>
+                          <a:srgbClr val="000000"/>
+                        </a:solidFill>
+                        <a:effectLst/>
+                        <a:latin typeface="Aptos Narrow" panose="020B0004020202020204" pitchFamily="34" charset="0"/>
+                      </a:endParaRPr>
+                    </a:p>
+                  </a:txBody>
+                  <a:tcPr marL="9525" marR="9525" marT="9525" marB="0" anchor="b"/>
+                </a:tc>
+                <a:tc>
+                  <a:txBody>
+                    <a:bodyPr/>
+                    <a:lstStyle/>
+                    <a:p>
+                      <a:pPr algn="l" fontAlgn="b">
+                        <a:buNone/>
+                      </a:pPr>
+                      <a:r>
+                        <a:rPr lang="en-US" sz="1100" u="none" strike="noStrike">
+                          <a:effectLst/>
+                        </a:rPr>
+                        <a:t>Adj_Close</a:t>
+                      </a:r>
+                      <a:endParaRPr lang="en-US" sz="1100" b="0" i="0" u="none" strike="noStrike">
+                        <a:solidFill>
+                          <a:srgbClr val="000000"/>
+                        </a:solidFill>
+                        <a:effectLst/>
+                        <a:latin typeface="Aptos Narrow" panose="020B0004020202020204" pitchFamily="34" charset="0"/>
+                      </a:endParaRPr>
+                    </a:p>
+                  </a:txBody>
+                  <a:tcPr marL="9525" marR="9525" marT="9525" marB="0" anchor="b"/>
+                </a:tc>
+                <a:tc>
+                  <a:txBody>
+                    <a:bodyPr/>
+                    <a:lstStyle/>
+                    <a:p>
+                      <a:pPr algn="l" fontAlgn="b">
+                        <a:buNone/>
+                      </a:pPr>
+                      <a:r>
+                        <a:rPr lang="en-US" sz="1100" u="none" strike="noStrike">
+                          <a:effectLst/>
+                        </a:rPr>
+                        <a:t>Close</a:t>
+                      </a:r>
+                      <a:endParaRPr lang="en-US" sz="1100" b="0" i="0" u="none" strike="noStrike">
+                        <a:solidFill>
+                          <a:srgbClr val="000000"/>
+                        </a:solidFill>
+                        <a:effectLst/>
+                        <a:latin typeface="Aptos Narrow" panose="020B0004020202020204" pitchFamily="34" charset="0"/>
+                      </a:endParaRPr>
+                    </a:p>
+                  </a:txBody>
+                  <a:tcPr marL="9525" marR="9525" marT="9525" marB="0" anchor="b"/>
+                </a:tc>
+                <a:tc>
+                  <a:txBody>
+                    <a:bodyPr/>
+                    <a:lstStyle/>
+                    <a:p>
+                      <a:pPr algn="l" fontAlgn="b">
+                        <a:buNone/>
+                      </a:pPr>
+                      <a:r>
+                        <a:rPr lang="en-US" sz="1100" u="none" strike="noStrike">
+                          <a:effectLst/>
+                        </a:rPr>
+                        <a:t>High</a:t>
+                      </a:r>
+                      <a:endParaRPr lang="en-US" sz="1100" b="0" i="0" u="none" strike="noStrike">
+                        <a:solidFill>
+                          <a:srgbClr val="000000"/>
+                        </a:solidFill>
+                        <a:effectLst/>
+                        <a:latin typeface="Aptos Narrow" panose="020B0004020202020204" pitchFamily="34" charset="0"/>
+                      </a:endParaRPr>
+                    </a:p>
+                  </a:txBody>
+                  <a:tcPr marL="9525" marR="9525" marT="9525" marB="0" anchor="b"/>
+                </a:tc>
+                <a:tc>
+                  <a:txBody>
+                    <a:bodyPr/>
+                    <a:lstStyle/>
+                    <a:p>
+                      <a:pPr algn="l" fontAlgn="b">
+                        <a:buNone/>
+                      </a:pPr>
+                      <a:r>
+                        <a:rPr lang="en-US" sz="1100" u="none" strike="noStrike">
+                          <a:effectLst/>
+                        </a:rPr>
+                        <a:t>Low</a:t>
+                      </a:r>
+                      <a:endParaRPr lang="en-US" sz="1100" b="0" i="0" u="none" strike="noStrike">
+                        <a:solidFill>
+                          <a:srgbClr val="000000"/>
+                        </a:solidFill>
+                        <a:effectLst/>
+                        <a:latin typeface="Aptos Narrow" panose="020B0004020202020204" pitchFamily="34" charset="0"/>
+                      </a:endParaRPr>
+                    </a:p>
+                  </a:txBody>
+                  <a:tcPr marL="9525" marR="9525" marT="9525" marB="0" anchor="b"/>
+                </a:tc>
+                <a:tc>
+                  <a:txBody>
+                    <a:bodyPr/>
+                    <a:lstStyle/>
+                    <a:p>
+                      <a:pPr algn="l" fontAlgn="b">
+                        <a:buNone/>
+                      </a:pPr>
+                      <a:r>
+                        <a:rPr lang="en-US" sz="1100" u="none" strike="noStrike">
+                          <a:effectLst/>
+                        </a:rPr>
+                        <a:t>Open</a:t>
+                      </a:r>
+                      <a:endParaRPr lang="en-US" sz="1100" b="0" i="0" u="none" strike="noStrike">
+                        <a:solidFill>
+                          <a:srgbClr val="000000"/>
+                        </a:solidFill>
+                        <a:effectLst/>
+                        <a:latin typeface="Aptos Narrow" panose="020B0004020202020204" pitchFamily="34" charset="0"/>
+                      </a:endParaRPr>
+                    </a:p>
+                  </a:txBody>
+                  <a:tcPr marL="9525" marR="9525" marT="9525" marB="0" anchor="b"/>
+                </a:tc>
+                <a:tc>
+                  <a:txBody>
+                    <a:bodyPr/>
+                    <a:lstStyle/>
+                    <a:p>
+                      <a:pPr algn="l" fontAlgn="b">
+                        <a:buNone/>
+                      </a:pPr>
+                      <a:r>
+                        <a:rPr lang="en-US" sz="1100" u="none" strike="noStrike">
+                          <a:effectLst/>
+                        </a:rPr>
+                        <a:t>Dividends</a:t>
+                      </a:r>
+                      <a:endParaRPr lang="en-US" sz="1100" b="0" i="0" u="none" strike="noStrike">
+                        <a:solidFill>
+                          <a:srgbClr val="000000"/>
+                        </a:solidFill>
+                        <a:effectLst/>
+                        <a:latin typeface="Aptos Narrow" panose="020B0004020202020204" pitchFamily="34" charset="0"/>
+                      </a:endParaRPr>
+                    </a:p>
+                  </a:txBody>
+                  <a:tcPr marL="9525" marR="9525" marT="9525" marB="0" anchor="b"/>
+                </a:tc>
+                <a:tc>
+                  <a:txBody>
+                    <a:bodyPr/>
+                    <a:lstStyle/>
+                    <a:p>
+                      <a:pPr algn="l" fontAlgn="b">
+                        <a:buNone/>
+                      </a:pPr>
+                      <a:r>
+                        <a:rPr lang="en-US" sz="1100" u="none" strike="noStrike">
+                          <a:effectLst/>
+                        </a:rPr>
+                        <a:t>Split_Ratio</a:t>
+                      </a:r>
+                      <a:endParaRPr lang="en-US" sz="1100" b="0" i="0" u="none" strike="noStrike">
+                        <a:solidFill>
+                          <a:srgbClr val="000000"/>
+                        </a:solidFill>
+                        <a:effectLst/>
+                        <a:latin typeface="Aptos Narrow" panose="020B0004020202020204" pitchFamily="34" charset="0"/>
+                      </a:endParaRPr>
+                    </a:p>
+                  </a:txBody>
+                  <a:tcPr marL="9525" marR="9525" marT="9525" marB="0" anchor="b"/>
+                </a:tc>
+                <a:extLst>
+                  <a:ext uri="{0D108BD9-81ED-4DB2-BD59-A6C34878D82A}">
+                    <a16:rowId xmlns:a16="http://schemas.microsoft.com/office/drawing/2014/main" val="2944413431"/>
+                  </a:ext>
+                </a:extLst>
+              </a:tr>
+              <a:tr h="190500">
+                <a:tc>
+                  <a:txBody>
+                    <a:bodyPr/>
+                    <a:lstStyle/>
+                    <a:p>
+                      <a:pPr algn="r" fontAlgn="b">
+                        <a:buNone/>
+                      </a:pPr>
+                      <a:r>
+                        <a:rPr lang="en-US" sz="1100" u="none" strike="noStrike" dirty="0">
+                          <a:effectLst/>
+                        </a:rPr>
+                        <a:t>9/23/2025</a:t>
+                      </a:r>
+                      <a:endParaRPr lang="en-US" sz="1100" b="0" i="0" u="none" strike="noStrike" dirty="0">
+                        <a:solidFill>
+                          <a:srgbClr val="000000"/>
+                        </a:solidFill>
+                        <a:effectLst/>
+                        <a:latin typeface="Aptos Narrow" panose="020B0004020202020204" pitchFamily="34" charset="0"/>
+                      </a:endParaRPr>
+                    </a:p>
+                  </a:txBody>
+                  <a:tcPr marL="9525" marR="9525" marT="9525" marB="0" anchor="b"/>
+                </a:tc>
+                <a:tc>
+                  <a:txBody>
+                    <a:bodyPr/>
+                    <a:lstStyle/>
+                    <a:p>
+                      <a:pPr algn="r" fontAlgn="b">
+                        <a:buNone/>
+                      </a:pPr>
+                      <a:r>
+                        <a:rPr lang="en-US" sz="1100" u="none" strike="noStrike" dirty="0">
+                          <a:effectLst/>
+                        </a:rPr>
+                        <a:t>51.256</a:t>
+                      </a:r>
+                      <a:endParaRPr lang="en-US" sz="1100" b="0" i="0" u="none" strike="noStrike" dirty="0">
+                        <a:solidFill>
+                          <a:srgbClr val="000000"/>
+                        </a:solidFill>
+                        <a:effectLst/>
+                        <a:latin typeface="Aptos Narrow" panose="020B0004020202020204" pitchFamily="34" charset="0"/>
+                      </a:endParaRPr>
+                    </a:p>
+                  </a:txBody>
+                  <a:tcPr marL="9525" marR="9525" marT="9525" marB="0" anchor="b"/>
+                </a:tc>
+                <a:tc>
+                  <a:txBody>
+                    <a:bodyPr/>
+                    <a:lstStyle/>
+                    <a:p>
+                      <a:pPr algn="r" fontAlgn="b">
+                        <a:buNone/>
+                      </a:pPr>
+                      <a:r>
+                        <a:rPr lang="en-US" sz="1100" u="none" strike="noStrike" dirty="0">
+                          <a:effectLst/>
+                        </a:rPr>
+                        <a:t>102.561</a:t>
+                      </a:r>
+                      <a:endParaRPr lang="en-US" sz="1100" b="0" i="0" u="none" strike="noStrike" dirty="0">
+                        <a:solidFill>
+                          <a:srgbClr val="000000"/>
+                        </a:solidFill>
+                        <a:effectLst/>
+                        <a:latin typeface="Aptos Narrow" panose="020B0004020202020204" pitchFamily="34" charset="0"/>
+                      </a:endParaRPr>
+                    </a:p>
+                  </a:txBody>
+                  <a:tcPr marL="9525" marR="9525" marT="9525" marB="0" anchor="b"/>
+                </a:tc>
+                <a:tc>
+                  <a:txBody>
+                    <a:bodyPr/>
+                    <a:lstStyle/>
+                    <a:p>
+                      <a:pPr algn="r" fontAlgn="b">
+                        <a:buNone/>
+                      </a:pPr>
+                      <a:r>
+                        <a:rPr lang="en-US" sz="1100" u="none" strike="noStrike">
+                          <a:effectLst/>
+                        </a:rPr>
+                        <a:t>104.8499</a:t>
+                      </a:r>
+                      <a:endParaRPr lang="en-US" sz="1100" b="0" i="0" u="none" strike="noStrike">
+                        <a:solidFill>
+                          <a:srgbClr val="000000"/>
+                        </a:solidFill>
+                        <a:effectLst/>
+                        <a:latin typeface="Aptos Narrow" panose="020B0004020202020204" pitchFamily="34" charset="0"/>
+                      </a:endParaRPr>
+                    </a:p>
+                  </a:txBody>
+                  <a:tcPr marL="9525" marR="9525" marT="9525" marB="0" anchor="b"/>
+                </a:tc>
+                <a:tc>
+                  <a:txBody>
+                    <a:bodyPr/>
+                    <a:lstStyle/>
+                    <a:p>
+                      <a:pPr algn="r" fontAlgn="b">
+                        <a:buNone/>
+                      </a:pPr>
+                      <a:r>
+                        <a:rPr lang="en-US" sz="1100" u="none" strike="noStrike">
+                          <a:effectLst/>
+                        </a:rPr>
+                        <a:t>101.9313</a:t>
+                      </a:r>
+                      <a:endParaRPr lang="en-US" sz="1100" b="0" i="0" u="none" strike="noStrike">
+                        <a:solidFill>
+                          <a:srgbClr val="000000"/>
+                        </a:solidFill>
+                        <a:effectLst/>
+                        <a:latin typeface="Aptos Narrow" panose="020B0004020202020204" pitchFamily="34" charset="0"/>
+                      </a:endParaRPr>
+                    </a:p>
+                  </a:txBody>
+                  <a:tcPr marL="9525" marR="9525" marT="9525" marB="0" anchor="b"/>
+                </a:tc>
+                <a:tc>
+                  <a:txBody>
+                    <a:bodyPr/>
+                    <a:lstStyle/>
+                    <a:p>
+                      <a:pPr algn="r" fontAlgn="b">
+                        <a:buNone/>
+                      </a:pPr>
+                      <a:r>
+                        <a:rPr lang="en-US" sz="1100" u="none" strike="noStrike">
+                          <a:effectLst/>
+                        </a:rPr>
+                        <a:t>104.74</a:t>
+                      </a:r>
+                      <a:endParaRPr lang="en-US" sz="1100" b="0" i="0" u="none" strike="noStrike">
+                        <a:solidFill>
+                          <a:srgbClr val="000000"/>
+                        </a:solidFill>
+                        <a:effectLst/>
+                        <a:latin typeface="Aptos Narrow" panose="020B0004020202020204" pitchFamily="34" charset="0"/>
+                      </a:endParaRPr>
+                    </a:p>
+                  </a:txBody>
+                  <a:tcPr marL="9525" marR="9525" marT="9525" marB="0" anchor="b"/>
+                </a:tc>
+                <a:tc>
+                  <a:txBody>
+                    <a:bodyPr/>
+                    <a:lstStyle/>
+                    <a:p>
+                      <a:pPr algn="r" fontAlgn="b">
+                        <a:buNone/>
+                      </a:pPr>
+                      <a:r>
+                        <a:rPr lang="en-US" sz="1100" u="none" strike="noStrike">
+                          <a:effectLst/>
+                        </a:rPr>
+                        <a:t>0</a:t>
+                      </a:r>
+                      <a:endParaRPr lang="en-US" sz="1100" b="0" i="0" u="none" strike="noStrike">
+                        <a:solidFill>
+                          <a:srgbClr val="000000"/>
+                        </a:solidFill>
+                        <a:effectLst/>
+                        <a:latin typeface="Aptos Narrow" panose="020B0004020202020204" pitchFamily="34" charset="0"/>
+                      </a:endParaRPr>
+                    </a:p>
+                  </a:txBody>
+                  <a:tcPr marL="9525" marR="9525" marT="9525" marB="0" anchor="b"/>
+                </a:tc>
+                <a:tc>
+                  <a:txBody>
+                    <a:bodyPr/>
+                    <a:lstStyle/>
+                    <a:p>
+                      <a:pPr algn="r" fontAlgn="b">
+                        <a:buNone/>
+                      </a:pPr>
+                      <a:r>
+                        <a:rPr lang="en-US" sz="1100" u="none" strike="noStrike">
+                          <a:effectLst/>
+                        </a:rPr>
+                        <a:t>0</a:t>
+                      </a:r>
+                      <a:endParaRPr lang="en-US" sz="1100" b="0" i="0" u="none" strike="noStrike">
+                        <a:solidFill>
+                          <a:srgbClr val="000000"/>
+                        </a:solidFill>
+                        <a:effectLst/>
+                        <a:latin typeface="Aptos Narrow" panose="020B0004020202020204" pitchFamily="34" charset="0"/>
+                      </a:endParaRPr>
+                    </a:p>
+                  </a:txBody>
+                  <a:tcPr marL="9525" marR="9525" marT="9525" marB="0" anchor="b"/>
+                </a:tc>
+                <a:extLst>
+                  <a:ext uri="{0D108BD9-81ED-4DB2-BD59-A6C34878D82A}">
+                    <a16:rowId xmlns:a16="http://schemas.microsoft.com/office/drawing/2014/main" val="1416221290"/>
+                  </a:ext>
+                </a:extLst>
+              </a:tr>
+              <a:tr h="190500">
+                <a:tc>
+                  <a:txBody>
+                    <a:bodyPr/>
+                    <a:lstStyle/>
+                    <a:p>
+                      <a:pPr algn="r" fontAlgn="b">
+                        <a:buNone/>
+                      </a:pPr>
+                      <a:r>
+                        <a:rPr lang="en-US" sz="1100" u="none" strike="noStrike">
+                          <a:effectLst/>
+                        </a:rPr>
+                        <a:t>9/24/2025</a:t>
+                      </a:r>
+                      <a:endParaRPr lang="en-US" sz="1100" b="0" i="0" u="none" strike="noStrike">
+                        <a:solidFill>
+                          <a:srgbClr val="FF0000"/>
+                        </a:solidFill>
+                        <a:effectLst/>
+                        <a:latin typeface="Aptos Narrow" panose="020B0004020202020204" pitchFamily="34" charset="0"/>
+                      </a:endParaRPr>
+                    </a:p>
+                  </a:txBody>
+                  <a:tcPr marL="9525" marR="9525" marT="9525" marB="0" anchor="b"/>
+                </a:tc>
+                <a:tc>
+                  <a:txBody>
+                    <a:bodyPr/>
+                    <a:lstStyle/>
+                    <a:p>
+                      <a:pPr algn="r" fontAlgn="b">
+                        <a:buNone/>
+                      </a:pPr>
+                      <a:r>
+                        <a:rPr lang="en-US" sz="1100" u="none" strike="noStrike">
+                          <a:effectLst/>
+                        </a:rPr>
+                        <a:t>50.705</a:t>
+                      </a:r>
+                      <a:endParaRPr lang="en-US" sz="1100" b="0" i="0" u="none" strike="noStrike">
+                        <a:solidFill>
+                          <a:srgbClr val="FF0000"/>
+                        </a:solidFill>
+                        <a:effectLst/>
+                        <a:latin typeface="Aptos Narrow" panose="020B0004020202020204" pitchFamily="34" charset="0"/>
+                      </a:endParaRPr>
+                    </a:p>
+                  </a:txBody>
+                  <a:tcPr marL="9525" marR="9525" marT="9525" marB="0" anchor="b"/>
+                </a:tc>
+                <a:tc>
+                  <a:txBody>
+                    <a:bodyPr/>
+                    <a:lstStyle/>
+                    <a:p>
+                      <a:pPr algn="r" fontAlgn="b">
+                        <a:buNone/>
+                      </a:pPr>
+                      <a:r>
+                        <a:rPr lang="en-US" sz="1100" u="none" strike="noStrike" dirty="0">
+                          <a:effectLst/>
+                        </a:rPr>
+                        <a:t>101.41</a:t>
+                      </a:r>
+                      <a:endParaRPr lang="en-US" sz="1100" b="0" i="0" u="none" strike="noStrike" dirty="0">
+                        <a:solidFill>
+                          <a:srgbClr val="FF0000"/>
+                        </a:solidFill>
+                        <a:effectLst/>
+                        <a:latin typeface="Aptos Narrow" panose="020B0004020202020204" pitchFamily="34" charset="0"/>
+                      </a:endParaRPr>
+                    </a:p>
+                  </a:txBody>
+                  <a:tcPr marL="9525" marR="9525" marT="9525" marB="0" anchor="b"/>
+                </a:tc>
+                <a:tc>
+                  <a:txBody>
+                    <a:bodyPr/>
+                    <a:lstStyle/>
+                    <a:p>
+                      <a:pPr algn="r" fontAlgn="b">
+                        <a:buNone/>
+                      </a:pPr>
+                      <a:r>
+                        <a:rPr lang="en-US" sz="1100" u="none" strike="noStrike" dirty="0">
+                          <a:effectLst/>
+                        </a:rPr>
+                        <a:t>103.36</a:t>
+                      </a:r>
+                      <a:endParaRPr lang="en-US" sz="1100" b="0" i="0" u="none" strike="noStrike" dirty="0">
+                        <a:solidFill>
+                          <a:srgbClr val="FF0000"/>
+                        </a:solidFill>
+                        <a:effectLst/>
+                        <a:latin typeface="Aptos Narrow" panose="020B0004020202020204" pitchFamily="34" charset="0"/>
+                      </a:endParaRPr>
+                    </a:p>
+                  </a:txBody>
+                  <a:tcPr marL="9525" marR="9525" marT="9525" marB="0" anchor="b"/>
+                </a:tc>
+                <a:tc>
+                  <a:txBody>
+                    <a:bodyPr/>
+                    <a:lstStyle/>
+                    <a:p>
+                      <a:pPr algn="r" fontAlgn="b">
+                        <a:buNone/>
+                      </a:pPr>
+                      <a:r>
+                        <a:rPr lang="en-US" sz="1100" u="none" strike="noStrike" dirty="0">
+                          <a:effectLst/>
+                        </a:rPr>
+                        <a:t>99.99</a:t>
+                      </a:r>
+                      <a:endParaRPr lang="en-US" sz="1100" b="0" i="0" u="none" strike="noStrike" dirty="0">
+                        <a:solidFill>
+                          <a:srgbClr val="FF0000"/>
+                        </a:solidFill>
+                        <a:effectLst/>
+                        <a:latin typeface="Aptos Narrow" panose="020B0004020202020204" pitchFamily="34" charset="0"/>
+                      </a:endParaRPr>
+                    </a:p>
+                  </a:txBody>
+                  <a:tcPr marL="9525" marR="9525" marT="9525" marB="0" anchor="b"/>
+                </a:tc>
+                <a:tc>
+                  <a:txBody>
+                    <a:bodyPr/>
+                    <a:lstStyle/>
+                    <a:p>
+                      <a:pPr algn="r" fontAlgn="b">
+                        <a:buNone/>
+                      </a:pPr>
+                      <a:r>
+                        <a:rPr lang="en-US" sz="1100" u="none" strike="noStrike">
+                          <a:effectLst/>
+                        </a:rPr>
+                        <a:t>103.21</a:t>
+                      </a:r>
+                      <a:endParaRPr lang="en-US" sz="1100" b="0" i="0" u="none" strike="noStrike">
+                        <a:solidFill>
+                          <a:srgbClr val="FF0000"/>
+                        </a:solidFill>
+                        <a:effectLst/>
+                        <a:latin typeface="Aptos Narrow" panose="020B0004020202020204" pitchFamily="34" charset="0"/>
+                      </a:endParaRPr>
+                    </a:p>
+                  </a:txBody>
+                  <a:tcPr marL="9525" marR="9525" marT="9525" marB="0" anchor="b"/>
+                </a:tc>
+                <a:tc>
+                  <a:txBody>
+                    <a:bodyPr/>
+                    <a:lstStyle/>
+                    <a:p>
+                      <a:pPr algn="r" fontAlgn="b">
+                        <a:buNone/>
+                      </a:pPr>
+                      <a:r>
+                        <a:rPr lang="en-US" sz="1100" b="1" u="none" strike="noStrike" dirty="0">
+                          <a:effectLst/>
+                          <a:highlight>
+                            <a:srgbClr val="FFFF00"/>
+                          </a:highlight>
+                        </a:rPr>
+                        <a:t>0.049</a:t>
+                      </a:r>
+                      <a:endParaRPr lang="en-US" sz="1100" b="1" i="0" u="none" strike="noStrike" dirty="0">
+                        <a:solidFill>
+                          <a:srgbClr val="FF0000"/>
+                        </a:solidFill>
+                        <a:effectLst/>
+                        <a:highlight>
+                          <a:srgbClr val="FFFF00"/>
+                        </a:highlight>
+                        <a:latin typeface="Aptos Narrow" panose="020B0004020202020204" pitchFamily="34" charset="0"/>
+                      </a:endParaRPr>
+                    </a:p>
+                  </a:txBody>
+                  <a:tcPr marL="9525" marR="9525" marT="9525" marB="0" anchor="b"/>
+                </a:tc>
+                <a:tc>
+                  <a:txBody>
+                    <a:bodyPr/>
+                    <a:lstStyle/>
+                    <a:p>
+                      <a:pPr algn="r" fontAlgn="b">
+                        <a:buNone/>
+                      </a:pPr>
+                      <a:r>
+                        <a:rPr lang="en-US" sz="1100" u="none" strike="noStrike" dirty="0">
+                          <a:effectLst/>
+                        </a:rPr>
+                        <a:t>0</a:t>
+                      </a:r>
+                      <a:endParaRPr lang="en-US" sz="1100" b="0" i="0" u="none" strike="noStrike" dirty="0">
+                        <a:solidFill>
+                          <a:srgbClr val="FF0000"/>
+                        </a:solidFill>
+                        <a:effectLst/>
+                        <a:latin typeface="Aptos Narrow" panose="020B0004020202020204" pitchFamily="34" charset="0"/>
+                      </a:endParaRPr>
+                    </a:p>
+                  </a:txBody>
+                  <a:tcPr marL="9525" marR="9525" marT="9525" marB="0" anchor="b"/>
+                </a:tc>
+                <a:extLst>
+                  <a:ext uri="{0D108BD9-81ED-4DB2-BD59-A6C34878D82A}">
+                    <a16:rowId xmlns:a16="http://schemas.microsoft.com/office/drawing/2014/main" val="1911448783"/>
+                  </a:ext>
+                </a:extLst>
+              </a:tr>
+              <a:tr h="190500">
+                <a:tc>
+                  <a:txBody>
+                    <a:bodyPr/>
+                    <a:lstStyle/>
+                    <a:p>
+                      <a:pPr algn="r" fontAlgn="b">
+                        <a:buNone/>
+                      </a:pPr>
+                      <a:r>
+                        <a:rPr lang="en-US" sz="1100" u="none" strike="noStrike">
+                          <a:effectLst/>
+                        </a:rPr>
+                        <a:t>9/25/2025</a:t>
+                      </a:r>
+                      <a:endParaRPr lang="en-US" sz="1100" b="0" i="0" u="none" strike="noStrike">
+                        <a:solidFill>
+                          <a:srgbClr val="000000"/>
+                        </a:solidFill>
+                        <a:effectLst/>
+                        <a:latin typeface="Aptos Narrow" panose="020B0004020202020204" pitchFamily="34" charset="0"/>
+                      </a:endParaRPr>
+                    </a:p>
+                  </a:txBody>
+                  <a:tcPr marL="9525" marR="9525" marT="9525" marB="0" anchor="b"/>
+                </a:tc>
+                <a:tc>
+                  <a:txBody>
+                    <a:bodyPr/>
+                    <a:lstStyle/>
+                    <a:p>
+                      <a:pPr algn="r" fontAlgn="b">
+                        <a:buNone/>
+                      </a:pPr>
+                      <a:r>
+                        <a:rPr lang="en-US" sz="1100" u="none" strike="noStrike">
+                          <a:effectLst/>
+                        </a:rPr>
+                        <a:t>50.025</a:t>
+                      </a:r>
+                      <a:endParaRPr lang="en-US" sz="1100" b="0" i="0" u="none" strike="noStrike">
+                        <a:solidFill>
+                          <a:srgbClr val="000000"/>
+                        </a:solidFill>
+                        <a:effectLst/>
+                        <a:latin typeface="Aptos Narrow" panose="020B0004020202020204" pitchFamily="34" charset="0"/>
+                      </a:endParaRPr>
+                    </a:p>
+                  </a:txBody>
+                  <a:tcPr marL="9525" marR="9525" marT="9525" marB="0" anchor="b"/>
+                </a:tc>
+                <a:tc>
+                  <a:txBody>
+                    <a:bodyPr/>
+                    <a:lstStyle/>
+                    <a:p>
+                      <a:pPr algn="r" fontAlgn="b">
+                        <a:buNone/>
+                      </a:pPr>
+                      <a:r>
+                        <a:rPr lang="en-US" sz="1100" u="none" strike="noStrike">
+                          <a:effectLst/>
+                        </a:rPr>
+                        <a:t>100.05</a:t>
+                      </a:r>
+                      <a:endParaRPr lang="en-US" sz="1100" b="0" i="0" u="none" strike="noStrike">
+                        <a:solidFill>
+                          <a:srgbClr val="000000"/>
+                        </a:solidFill>
+                        <a:effectLst/>
+                        <a:latin typeface="Aptos Narrow" panose="020B0004020202020204" pitchFamily="34" charset="0"/>
+                      </a:endParaRPr>
+                    </a:p>
+                  </a:txBody>
+                  <a:tcPr marL="9525" marR="9525" marT="9525" marB="0" anchor="b"/>
+                </a:tc>
+                <a:tc>
+                  <a:txBody>
+                    <a:bodyPr/>
+                    <a:lstStyle/>
+                    <a:p>
+                      <a:pPr algn="r" fontAlgn="b">
+                        <a:buNone/>
+                      </a:pPr>
+                      <a:r>
+                        <a:rPr lang="en-US" sz="1100" u="none" strike="noStrike">
+                          <a:effectLst/>
+                        </a:rPr>
+                        <a:t>100.87</a:t>
+                      </a:r>
+                      <a:endParaRPr lang="en-US" sz="1100" b="0" i="0" u="none" strike="noStrike">
+                        <a:solidFill>
+                          <a:srgbClr val="000000"/>
+                        </a:solidFill>
+                        <a:effectLst/>
+                        <a:latin typeface="Aptos Narrow" panose="020B0004020202020204" pitchFamily="34" charset="0"/>
+                      </a:endParaRPr>
+                    </a:p>
+                  </a:txBody>
+                  <a:tcPr marL="9525" marR="9525" marT="9525" marB="0" anchor="b"/>
+                </a:tc>
+                <a:tc>
+                  <a:txBody>
+                    <a:bodyPr/>
+                    <a:lstStyle/>
+                    <a:p>
+                      <a:pPr algn="r" fontAlgn="b">
+                        <a:buNone/>
+                      </a:pPr>
+                      <a:r>
+                        <a:rPr lang="en-US" sz="1100" u="none" strike="noStrike">
+                          <a:effectLst/>
+                        </a:rPr>
+                        <a:t>97.5</a:t>
+                      </a:r>
+                      <a:endParaRPr lang="en-US" sz="1100" b="0" i="0" u="none" strike="noStrike">
+                        <a:solidFill>
+                          <a:srgbClr val="000000"/>
+                        </a:solidFill>
+                        <a:effectLst/>
+                        <a:latin typeface="Aptos Narrow" panose="020B0004020202020204" pitchFamily="34" charset="0"/>
+                      </a:endParaRPr>
+                    </a:p>
+                  </a:txBody>
+                  <a:tcPr marL="9525" marR="9525" marT="9525" marB="0" anchor="b"/>
+                </a:tc>
+                <a:tc>
+                  <a:txBody>
+                    <a:bodyPr/>
+                    <a:lstStyle/>
+                    <a:p>
+                      <a:pPr algn="r" fontAlgn="b">
+                        <a:buNone/>
+                      </a:pPr>
+                      <a:r>
+                        <a:rPr lang="en-US" sz="1100" u="none" strike="noStrike" dirty="0">
+                          <a:effectLst/>
+                        </a:rPr>
+                        <a:t>99.4</a:t>
+                      </a:r>
+                      <a:endParaRPr lang="en-US" sz="1100" b="0" i="0" u="none" strike="noStrike" dirty="0">
+                        <a:solidFill>
+                          <a:srgbClr val="000000"/>
+                        </a:solidFill>
+                        <a:effectLst/>
+                        <a:latin typeface="Aptos Narrow" panose="020B0004020202020204" pitchFamily="34" charset="0"/>
+                      </a:endParaRPr>
+                    </a:p>
+                  </a:txBody>
+                  <a:tcPr marL="9525" marR="9525" marT="9525" marB="0" anchor="b"/>
+                </a:tc>
+                <a:tc>
+                  <a:txBody>
+                    <a:bodyPr/>
+                    <a:lstStyle/>
+                    <a:p>
+                      <a:pPr algn="r" fontAlgn="b">
+                        <a:buNone/>
+                      </a:pPr>
+                      <a:r>
+                        <a:rPr lang="en-US" sz="1100" u="none" strike="noStrike" dirty="0">
+                          <a:effectLst/>
+                        </a:rPr>
+                        <a:t>0</a:t>
+                      </a:r>
+                      <a:endParaRPr lang="en-US" sz="1100" b="0" i="0" u="none" strike="noStrike" dirty="0">
+                        <a:solidFill>
+                          <a:srgbClr val="000000"/>
+                        </a:solidFill>
+                        <a:effectLst/>
+                        <a:latin typeface="Aptos Narrow" panose="020B0004020202020204" pitchFamily="34" charset="0"/>
+                      </a:endParaRPr>
+                    </a:p>
+                  </a:txBody>
+                  <a:tcPr marL="9525" marR="9525" marT="9525" marB="0" anchor="b"/>
+                </a:tc>
+                <a:tc>
+                  <a:txBody>
+                    <a:bodyPr/>
+                    <a:lstStyle/>
+                    <a:p>
+                      <a:pPr algn="r" fontAlgn="b">
+                        <a:buNone/>
+                      </a:pPr>
+                      <a:r>
+                        <a:rPr lang="en-US" sz="1100" u="none" strike="noStrike" dirty="0">
+                          <a:effectLst/>
+                        </a:rPr>
+                        <a:t>0</a:t>
+                      </a:r>
+                      <a:endParaRPr lang="en-US" sz="1100" b="0" i="0" u="none" strike="noStrike" dirty="0">
+                        <a:solidFill>
+                          <a:srgbClr val="000000"/>
+                        </a:solidFill>
+                        <a:effectLst/>
+                        <a:latin typeface="Aptos Narrow" panose="020B0004020202020204" pitchFamily="34" charset="0"/>
+                      </a:endParaRPr>
+                    </a:p>
+                  </a:txBody>
+                  <a:tcPr marL="9525" marR="9525" marT="9525" marB="0" anchor="b"/>
+                </a:tc>
+                <a:extLst>
+                  <a:ext uri="{0D108BD9-81ED-4DB2-BD59-A6C34878D82A}">
+                    <a16:rowId xmlns:a16="http://schemas.microsoft.com/office/drawing/2014/main" val="3130262279"/>
+                  </a:ext>
+                </a:extLst>
+              </a:tr>
+            </a:tbl>
+          </a:graphicData>
+        </a:graphic>
+      </p:graphicFrame>
     </p:spTree>
     <p:extLst>
       <p:ext uri="{BB962C8B-B14F-4D97-AF65-F5344CB8AC3E}">
-        <p14:creationId xmlns:p14="http://schemas.microsoft.com/office/powerpoint/2010/main" val="1220474982"/>
+        <p14:creationId xmlns:p14="http://schemas.microsoft.com/office/powerpoint/2010/main" val="362659860"/>
       </p:ext>
     </p:extLst>
   </p:cSld>

</xml_diff>

<commit_message>
TQQQ: Do not invest in TQQQ until 2022-04-17
</commit_message>
<xml_diff>
--- a/Option Trading.pptx
+++ b/Option Trading.pptx
@@ -3730,7 +3730,7 @@
         <p:spPr>
           <a:xfrm>
             <a:off x="358365" y="805759"/>
-            <a:ext cx="3824336" cy="5880996"/>
+            <a:ext cx="3824336" cy="4873043"/>
           </a:xfrm>
           <a:solidFill>
             <a:schemeClr val="bg1">
@@ -4043,7 +4043,7 @@
         <p:spPr>
           <a:xfrm>
             <a:off x="4327555" y="805759"/>
-            <a:ext cx="3681745" cy="5880996"/>
+            <a:ext cx="3681745" cy="4873043"/>
           </a:xfrm>
           <a:prstGeom prst="rect">
             <a:avLst/>
@@ -4242,26 +4242,6 @@
                 </a:solidFill>
               </a:rPr>
             </a:br>
-            <a:br>
-              <a:rPr lang="en-US" sz="1400" dirty="0">
-                <a:solidFill>
-                  <a:schemeClr val="tx2">
-                    <a:lumMod val="75000"/>
-                    <a:lumOff val="25000"/>
-                  </a:schemeClr>
-                </a:solidFill>
-              </a:rPr>
-            </a:br>
-            <a:br>
-              <a:rPr lang="en-US" sz="1400" dirty="0">
-                <a:solidFill>
-                  <a:schemeClr val="tx2">
-                    <a:lumMod val="75000"/>
-                    <a:lumOff val="25000"/>
-                  </a:schemeClr>
-                </a:solidFill>
-              </a:rPr>
-            </a:br>
             <a:r>
               <a:rPr lang="en-US" sz="1400" dirty="0">
                 <a:solidFill>
@@ -4528,7 +4508,7 @@
         <p:spPr>
           <a:xfrm>
             <a:off x="8154154" y="805759"/>
-            <a:ext cx="3941275" cy="5880996"/>
+            <a:ext cx="3941275" cy="4873043"/>
           </a:xfrm>
           <a:prstGeom prst="rect">
             <a:avLst/>
@@ -4781,17 +4761,14 @@
               <a:buFont typeface="Arial" panose="020B0604020202020204" pitchFamily="34" charset="0"/>
               <a:buNone/>
             </a:pPr>
-            <a:r>
-              <a:rPr lang="en-US" sz="1400" dirty="0">
-                <a:solidFill>
-                  <a:schemeClr val="tx2">
-                    <a:lumMod val="75000"/>
-                    <a:lumOff val="25000"/>
-                  </a:schemeClr>
-                </a:solidFill>
-              </a:rPr>
-              <a:t>        "stock_max_below_avg": "18.9%",</a:t>
-            </a:r>
+            <a:endParaRPr lang="en-US" sz="1400" dirty="0">
+              <a:solidFill>
+                <a:schemeClr val="tx2">
+                  <a:lumMod val="75000"/>
+                  <a:lumOff val="25000"/>
+                </a:schemeClr>
+              </a:solidFill>
+            </a:endParaRPr>
           </a:p>
           <a:p>
             <a:pPr marL="0" indent="0">
@@ -4807,7 +4784,7 @@
                   </a:schemeClr>
                 </a:solidFill>
               </a:rPr>
-              <a:t>        "stock_min_above_strike": "-9999%",</a:t>
+              <a:t>        "stock_max_below_avg": "18.9%",</a:t>
             </a:r>
           </a:p>
           <a:p>
@@ -4815,6 +4792,34 @@
               <a:buFont typeface="Arial" panose="020B0604020202020204" pitchFamily="34" charset="0"/>
               <a:buNone/>
             </a:pPr>
+            <a:endParaRPr lang="en-US" sz="1400" dirty="0">
+              <a:solidFill>
+                <a:schemeClr val="tx2">
+                  <a:lumMod val="75000"/>
+                  <a:lumOff val="25000"/>
+                </a:schemeClr>
+              </a:solidFill>
+            </a:endParaRPr>
+          </a:p>
+          <a:p>
+            <a:pPr marL="0" indent="0">
+              <a:buFont typeface="Arial" panose="020B0604020202020204" pitchFamily="34" charset="0"/>
+              <a:buNone/>
+            </a:pPr>
+            <a:endParaRPr lang="en-US" sz="1400" dirty="0">
+              <a:solidFill>
+                <a:schemeClr val="tx2">
+                  <a:lumMod val="75000"/>
+                  <a:lumOff val="25000"/>
+                </a:schemeClr>
+              </a:solidFill>
+            </a:endParaRPr>
+          </a:p>
+          <a:p>
+            <a:pPr marL="0" indent="0">
+              <a:buFont typeface="Arial" panose="020B0604020202020204" pitchFamily="34" charset="0"/>
+              <a:buNone/>
+            </a:pPr>
             <a:r>
               <a:rPr lang="en-US" sz="1400" dirty="0">
                 <a:solidFill>
@@ -4824,8 +4829,67 @@
                   </a:schemeClr>
                 </a:solidFill>
               </a:rPr>
+              <a:t>        "stock_min_above_strike": "-9999%",</a:t>
+            </a:r>
+          </a:p>
+          <a:p>
+            <a:pPr marL="0" indent="0">
+              <a:buFont typeface="Arial" panose="020B0604020202020204" pitchFamily="34" charset="0"/>
+              <a:buNone/>
+            </a:pPr>
+            <a:endParaRPr lang="en-US" sz="1400" dirty="0">
+              <a:solidFill>
+                <a:schemeClr val="tx2">
+                  <a:lumMod val="75000"/>
+                  <a:lumOff val="25000"/>
+                </a:schemeClr>
+              </a:solidFill>
+            </a:endParaRPr>
+          </a:p>
+          <a:p>
+            <a:pPr marL="0" indent="0">
+              <a:buFont typeface="Arial" panose="020B0604020202020204" pitchFamily="34" charset="0"/>
+              <a:buNone/>
+            </a:pPr>
+            <a:endParaRPr lang="en-US" sz="1400" dirty="0">
+              <a:solidFill>
+                <a:schemeClr val="tx2">
+                  <a:lumMod val="75000"/>
+                  <a:lumOff val="25000"/>
+                </a:schemeClr>
+              </a:solidFill>
+            </a:endParaRPr>
+          </a:p>
+          <a:p>
+            <a:pPr marL="0" indent="0">
+              <a:buFont typeface="Arial" panose="020B0604020202020204" pitchFamily="34" charset="0"/>
+              <a:buNone/>
+            </a:pPr>
+            <a:r>
+              <a:rPr lang="en-US" sz="1400" dirty="0">
+                <a:solidFill>
+                  <a:schemeClr val="tx2">
+                    <a:lumMod val="75000"/>
+                    <a:lumOff val="25000"/>
+                  </a:schemeClr>
+                </a:solidFill>
+              </a:rPr>
               <a:t>        "stock_max_below_entry": "26.6%",</a:t>
             </a:r>
+          </a:p>
+          <a:p>
+            <a:pPr marL="0" indent="0">
+              <a:buFont typeface="Arial" panose="020B0604020202020204" pitchFamily="34" charset="0"/>
+              <a:buNone/>
+            </a:pPr>
+            <a:endParaRPr lang="en-US" sz="1400" dirty="0">
+              <a:solidFill>
+                <a:schemeClr val="tx2">
+                  <a:lumMod val="75000"/>
+                  <a:lumOff val="25000"/>
+                </a:schemeClr>
+              </a:solidFill>
+            </a:endParaRPr>
           </a:p>
           <a:p>
             <a:pPr marL="0" indent="0">
@@ -4922,6 +4986,735 @@
                 </a:schemeClr>
               </a:solidFill>
             </a:endParaRPr>
+          </a:p>
+        </p:txBody>
+      </p:sp>
+      <p:sp>
+        <p:nvSpPr>
+          <p:cNvPr id="4" name="Rectangle 3">
+            <a:extLst>
+              <a:ext uri="{FF2B5EF4-FFF2-40B4-BE49-F238E27FC236}">
+                <a16:creationId xmlns:a16="http://schemas.microsoft.com/office/drawing/2014/main" id="{54BC1B82-0687-15BC-CF09-CDE9CB12F3B4}"/>
+              </a:ext>
+            </a:extLst>
+          </p:cNvPr>
+          <p:cNvSpPr/>
+          <p:nvPr/>
+        </p:nvSpPr>
+        <p:spPr>
+          <a:xfrm rot="1914748">
+            <a:off x="3523746" y="4920703"/>
+            <a:ext cx="399468" cy="276999"/>
+          </a:xfrm>
+          <a:prstGeom prst="rect">
+            <a:avLst/>
+          </a:prstGeom>
+          <a:noFill/>
+        </p:spPr>
+        <p:txBody>
+          <a:bodyPr wrap="none" lIns="91440" tIns="45720" rIns="91440" bIns="45720">
+            <a:spAutoFit/>
+          </a:bodyPr>
+          <a:lstStyle/>
+          <a:p>
+            <a:pPr algn="ctr"/>
+            <a:r>
+              <a:rPr lang="en-US" sz="1200" b="0" cap="none" spc="0" dirty="0">
+                <a:ln w="0"/>
+                <a:solidFill>
+                  <a:schemeClr val="accent2">
+                    <a:lumMod val="75000"/>
+                  </a:schemeClr>
+                </a:solidFill>
+                <a:effectLst>
+                  <a:outerShdw blurRad="38100" dist="25400" dir="5400000" algn="ctr" rotWithShape="0">
+                    <a:srgbClr val="6E747A">
+                      <a:alpha val="43000"/>
+                    </a:srgbClr>
+                  </a:outerShdw>
+                </a:effectLst>
+              </a:rPr>
+              <a:t>Adj</a:t>
+            </a:r>
+          </a:p>
+        </p:txBody>
+      </p:sp>
+      <p:sp>
+        <p:nvSpPr>
+          <p:cNvPr id="8" name="Rectangle 7">
+            <a:extLst>
+              <a:ext uri="{FF2B5EF4-FFF2-40B4-BE49-F238E27FC236}">
+                <a16:creationId xmlns:a16="http://schemas.microsoft.com/office/drawing/2014/main" id="{32F609DC-A8BD-26B7-617F-E23B21522299}"/>
+              </a:ext>
+            </a:extLst>
+          </p:cNvPr>
+          <p:cNvSpPr/>
+          <p:nvPr/>
+        </p:nvSpPr>
+        <p:spPr>
+          <a:xfrm rot="1908593">
+            <a:off x="2902804" y="5271697"/>
+            <a:ext cx="572593" cy="276999"/>
+          </a:xfrm>
+          <a:prstGeom prst="rect">
+            <a:avLst/>
+          </a:prstGeom>
+          <a:noFill/>
+        </p:spPr>
+        <p:txBody>
+          <a:bodyPr wrap="none" lIns="91440" tIns="45720" rIns="91440" bIns="45720">
+            <a:spAutoFit/>
+          </a:bodyPr>
+          <a:lstStyle/>
+          <a:p>
+            <a:pPr algn="ctr"/>
+            <a:r>
+              <a:rPr lang="en-US" sz="1200" b="0" cap="none" spc="0" dirty="0">
+                <a:ln w="0"/>
+                <a:solidFill>
+                  <a:schemeClr val="accent2">
+                    <a:lumMod val="75000"/>
+                  </a:schemeClr>
+                </a:solidFill>
+                <a:effectLst>
+                  <a:outerShdw blurRad="38100" dist="25400" dir="5400000" algn="ctr" rotWithShape="0">
+                    <a:srgbClr val="6E747A">
+                      <a:alpha val="43000"/>
+                    </a:srgbClr>
+                  </a:outerShdw>
+                </a:effectLst>
+              </a:rPr>
+              <a:t>Close</a:t>
+            </a:r>
+          </a:p>
+        </p:txBody>
+      </p:sp>
+      <p:sp>
+        <p:nvSpPr>
+          <p:cNvPr id="10" name="Rectangle 9">
+            <a:extLst>
+              <a:ext uri="{FF2B5EF4-FFF2-40B4-BE49-F238E27FC236}">
+                <a16:creationId xmlns:a16="http://schemas.microsoft.com/office/drawing/2014/main" id="{784117AF-E051-DC24-7D72-C5CB169B20F1}"/>
+              </a:ext>
+            </a:extLst>
+          </p:cNvPr>
+          <p:cNvSpPr/>
+          <p:nvPr/>
+        </p:nvSpPr>
+        <p:spPr>
+          <a:xfrm rot="1914748">
+            <a:off x="2990655" y="4606643"/>
+            <a:ext cx="399468" cy="276999"/>
+          </a:xfrm>
+          <a:prstGeom prst="rect">
+            <a:avLst/>
+          </a:prstGeom>
+          <a:noFill/>
+        </p:spPr>
+        <p:txBody>
+          <a:bodyPr wrap="none" lIns="91440" tIns="45720" rIns="91440" bIns="45720">
+            <a:spAutoFit/>
+          </a:bodyPr>
+          <a:lstStyle/>
+          <a:p>
+            <a:pPr algn="ctr"/>
+            <a:r>
+              <a:rPr lang="en-US" sz="1200" b="0" cap="none" spc="0" dirty="0">
+                <a:ln w="0"/>
+                <a:solidFill>
+                  <a:schemeClr val="accent2">
+                    <a:lumMod val="75000"/>
+                  </a:schemeClr>
+                </a:solidFill>
+                <a:effectLst>
+                  <a:outerShdw blurRad="38100" dist="25400" dir="5400000" algn="ctr" rotWithShape="0">
+                    <a:srgbClr val="6E747A">
+                      <a:alpha val="43000"/>
+                    </a:srgbClr>
+                  </a:outerShdw>
+                </a:effectLst>
+              </a:rPr>
+              <a:t>Adj</a:t>
+            </a:r>
+          </a:p>
+        </p:txBody>
+      </p:sp>
+      <p:sp>
+        <p:nvSpPr>
+          <p:cNvPr id="13" name="Rectangle 12">
+            <a:extLst>
+              <a:ext uri="{FF2B5EF4-FFF2-40B4-BE49-F238E27FC236}">
+                <a16:creationId xmlns:a16="http://schemas.microsoft.com/office/drawing/2014/main" id="{63F17661-180C-9E90-EE2D-9E48E0631BCA}"/>
+              </a:ext>
+            </a:extLst>
+          </p:cNvPr>
+          <p:cNvSpPr/>
+          <p:nvPr/>
+        </p:nvSpPr>
+        <p:spPr>
+          <a:xfrm rot="1914748">
+            <a:off x="3162454" y="4331638"/>
+            <a:ext cx="399468" cy="276999"/>
+          </a:xfrm>
+          <a:prstGeom prst="rect">
+            <a:avLst/>
+          </a:prstGeom>
+          <a:noFill/>
+        </p:spPr>
+        <p:txBody>
+          <a:bodyPr wrap="none" lIns="91440" tIns="45720" rIns="91440" bIns="45720">
+            <a:spAutoFit/>
+          </a:bodyPr>
+          <a:lstStyle/>
+          <a:p>
+            <a:pPr algn="ctr"/>
+            <a:r>
+              <a:rPr lang="en-US" sz="1200" b="0" cap="none" spc="0" dirty="0">
+                <a:ln w="0"/>
+                <a:solidFill>
+                  <a:schemeClr val="accent2">
+                    <a:lumMod val="75000"/>
+                  </a:schemeClr>
+                </a:solidFill>
+                <a:effectLst>
+                  <a:outerShdw blurRad="38100" dist="25400" dir="5400000" algn="ctr" rotWithShape="0">
+                    <a:srgbClr val="6E747A">
+                      <a:alpha val="43000"/>
+                    </a:srgbClr>
+                  </a:outerShdw>
+                </a:effectLst>
+              </a:rPr>
+              <a:t>Adj</a:t>
+            </a:r>
+          </a:p>
+        </p:txBody>
+      </p:sp>
+      <p:sp>
+        <p:nvSpPr>
+          <p:cNvPr id="14" name="Rectangle 13">
+            <a:extLst>
+              <a:ext uri="{FF2B5EF4-FFF2-40B4-BE49-F238E27FC236}">
+                <a16:creationId xmlns:a16="http://schemas.microsoft.com/office/drawing/2014/main" id="{D3807673-C20D-BDE2-F4BC-5BE91C5A9E69}"/>
+              </a:ext>
+            </a:extLst>
+          </p:cNvPr>
+          <p:cNvSpPr/>
+          <p:nvPr/>
+        </p:nvSpPr>
+        <p:spPr>
+          <a:xfrm rot="1914748">
+            <a:off x="3162454" y="3995564"/>
+            <a:ext cx="399468" cy="276999"/>
+          </a:xfrm>
+          <a:prstGeom prst="rect">
+            <a:avLst/>
+          </a:prstGeom>
+          <a:noFill/>
+        </p:spPr>
+        <p:txBody>
+          <a:bodyPr wrap="none" lIns="91440" tIns="45720" rIns="91440" bIns="45720">
+            <a:spAutoFit/>
+          </a:bodyPr>
+          <a:lstStyle/>
+          <a:p>
+            <a:pPr algn="ctr"/>
+            <a:r>
+              <a:rPr lang="en-US" sz="1200" b="0" cap="none" spc="0" dirty="0">
+                <a:ln w="0"/>
+                <a:solidFill>
+                  <a:schemeClr val="accent2">
+                    <a:lumMod val="75000"/>
+                  </a:schemeClr>
+                </a:solidFill>
+                <a:effectLst>
+                  <a:outerShdw blurRad="38100" dist="25400" dir="5400000" algn="ctr" rotWithShape="0">
+                    <a:srgbClr val="6E747A">
+                      <a:alpha val="43000"/>
+                    </a:srgbClr>
+                  </a:outerShdw>
+                </a:effectLst>
+              </a:rPr>
+              <a:t>Adj</a:t>
+            </a:r>
+          </a:p>
+        </p:txBody>
+      </p:sp>
+      <p:sp>
+        <p:nvSpPr>
+          <p:cNvPr id="15" name="Rectangle 14">
+            <a:extLst>
+              <a:ext uri="{FF2B5EF4-FFF2-40B4-BE49-F238E27FC236}">
+                <a16:creationId xmlns:a16="http://schemas.microsoft.com/office/drawing/2014/main" id="{898327A5-3F61-541B-7049-8CCB533E8EA8}"/>
+              </a:ext>
+            </a:extLst>
+          </p:cNvPr>
+          <p:cNvSpPr/>
+          <p:nvPr/>
+        </p:nvSpPr>
+        <p:spPr>
+          <a:xfrm rot="1908593">
+            <a:off x="7358034" y="3206692"/>
+            <a:ext cx="572593" cy="461665"/>
+          </a:xfrm>
+          <a:prstGeom prst="rect">
+            <a:avLst/>
+          </a:prstGeom>
+          <a:noFill/>
+        </p:spPr>
+        <p:txBody>
+          <a:bodyPr wrap="none" lIns="91440" tIns="45720" rIns="91440" bIns="45720">
+            <a:spAutoFit/>
+          </a:bodyPr>
+          <a:lstStyle/>
+          <a:p>
+            <a:pPr algn="ctr"/>
+            <a:r>
+              <a:rPr lang="en-US" sz="1200" b="0" cap="none" spc="0" dirty="0">
+                <a:ln w="0"/>
+                <a:solidFill>
+                  <a:schemeClr val="accent2">
+                    <a:lumMod val="75000"/>
+                  </a:schemeClr>
+                </a:solidFill>
+                <a:effectLst>
+                  <a:outerShdw blurRad="38100" dist="25400" dir="5400000" algn="ctr" rotWithShape="0">
+                    <a:srgbClr val="6E747A">
+                      <a:alpha val="43000"/>
+                    </a:srgbClr>
+                  </a:outerShdw>
+                </a:effectLst>
+              </a:rPr>
+              <a:t>Avg</a:t>
+            </a:r>
+            <a:br>
+              <a:rPr lang="en-US" sz="1200" b="0" cap="none" spc="0" dirty="0">
+                <a:ln w="0"/>
+                <a:solidFill>
+                  <a:schemeClr val="accent2">
+                    <a:lumMod val="75000"/>
+                  </a:schemeClr>
+                </a:solidFill>
+                <a:effectLst>
+                  <a:outerShdw blurRad="38100" dist="25400" dir="5400000" algn="ctr" rotWithShape="0">
+                    <a:srgbClr val="6E747A">
+                      <a:alpha val="43000"/>
+                    </a:srgbClr>
+                  </a:outerShdw>
+                </a:effectLst>
+              </a:rPr>
+            </a:br>
+            <a:r>
+              <a:rPr lang="en-US" sz="1200" b="0" cap="none" spc="0" dirty="0">
+                <a:ln w="0"/>
+                <a:solidFill>
+                  <a:schemeClr val="accent2">
+                    <a:lumMod val="75000"/>
+                  </a:schemeClr>
+                </a:solidFill>
+                <a:effectLst>
+                  <a:outerShdw blurRad="38100" dist="25400" dir="5400000" algn="ctr" rotWithShape="0">
+                    <a:srgbClr val="6E747A">
+                      <a:alpha val="43000"/>
+                    </a:srgbClr>
+                  </a:outerShdw>
+                </a:effectLst>
+              </a:rPr>
+              <a:t>Close</a:t>
+            </a:r>
+          </a:p>
+        </p:txBody>
+      </p:sp>
+      <p:sp>
+        <p:nvSpPr>
+          <p:cNvPr id="16" name="Rectangle 15">
+            <a:extLst>
+              <a:ext uri="{FF2B5EF4-FFF2-40B4-BE49-F238E27FC236}">
+                <a16:creationId xmlns:a16="http://schemas.microsoft.com/office/drawing/2014/main" id="{FD8B901E-4582-1B08-AED5-77376428DF6E}"/>
+              </a:ext>
+            </a:extLst>
+          </p:cNvPr>
+          <p:cNvSpPr/>
+          <p:nvPr/>
+        </p:nvSpPr>
+        <p:spPr>
+          <a:xfrm rot="1914748">
+            <a:off x="11217770" y="1668051"/>
+            <a:ext cx="399468" cy="276999"/>
+          </a:xfrm>
+          <a:prstGeom prst="rect">
+            <a:avLst/>
+          </a:prstGeom>
+          <a:noFill/>
+        </p:spPr>
+        <p:txBody>
+          <a:bodyPr wrap="none" lIns="91440" tIns="45720" rIns="91440" bIns="45720">
+            <a:spAutoFit/>
+          </a:bodyPr>
+          <a:lstStyle/>
+          <a:p>
+            <a:pPr algn="ctr"/>
+            <a:r>
+              <a:rPr lang="en-US" sz="1200" b="0" cap="none" spc="0" dirty="0">
+                <a:ln w="0"/>
+                <a:solidFill>
+                  <a:schemeClr val="accent2">
+                    <a:lumMod val="75000"/>
+                  </a:schemeClr>
+                </a:solidFill>
+                <a:effectLst>
+                  <a:outerShdw blurRad="38100" dist="25400" dir="5400000" algn="ctr" rotWithShape="0">
+                    <a:srgbClr val="6E747A">
+                      <a:alpha val="43000"/>
+                    </a:srgbClr>
+                  </a:outerShdw>
+                </a:effectLst>
+              </a:rPr>
+              <a:t>Adj</a:t>
+            </a:r>
+          </a:p>
+        </p:txBody>
+      </p:sp>
+      <p:sp>
+        <p:nvSpPr>
+          <p:cNvPr id="17" name="Rectangle 16">
+            <a:extLst>
+              <a:ext uri="{FF2B5EF4-FFF2-40B4-BE49-F238E27FC236}">
+                <a16:creationId xmlns:a16="http://schemas.microsoft.com/office/drawing/2014/main" id="{01CEA58A-0577-7B6A-DA37-7ADA543FA0CC}"/>
+              </a:ext>
+            </a:extLst>
+          </p:cNvPr>
+          <p:cNvSpPr/>
+          <p:nvPr/>
+        </p:nvSpPr>
+        <p:spPr>
+          <a:xfrm rot="1908593">
+            <a:off x="11111906" y="2219059"/>
+            <a:ext cx="611194" cy="646331"/>
+          </a:xfrm>
+          <a:prstGeom prst="rect">
+            <a:avLst/>
+          </a:prstGeom>
+          <a:noFill/>
+        </p:spPr>
+        <p:txBody>
+          <a:bodyPr wrap="none" lIns="91440" tIns="45720" rIns="91440" bIns="45720">
+            <a:spAutoFit/>
+          </a:bodyPr>
+          <a:lstStyle/>
+          <a:p>
+            <a:pPr algn="ctr"/>
+            <a:r>
+              <a:rPr lang="en-US" sz="1200" dirty="0">
+                <a:ln w="0"/>
+                <a:solidFill>
+                  <a:schemeClr val="accent2">
+                    <a:lumMod val="75000"/>
+                  </a:schemeClr>
+                </a:solidFill>
+                <a:effectLst>
+                  <a:outerShdw blurRad="38100" dist="25400" dir="5400000" algn="ctr" rotWithShape="0">
+                    <a:srgbClr val="6E747A">
+                      <a:alpha val="43000"/>
+                    </a:srgbClr>
+                  </a:outerShdw>
+                </a:effectLst>
+              </a:rPr>
+              <a:t>Close,</a:t>
+            </a:r>
+            <a:br>
+              <a:rPr lang="en-US" sz="1200" b="0" cap="none" spc="0" dirty="0">
+                <a:ln w="0"/>
+                <a:solidFill>
+                  <a:schemeClr val="accent2">
+                    <a:lumMod val="75000"/>
+                  </a:schemeClr>
+                </a:solidFill>
+                <a:effectLst>
+                  <a:outerShdw blurRad="38100" dist="25400" dir="5400000" algn="ctr" rotWithShape="0">
+                    <a:srgbClr val="6E747A">
+                      <a:alpha val="43000"/>
+                    </a:srgbClr>
+                  </a:outerShdw>
+                </a:effectLst>
+              </a:rPr>
+            </a:br>
+            <a:r>
+              <a:rPr lang="en-US" sz="1200" b="0" cap="none" spc="0" dirty="0">
+                <a:ln w="0"/>
+                <a:solidFill>
+                  <a:schemeClr val="accent2">
+                    <a:lumMod val="75000"/>
+                  </a:schemeClr>
+                </a:solidFill>
+                <a:effectLst>
+                  <a:outerShdw blurRad="38100" dist="25400" dir="5400000" algn="ctr" rotWithShape="0">
+                    <a:srgbClr val="6E747A">
+                      <a:alpha val="43000"/>
+                    </a:srgbClr>
+                  </a:outerShdw>
+                </a:effectLst>
+              </a:rPr>
+              <a:t>Avg</a:t>
+            </a:r>
+            <a:br>
+              <a:rPr lang="en-US" sz="1200" b="0" cap="none" spc="0" dirty="0">
+                <a:ln w="0"/>
+                <a:solidFill>
+                  <a:schemeClr val="accent2">
+                    <a:lumMod val="75000"/>
+                  </a:schemeClr>
+                </a:solidFill>
+                <a:effectLst>
+                  <a:outerShdw blurRad="38100" dist="25400" dir="5400000" algn="ctr" rotWithShape="0">
+                    <a:srgbClr val="6E747A">
+                      <a:alpha val="43000"/>
+                    </a:srgbClr>
+                  </a:outerShdw>
+                </a:effectLst>
+              </a:rPr>
+            </a:br>
+            <a:r>
+              <a:rPr lang="en-US" sz="1200" b="0" cap="none" spc="0" dirty="0">
+                <a:ln w="0"/>
+                <a:solidFill>
+                  <a:schemeClr val="accent2">
+                    <a:lumMod val="75000"/>
+                  </a:schemeClr>
+                </a:solidFill>
+                <a:effectLst>
+                  <a:outerShdw blurRad="38100" dist="25400" dir="5400000" algn="ctr" rotWithShape="0">
+                    <a:srgbClr val="6E747A">
+                      <a:alpha val="43000"/>
+                    </a:srgbClr>
+                  </a:outerShdw>
+                </a:effectLst>
+              </a:rPr>
+              <a:t>Close</a:t>
+            </a:r>
+          </a:p>
+        </p:txBody>
+      </p:sp>
+      <p:sp>
+        <p:nvSpPr>
+          <p:cNvPr id="18" name="Rectangle 17">
+            <a:extLst>
+              <a:ext uri="{FF2B5EF4-FFF2-40B4-BE49-F238E27FC236}">
+                <a16:creationId xmlns:a16="http://schemas.microsoft.com/office/drawing/2014/main" id="{D58EDC44-E628-75D1-01D8-0CA61A12BE50}"/>
+              </a:ext>
+            </a:extLst>
+          </p:cNvPr>
+          <p:cNvSpPr/>
+          <p:nvPr/>
+        </p:nvSpPr>
+        <p:spPr>
+          <a:xfrm rot="1908593">
+            <a:off x="11231040" y="3272816"/>
+            <a:ext cx="572593" cy="276999"/>
+          </a:xfrm>
+          <a:prstGeom prst="rect">
+            <a:avLst/>
+          </a:prstGeom>
+          <a:noFill/>
+        </p:spPr>
+        <p:txBody>
+          <a:bodyPr wrap="none" lIns="91440" tIns="45720" rIns="91440" bIns="45720">
+            <a:spAutoFit/>
+          </a:bodyPr>
+          <a:lstStyle/>
+          <a:p>
+            <a:pPr algn="ctr"/>
+            <a:r>
+              <a:rPr lang="en-US" sz="1200" b="0" cap="none" spc="0" dirty="0">
+                <a:ln w="0"/>
+                <a:solidFill>
+                  <a:schemeClr val="accent2">
+                    <a:lumMod val="75000"/>
+                  </a:schemeClr>
+                </a:solidFill>
+                <a:effectLst>
+                  <a:outerShdw blurRad="38100" dist="25400" dir="5400000" algn="ctr" rotWithShape="0">
+                    <a:srgbClr val="6E747A">
+                      <a:alpha val="43000"/>
+                    </a:srgbClr>
+                  </a:outerShdw>
+                </a:effectLst>
+              </a:rPr>
+              <a:t>Close</a:t>
+            </a:r>
+          </a:p>
+        </p:txBody>
+      </p:sp>
+      <p:sp>
+        <p:nvSpPr>
+          <p:cNvPr id="19" name="Rectangle 18">
+            <a:extLst>
+              <a:ext uri="{FF2B5EF4-FFF2-40B4-BE49-F238E27FC236}">
+                <a16:creationId xmlns:a16="http://schemas.microsoft.com/office/drawing/2014/main" id="{5F68D899-7D85-5050-3BC9-F501F4ED986E}"/>
+              </a:ext>
+            </a:extLst>
+          </p:cNvPr>
+          <p:cNvSpPr/>
+          <p:nvPr/>
+        </p:nvSpPr>
+        <p:spPr>
+          <a:xfrm rot="1914748">
+            <a:off x="11217769" y="4218714"/>
+            <a:ext cx="399468" cy="276999"/>
+          </a:xfrm>
+          <a:prstGeom prst="rect">
+            <a:avLst/>
+          </a:prstGeom>
+          <a:noFill/>
+        </p:spPr>
+        <p:txBody>
+          <a:bodyPr wrap="none" lIns="91440" tIns="45720" rIns="91440" bIns="45720">
+            <a:spAutoFit/>
+          </a:bodyPr>
+          <a:lstStyle/>
+          <a:p>
+            <a:pPr algn="ctr"/>
+            <a:r>
+              <a:rPr lang="en-US" sz="1200" b="0" cap="none" spc="0" dirty="0">
+                <a:ln w="0"/>
+                <a:solidFill>
+                  <a:schemeClr val="accent2">
+                    <a:lumMod val="75000"/>
+                  </a:schemeClr>
+                </a:solidFill>
+                <a:effectLst>
+                  <a:outerShdw blurRad="38100" dist="25400" dir="5400000" algn="ctr" rotWithShape="0">
+                    <a:srgbClr val="6E747A">
+                      <a:alpha val="43000"/>
+                    </a:srgbClr>
+                  </a:outerShdw>
+                </a:effectLst>
+              </a:rPr>
+              <a:t>Adj</a:t>
+            </a:r>
+          </a:p>
+        </p:txBody>
+      </p:sp>
+      <p:sp>
+        <p:nvSpPr>
+          <p:cNvPr id="20" name="Rectangle 19">
+            <a:extLst>
+              <a:ext uri="{FF2B5EF4-FFF2-40B4-BE49-F238E27FC236}">
+                <a16:creationId xmlns:a16="http://schemas.microsoft.com/office/drawing/2014/main" id="{594ED320-0C75-2A18-C488-4690A41A8D07}"/>
+              </a:ext>
+            </a:extLst>
+          </p:cNvPr>
+          <p:cNvSpPr/>
+          <p:nvPr/>
+        </p:nvSpPr>
+        <p:spPr>
+          <a:xfrm>
+            <a:off x="468425" y="5852100"/>
+            <a:ext cx="2404376" cy="830997"/>
+          </a:xfrm>
+          <a:prstGeom prst="rect">
+            <a:avLst/>
+          </a:prstGeom>
+          <a:noFill/>
+        </p:spPr>
+        <p:txBody>
+          <a:bodyPr wrap="none" lIns="91440" tIns="45720" rIns="91440" bIns="45720">
+            <a:spAutoFit/>
+          </a:bodyPr>
+          <a:lstStyle/>
+          <a:p>
+            <a:r>
+              <a:rPr lang="en-US" sz="1200" b="0" cap="none" spc="0" dirty="0">
+                <a:ln w="0"/>
+                <a:solidFill>
+                  <a:schemeClr val="accent2">
+                    <a:lumMod val="75000"/>
+                  </a:schemeClr>
+                </a:solidFill>
+                <a:effectLst>
+                  <a:outerShdw blurRad="38100" dist="25400" dir="5400000" algn="ctr" rotWithShape="0">
+                    <a:srgbClr val="6E747A">
+                      <a:alpha val="43000"/>
+                    </a:srgbClr>
+                  </a:outerShdw>
+                </a:effectLst>
+              </a:rPr>
+              <a:t>Adj : Adjusted Price</a:t>
+            </a:r>
+          </a:p>
+          <a:p>
+            <a:r>
+              <a:rPr lang="en-US" sz="1200" dirty="0">
+                <a:ln w="0"/>
+                <a:solidFill>
+                  <a:schemeClr val="accent2">
+                    <a:lumMod val="75000"/>
+                  </a:schemeClr>
+                </a:solidFill>
+                <a:effectLst>
+                  <a:outerShdw blurRad="38100" dist="25400" dir="5400000" algn="ctr" rotWithShape="0">
+                    <a:srgbClr val="6E747A">
+                      <a:alpha val="43000"/>
+                    </a:srgbClr>
+                  </a:outerShdw>
+                </a:effectLst>
+              </a:rPr>
+              <a:t>Avg Adj: SMA150</a:t>
+            </a:r>
+            <a:endParaRPr lang="en-US" sz="1200" b="0" cap="none" spc="0" dirty="0">
+              <a:ln w="0"/>
+              <a:solidFill>
+                <a:schemeClr val="accent2">
+                  <a:lumMod val="75000"/>
+                </a:schemeClr>
+              </a:solidFill>
+              <a:effectLst>
+                <a:outerShdw blurRad="38100" dist="25400" dir="5400000" algn="ctr" rotWithShape="0">
+                  <a:srgbClr val="6E747A">
+                    <a:alpha val="43000"/>
+                  </a:srgbClr>
+                </a:outerShdw>
+              </a:effectLst>
+            </a:endParaRPr>
+          </a:p>
+          <a:p>
+            <a:r>
+              <a:rPr lang="en-US" sz="1200" dirty="0">
+                <a:ln w="0"/>
+                <a:solidFill>
+                  <a:schemeClr val="accent2">
+                    <a:lumMod val="75000"/>
+                  </a:schemeClr>
+                </a:solidFill>
+                <a:effectLst>
+                  <a:outerShdw blurRad="38100" dist="25400" dir="5400000" algn="ctr" rotWithShape="0">
+                    <a:srgbClr val="6E747A">
+                      <a:alpha val="43000"/>
+                    </a:srgbClr>
+                  </a:outerShdw>
+                </a:effectLst>
+              </a:rPr>
+              <a:t>Close:  Real Close price</a:t>
+            </a:r>
+          </a:p>
+          <a:p>
+            <a:r>
+              <a:rPr lang="en-US" sz="1200" b="0" cap="none" spc="0" dirty="0">
+                <a:ln w="0"/>
+                <a:solidFill>
+                  <a:schemeClr val="accent2">
+                    <a:lumMod val="75000"/>
+                  </a:schemeClr>
+                </a:solidFill>
+                <a:effectLst>
+                  <a:outerShdw blurRad="38100" dist="25400" dir="5400000" algn="ctr" rotWithShape="0">
+                    <a:srgbClr val="6E747A">
+                      <a:alpha val="43000"/>
+                    </a:srgbClr>
+                  </a:outerShdw>
+                </a:effectLst>
+              </a:rPr>
+              <a:t>Avg Close = Avg Adj x (Close / Adj)</a:t>
+            </a:r>
           </a:p>
         </p:txBody>
       </p:sp>
@@ -10746,15 +11539,7 @@
           <a:p>
             <a:r>
               <a:rPr lang="en-US" sz="1600" dirty="0"/>
-              <a:t>To find the impact of the </a:t>
-            </a:r>
-            <a:r>
-              <a:rPr lang="en-US" sz="1600"/>
-              <a:t>dividend on the </a:t>
-            </a:r>
-            <a:r>
-              <a:rPr lang="en-US" sz="1600" dirty="0"/>
-              <a:t>unadjusted close (UAC), on the dividend day recalculate the unadjusted close of all the prior dates:</a:t>
+              <a:t>To find the impact of the dividend on the unadjusted close (UAC), on the dividend day recalculate the unadjusted close of all the prior dates:</a:t>
             </a:r>
             <a:br>
               <a:rPr lang="en-US" sz="1600" dirty="0"/>

</xml_diff>